<commit_message>
<master> : Fixed project Monster_Hunter WeaponsDB ppt
</commit_message>
<xml_diff>
--- a/Java_tutorial/src/project_07_MonsterHunter_Weapon_DB/Monster_Hunter_ppt/몬스터헌터_무기DB.pptx
+++ b/Java_tutorial/src/project_07_MonsterHunter_Weapon_DB/Monster_Hunter_ppt/몬스터헌터_무기DB.pptx
@@ -5,7 +5,7 @@
     <p:sldMasterId id="2147484836" r:id="rId1"/>
   </p:sldMasterIdLst>
   <p:notesMasterIdLst>
-    <p:notesMasterId r:id="rId21"/>
+    <p:notesMasterId r:id="rId23"/>
   </p:notesMasterIdLst>
   <p:sldIdLst>
     <p:sldId id="256" r:id="rId2"/>
@@ -25,8 +25,10 @@
     <p:sldId id="270" r:id="rId16"/>
     <p:sldId id="271" r:id="rId17"/>
     <p:sldId id="272" r:id="rId18"/>
-    <p:sldId id="273" r:id="rId19"/>
-    <p:sldId id="274" r:id="rId20"/>
+    <p:sldId id="275" r:id="rId19"/>
+    <p:sldId id="276" r:id="rId20"/>
+    <p:sldId id="273" r:id="rId21"/>
+    <p:sldId id="274" r:id="rId22"/>
   </p:sldIdLst>
   <p:sldSz cx="9144000" cy="6858000" type="screen4x3"/>
   <p:notesSz cx="6858000" cy="9144000"/>
@@ -6375,28 +6377,795 @@
           <a:lstStyle/>
           <a:p>
             <a:r>
+              <a:rPr lang="en-US" altLang="ko-KR" dirty="0" smtClean="0"/>
+              <a:t>5. </a:t>
+            </a:r>
+            <a:r>
               <a:rPr lang="ko-KR" altLang="en-US" dirty="0" smtClean="0"/>
-              <a:t>제작 환경</a:t>
+              <a:t>테스트</a:t>
             </a:r>
             <a:endParaRPr lang="ko-KR" altLang="en-US" dirty="0"/>
           </a:p>
         </p:txBody>
       </p:sp>
-      <p:sp>
-        <p:nvSpPr>
-          <p:cNvPr id="5" name="TextBox 4"/>
-          <p:cNvSpPr txBox="1"/>
+      <p:pic>
+        <p:nvPicPr>
+          <p:cNvPr id="1026" name="Picture 2" descr="D:\Kim_Young_Woo\JAVA_LECTURE\JAVA_Lecture\Java_tutorial\src\project_07_MonsterHunter_Weapon_DB\Monster_Hunter_ppt\image\테스트_1.png"/>
+          <p:cNvPicPr>
+            <a:picLocks noChangeAspect="1" noChangeArrowheads="1"/>
+          </p:cNvPicPr>
           <p:nvPr/>
-        </p:nvSpPr>
-        <p:spPr>
-          <a:xfrm>
-            <a:off x="2915816" y="2848868"/>
-            <a:ext cx="3404073" cy="2308324"/>
+        </p:nvPicPr>
+        <p:blipFill>
+          <a:blip r:embed="rId2">
+            <a:extLst>
+              <a:ext uri="{28A0092B-C50C-407E-A947-70E740481C1C}">
+                <a14:useLocalDpi xmlns:a14="http://schemas.microsoft.com/office/drawing/2010/main" val="0"/>
+              </a:ext>
+            </a:extLst>
+          </a:blip>
+          <a:srcRect/>
+          <a:stretch>
+            <a:fillRect/>
+          </a:stretch>
+        </p:blipFill>
+        <p:spPr bwMode="auto">
+          <a:xfrm>
+            <a:off x="107504" y="1927011"/>
+            <a:ext cx="4372217" cy="4580417"/>
           </a:xfrm>
           <a:prstGeom prst="rect">
             <a:avLst/>
           </a:prstGeom>
           <a:noFill/>
+          <a:extLst>
+            <a:ext uri="{909E8E84-426E-40DD-AFC4-6F175D3DCCD1}">
+              <a14:hiddenFill xmlns:a14="http://schemas.microsoft.com/office/drawing/2010/main">
+                <a:solidFill>
+                  <a:srgbClr val="FFFFFF"/>
+                </a:solidFill>
+              </a14:hiddenFill>
+            </a:ext>
+          </a:extLst>
+        </p:spPr>
+      </p:pic>
+      <p:pic>
+        <p:nvPicPr>
+          <p:cNvPr id="1027" name="Picture 3" descr="D:\Kim_Young_Woo\JAVA_LECTURE\JAVA_Lecture\Java_tutorial\src\project_07_MonsterHunter_Weapon_DB\Monster_Hunter_ppt\image\테스트_1_결과.png"/>
+          <p:cNvPicPr>
+            <a:picLocks noChangeAspect="1" noChangeArrowheads="1"/>
+          </p:cNvPicPr>
+          <p:nvPr/>
+        </p:nvPicPr>
+        <p:blipFill>
+          <a:blip r:embed="rId3">
+            <a:extLst>
+              <a:ext uri="{28A0092B-C50C-407E-A947-70E740481C1C}">
+                <a14:useLocalDpi xmlns:a14="http://schemas.microsoft.com/office/drawing/2010/main" val="0"/>
+              </a:ext>
+            </a:extLst>
+          </a:blip>
+          <a:srcRect/>
+          <a:stretch>
+            <a:fillRect/>
+          </a:stretch>
+        </p:blipFill>
+        <p:spPr bwMode="auto">
+          <a:xfrm>
+            <a:off x="4810376" y="1927011"/>
+            <a:ext cx="4082104" cy="4394966"/>
+          </a:xfrm>
+          <a:prstGeom prst="rect">
+            <a:avLst/>
+          </a:prstGeom>
+          <a:noFill/>
+          <a:extLst>
+            <a:ext uri="{909E8E84-426E-40DD-AFC4-6F175D3DCCD1}">
+              <a14:hiddenFill xmlns:a14="http://schemas.microsoft.com/office/drawing/2010/main">
+                <a:solidFill>
+                  <a:srgbClr val="FFFFFF"/>
+                </a:solidFill>
+              </a14:hiddenFill>
+            </a:ext>
+          </a:extLst>
+        </p:spPr>
+      </p:pic>
+    </p:spTree>
+    <p:extLst>
+      <p:ext uri="{BB962C8B-B14F-4D97-AF65-F5344CB8AC3E}">
+        <p14:creationId xmlns:p14="http://schemas.microsoft.com/office/powerpoint/2010/main" val="2743869122"/>
+      </p:ext>
+    </p:extLst>
+  </p:cSld>
+  <p:clrMapOvr>
+    <a:masterClrMapping/>
+  </p:clrMapOvr>
+</p:sld>
+</file>
+
+<file path=ppt/slides/slide19.xml><?xml version="1.0" encoding="utf-8"?>
+<p:sld xmlns:a="http://schemas.openxmlformats.org/drawingml/2006/main" xmlns:r="http://schemas.openxmlformats.org/officeDocument/2006/relationships" xmlns:p="http://schemas.openxmlformats.org/presentationml/2006/main">
+  <p:cSld>
+    <p:spTree>
+      <p:nvGrpSpPr>
+        <p:cNvPr id="1" name=""/>
+        <p:cNvGrpSpPr/>
+        <p:nvPr/>
+      </p:nvGrpSpPr>
+      <p:grpSpPr>
+        <a:xfrm>
+          <a:off x="0" y="0"/>
+          <a:ext cx="0" cy="0"/>
+          <a:chOff x="0" y="0"/>
+          <a:chExt cx="0" cy="0"/>
+        </a:xfrm>
+      </p:grpSpPr>
+      <p:sp>
+        <p:nvSpPr>
+          <p:cNvPr id="3" name="제목 2"/>
+          <p:cNvSpPr>
+            <a:spLocks noGrp="1"/>
+          </p:cNvSpPr>
+          <p:nvPr>
+            <p:ph type="title"/>
+          </p:nvPr>
+        </p:nvSpPr>
+        <p:spPr/>
+        <p:txBody>
+          <a:bodyPr/>
+          <a:lstStyle/>
+          <a:p>
+            <a:r>
+              <a:rPr lang="en-US" altLang="ko-KR" dirty="0" smtClean="0"/>
+              <a:t>5. </a:t>
+            </a:r>
+            <a:r>
+              <a:rPr lang="ko-KR" altLang="en-US" dirty="0" smtClean="0"/>
+              <a:t>테스트</a:t>
+            </a:r>
+            <a:endParaRPr lang="ko-KR" altLang="en-US" dirty="0"/>
+          </a:p>
+        </p:txBody>
+      </p:sp>
+      <p:pic>
+        <p:nvPicPr>
+          <p:cNvPr id="2050" name="Picture 2" descr="D:\Kim_Young_Woo\JAVA_LECTURE\JAVA_Lecture\Java_tutorial\src\project_07_MonsterHunter_Weapon_DB\Monster_Hunter_ppt\image\테스트_2.png"/>
+          <p:cNvPicPr>
+            <a:picLocks noChangeAspect="1" noChangeArrowheads="1"/>
+          </p:cNvPicPr>
+          <p:nvPr/>
+        </p:nvPicPr>
+        <p:blipFill>
+          <a:blip r:embed="rId2">
+            <a:extLst>
+              <a:ext uri="{28A0092B-C50C-407E-A947-70E740481C1C}">
+                <a14:useLocalDpi xmlns:a14="http://schemas.microsoft.com/office/drawing/2010/main" val="0"/>
+              </a:ext>
+            </a:extLst>
+          </a:blip>
+          <a:srcRect/>
+          <a:stretch>
+            <a:fillRect/>
+          </a:stretch>
+        </p:blipFill>
+        <p:spPr bwMode="auto">
+          <a:xfrm>
+            <a:off x="683568" y="2060848"/>
+            <a:ext cx="4189074" cy="4316016"/>
+          </a:xfrm>
+          <a:prstGeom prst="rect">
+            <a:avLst/>
+          </a:prstGeom>
+          <a:noFill/>
+          <a:extLst>
+            <a:ext uri="{909E8E84-426E-40DD-AFC4-6F175D3DCCD1}">
+              <a14:hiddenFill xmlns:a14="http://schemas.microsoft.com/office/drawing/2010/main">
+                <a:solidFill>
+                  <a:srgbClr val="FFFFFF"/>
+                </a:solidFill>
+              </a14:hiddenFill>
+            </a:ext>
+          </a:extLst>
+        </p:spPr>
+      </p:pic>
+      <p:pic>
+        <p:nvPicPr>
+          <p:cNvPr id="2051" name="Picture 3" descr="D:\Kim_Young_Woo\JAVA_LECTURE\JAVA_Lecture\Java_tutorial\src\project_07_MonsterHunter_Weapon_DB\Monster_Hunter_ppt\image\테스트_2_결과.png"/>
+          <p:cNvPicPr>
+            <a:picLocks noChangeAspect="1" noChangeArrowheads="1"/>
+          </p:cNvPicPr>
+          <p:nvPr/>
+        </p:nvPicPr>
+        <p:blipFill>
+          <a:blip r:embed="rId3">
+            <a:extLst>
+              <a:ext uri="{28A0092B-C50C-407E-A947-70E740481C1C}">
+                <a14:useLocalDpi xmlns:a14="http://schemas.microsoft.com/office/drawing/2010/main" val="0"/>
+              </a:ext>
+            </a:extLst>
+          </a:blip>
+          <a:srcRect/>
+          <a:stretch>
+            <a:fillRect/>
+          </a:stretch>
+        </p:blipFill>
+        <p:spPr bwMode="auto">
+          <a:xfrm>
+            <a:off x="5501208" y="2060848"/>
+            <a:ext cx="2311152" cy="2279053"/>
+          </a:xfrm>
+          <a:prstGeom prst="rect">
+            <a:avLst/>
+          </a:prstGeom>
+          <a:noFill/>
+          <a:extLst>
+            <a:ext uri="{909E8E84-426E-40DD-AFC4-6F175D3DCCD1}">
+              <a14:hiddenFill xmlns:a14="http://schemas.microsoft.com/office/drawing/2010/main">
+                <a:solidFill>
+                  <a:srgbClr val="FFFFFF"/>
+                </a:solidFill>
+              </a14:hiddenFill>
+            </a:ext>
+          </a:extLst>
+        </p:spPr>
+      </p:pic>
+    </p:spTree>
+    <p:extLst>
+      <p:ext uri="{BB962C8B-B14F-4D97-AF65-F5344CB8AC3E}">
+        <p14:creationId xmlns:p14="http://schemas.microsoft.com/office/powerpoint/2010/main" val="810752750"/>
+      </p:ext>
+    </p:extLst>
+  </p:cSld>
+  <p:clrMapOvr>
+    <a:masterClrMapping/>
+  </p:clrMapOvr>
+</p:sld>
+</file>
+
+<file path=ppt/slides/slide2.xml><?xml version="1.0" encoding="utf-8"?>
+<p:sld xmlns:a="http://schemas.openxmlformats.org/drawingml/2006/main" xmlns:r="http://schemas.openxmlformats.org/officeDocument/2006/relationships" xmlns:p="http://schemas.openxmlformats.org/presentationml/2006/main">
+  <p:cSld>
+    <p:spTree>
+      <p:nvGrpSpPr>
+        <p:cNvPr id="1" name=""/>
+        <p:cNvGrpSpPr/>
+        <p:nvPr/>
+      </p:nvGrpSpPr>
+      <p:grpSpPr>
+        <a:xfrm>
+          <a:off x="0" y="0"/>
+          <a:ext cx="0" cy="0"/>
+          <a:chOff x="0" y="0"/>
+          <a:chExt cx="0" cy="0"/>
+        </a:xfrm>
+      </p:grpSpPr>
+      <p:sp>
+        <p:nvSpPr>
+          <p:cNvPr id="3" name="내용 개체 틀 2"/>
+          <p:cNvSpPr>
+            <a:spLocks noGrp="1"/>
+          </p:cNvSpPr>
+          <p:nvPr>
+            <p:ph sz="quarter" idx="13"/>
+          </p:nvPr>
+        </p:nvSpPr>
+        <p:spPr>
+          <a:xfrm>
+            <a:off x="457200" y="2018120"/>
+            <a:ext cx="8229600" cy="4075176"/>
+          </a:xfrm>
+        </p:spPr>
+        <p:txBody>
+          <a:bodyPr>
+            <a:normAutofit lnSpcReduction="10000"/>
+          </a:bodyPr>
+          <a:lstStyle/>
+          <a:p>
+            <a:pPr algn="l"/>
+            <a:r>
+              <a:rPr lang="en-US" altLang="ko-KR" dirty="0" smtClean="0"/>
+              <a:t>◦ “</a:t>
+            </a:r>
+            <a:r>
+              <a:rPr lang="en-US" altLang="ko-KR" dirty="0" err="1" smtClean="0"/>
+              <a:t>Databas</a:t>
+            </a:r>
+            <a:r>
+              <a:rPr lang="ko-KR" altLang="en-US" dirty="0" smtClean="0"/>
+              <a:t>에 저장된 </a:t>
+            </a:r>
+            <a:r>
+              <a:rPr lang="ko-KR" altLang="en-US" dirty="0" err="1" smtClean="0"/>
+              <a:t>몬스터헌터</a:t>
+            </a:r>
+            <a:r>
+              <a:rPr lang="ko-KR" altLang="en-US" dirty="0" smtClean="0"/>
+              <a:t> 월드의 무기 데이터</a:t>
+            </a:r>
+            <a:r>
+              <a:rPr lang="en-US" altLang="ko-KR" dirty="0" smtClean="0"/>
+              <a:t>”</a:t>
+            </a:r>
+          </a:p>
+          <a:p>
+            <a:pPr algn="l"/>
+            <a:r>
+              <a:rPr lang="en-US" altLang="ko-KR" dirty="0"/>
+              <a:t>	</a:t>
+            </a:r>
+            <a:r>
+              <a:rPr lang="en-US" altLang="ko-KR" dirty="0" smtClean="0"/>
+              <a:t>(</a:t>
+            </a:r>
+            <a:r>
+              <a:rPr lang="ko-KR" altLang="en-US" dirty="0" smtClean="0"/>
+              <a:t>이하 </a:t>
+            </a:r>
+            <a:r>
+              <a:rPr lang="en-US" altLang="ko-KR" dirty="0" smtClean="0"/>
+              <a:t>“</a:t>
+            </a:r>
+            <a:r>
+              <a:rPr lang="ko-KR" altLang="en-US" b="1" dirty="0" err="1" smtClean="0"/>
+              <a:t>몬헌</a:t>
+            </a:r>
+            <a:r>
+              <a:rPr lang="ko-KR" altLang="en-US" b="1" dirty="0" smtClean="0"/>
+              <a:t> 데이터</a:t>
+            </a:r>
+            <a:r>
+              <a:rPr lang="en-US" altLang="ko-KR" dirty="0" smtClean="0"/>
+              <a:t>”)</a:t>
+            </a:r>
+            <a:r>
+              <a:rPr lang="ko-KR" altLang="en-US" dirty="0" smtClean="0"/>
+              <a:t>를 검색 할 수 있다</a:t>
+            </a:r>
+            <a:r>
+              <a:rPr lang="en-US" altLang="ko-KR" dirty="0" smtClean="0"/>
+              <a:t>.</a:t>
+            </a:r>
+          </a:p>
+          <a:p>
+            <a:pPr algn="l"/>
+            <a:endParaRPr lang="en-US" altLang="ko-KR" dirty="0"/>
+          </a:p>
+          <a:p>
+            <a:pPr algn="l"/>
+            <a:r>
+              <a:rPr lang="en-US" altLang="ko-KR" dirty="0" smtClean="0"/>
+              <a:t>◦ “</a:t>
+            </a:r>
+            <a:r>
+              <a:rPr lang="ko-KR" altLang="en-US" dirty="0" err="1" smtClean="0"/>
+              <a:t>몬헌</a:t>
+            </a:r>
+            <a:r>
+              <a:rPr lang="ko-KR" altLang="en-US" dirty="0" smtClean="0"/>
+              <a:t> 데이터</a:t>
+            </a:r>
+            <a:r>
+              <a:rPr lang="en-US" altLang="ko-KR" dirty="0" smtClean="0"/>
+              <a:t>”</a:t>
+            </a:r>
+            <a:r>
+              <a:rPr lang="ko-KR" altLang="en-US" dirty="0" smtClean="0"/>
+              <a:t>는 관리자에 의해서만 입력가능 하며</a:t>
+            </a:r>
+            <a:r>
+              <a:rPr lang="en-US" altLang="ko-KR" dirty="0" smtClean="0"/>
+              <a:t>, </a:t>
+            </a:r>
+          </a:p>
+          <a:p>
+            <a:pPr algn="l"/>
+            <a:r>
+              <a:rPr lang="en-US" altLang="ko-KR" dirty="0">
+                <a:solidFill>
+                  <a:srgbClr val="FF0000"/>
+                </a:solidFill>
+              </a:rPr>
+              <a:t>	</a:t>
+            </a:r>
+            <a:r>
+              <a:rPr lang="ko-KR" altLang="en-US" dirty="0" smtClean="0">
+                <a:solidFill>
+                  <a:srgbClr val="FF0000"/>
+                </a:solidFill>
+              </a:rPr>
+              <a:t>사용자</a:t>
+            </a:r>
+            <a:r>
+              <a:rPr lang="ko-KR" altLang="en-US" dirty="0" smtClean="0"/>
+              <a:t>는 </a:t>
+            </a:r>
+            <a:r>
+              <a:rPr lang="en-US" altLang="ko-KR" dirty="0" smtClean="0"/>
+              <a:t>“</a:t>
+            </a:r>
+            <a:r>
+              <a:rPr lang="ko-KR" altLang="en-US" dirty="0" err="1" smtClean="0"/>
+              <a:t>몬헌</a:t>
+            </a:r>
+            <a:r>
+              <a:rPr lang="ko-KR" altLang="en-US" dirty="0" smtClean="0"/>
+              <a:t> 데이터</a:t>
+            </a:r>
+            <a:r>
+              <a:rPr lang="en-US" altLang="ko-KR" dirty="0" smtClean="0"/>
+              <a:t>”</a:t>
+            </a:r>
+            <a:r>
+              <a:rPr lang="ko-KR" altLang="en-US" dirty="0" smtClean="0"/>
+              <a:t> </a:t>
+            </a:r>
+            <a:r>
+              <a:rPr lang="ko-KR" altLang="en-US" dirty="0" smtClean="0">
+                <a:solidFill>
+                  <a:srgbClr val="FF0000"/>
+                </a:solidFill>
+              </a:rPr>
+              <a:t>추가</a:t>
+            </a:r>
+            <a:r>
+              <a:rPr lang="en-US" altLang="ko-KR" dirty="0" smtClean="0"/>
+              <a:t>/</a:t>
+            </a:r>
+            <a:r>
+              <a:rPr lang="ko-KR" altLang="en-US" dirty="0" smtClean="0">
+                <a:solidFill>
+                  <a:srgbClr val="FF0000"/>
+                </a:solidFill>
+              </a:rPr>
+              <a:t>갱신</a:t>
+            </a:r>
+            <a:r>
+              <a:rPr lang="ko-KR" altLang="en-US" dirty="0" smtClean="0"/>
+              <a:t> 이 </a:t>
+            </a:r>
+            <a:r>
+              <a:rPr lang="ko-KR" altLang="en-US" dirty="0" smtClean="0">
+                <a:solidFill>
+                  <a:srgbClr val="FF0000"/>
+                </a:solidFill>
+              </a:rPr>
+              <a:t>불가능</a:t>
+            </a:r>
+            <a:r>
+              <a:rPr lang="ko-KR" altLang="en-US" dirty="0" smtClean="0"/>
+              <a:t> 하다</a:t>
+            </a:r>
+            <a:r>
+              <a:rPr lang="en-US" altLang="ko-KR" dirty="0" smtClean="0"/>
+              <a:t>.</a:t>
+            </a:r>
+          </a:p>
+          <a:p>
+            <a:pPr algn="l"/>
+            <a:endParaRPr lang="en-US" altLang="ko-KR" dirty="0"/>
+          </a:p>
+          <a:p>
+            <a:pPr algn="l"/>
+            <a:r>
+              <a:rPr lang="en-US" altLang="ko-KR" dirty="0" smtClean="0"/>
+              <a:t>◦ </a:t>
+            </a:r>
+            <a:r>
+              <a:rPr lang="ko-KR" altLang="en-US" dirty="0" smtClean="0">
+                <a:solidFill>
+                  <a:srgbClr val="FF0000"/>
+                </a:solidFill>
+              </a:rPr>
+              <a:t>사용자</a:t>
+            </a:r>
+            <a:r>
+              <a:rPr lang="ko-KR" altLang="en-US" dirty="0" smtClean="0"/>
+              <a:t>는 </a:t>
+            </a:r>
+            <a:r>
+              <a:rPr lang="en-US" altLang="ko-KR" dirty="0" smtClean="0"/>
+              <a:t>“</a:t>
+            </a:r>
+            <a:r>
+              <a:rPr lang="ko-KR" altLang="en-US" dirty="0" err="1" smtClean="0"/>
+              <a:t>몬헌</a:t>
+            </a:r>
+            <a:r>
+              <a:rPr lang="ko-KR" altLang="en-US" dirty="0" smtClean="0"/>
+              <a:t> 데이터</a:t>
+            </a:r>
+            <a:r>
+              <a:rPr lang="en-US" altLang="ko-KR" dirty="0" smtClean="0"/>
+              <a:t>”</a:t>
+            </a:r>
+            <a:r>
+              <a:rPr lang="ko-KR" altLang="en-US" dirty="0" smtClean="0"/>
+              <a:t>를 </a:t>
+            </a:r>
+            <a:r>
+              <a:rPr lang="ko-KR" altLang="en-US" dirty="0" smtClean="0">
+                <a:solidFill>
+                  <a:srgbClr val="FF0000"/>
+                </a:solidFill>
+              </a:rPr>
+              <a:t>검색</a:t>
+            </a:r>
+            <a:r>
+              <a:rPr lang="en-US" altLang="ko-KR" dirty="0"/>
+              <a:t> </a:t>
+            </a:r>
+            <a:r>
+              <a:rPr lang="ko-KR" altLang="en-US" dirty="0" smtClean="0"/>
+              <a:t>및 </a:t>
+            </a:r>
+            <a:r>
+              <a:rPr lang="ko-KR" altLang="en-US" dirty="0" err="1" smtClean="0">
+                <a:solidFill>
+                  <a:srgbClr val="FF0000"/>
+                </a:solidFill>
+              </a:rPr>
+              <a:t>즐겨찾기</a:t>
+            </a:r>
+            <a:r>
+              <a:rPr lang="ko-KR" altLang="en-US" dirty="0" smtClean="0"/>
+              <a:t> 추가</a:t>
+            </a:r>
+            <a:r>
+              <a:rPr lang="en-US" altLang="ko-KR" dirty="0" smtClean="0"/>
+              <a:t>/</a:t>
+            </a:r>
+            <a:r>
+              <a:rPr lang="ko-KR" altLang="en-US" dirty="0" smtClean="0"/>
+              <a:t>삭제 를 할 수 있다</a:t>
+            </a:r>
+            <a:r>
+              <a:rPr lang="en-US" altLang="ko-KR" dirty="0" smtClean="0"/>
+              <a:t>.</a:t>
+            </a:r>
+          </a:p>
+          <a:p>
+            <a:pPr algn="l"/>
+            <a:endParaRPr lang="en-US" altLang="ko-KR" dirty="0"/>
+          </a:p>
+          <a:p>
+            <a:pPr algn="l"/>
+            <a:r>
+              <a:rPr lang="en-US" altLang="ko-KR" dirty="0" smtClean="0"/>
+              <a:t>◦ “</a:t>
+            </a:r>
+            <a:r>
+              <a:rPr lang="ko-KR" altLang="en-US" dirty="0" err="1" smtClean="0"/>
+              <a:t>몬헌</a:t>
+            </a:r>
+            <a:r>
+              <a:rPr lang="ko-KR" altLang="en-US" dirty="0" smtClean="0"/>
+              <a:t> 데이터</a:t>
+            </a:r>
+            <a:r>
+              <a:rPr lang="en-US" altLang="ko-KR" dirty="0" smtClean="0"/>
+              <a:t>”</a:t>
+            </a:r>
+            <a:r>
+              <a:rPr lang="ko-KR" altLang="en-US" dirty="0" smtClean="0"/>
+              <a:t>에는</a:t>
+            </a:r>
+            <a:endParaRPr lang="en-US" altLang="ko-KR" dirty="0" smtClean="0"/>
+          </a:p>
+          <a:p>
+            <a:pPr algn="l"/>
+            <a:r>
+              <a:rPr lang="en-US" altLang="ko-KR" dirty="0"/>
+              <a:t>	</a:t>
+            </a:r>
+            <a:r>
+              <a:rPr lang="ko-KR" altLang="en-US" dirty="0" smtClean="0"/>
+              <a:t>이름</a:t>
+            </a:r>
+            <a:r>
+              <a:rPr lang="en-US" altLang="ko-KR" dirty="0" smtClean="0"/>
+              <a:t>, </a:t>
+            </a:r>
+            <a:r>
+              <a:rPr lang="ko-KR" altLang="en-US" dirty="0" smtClean="0"/>
+              <a:t>무기종류</a:t>
+            </a:r>
+            <a:r>
+              <a:rPr lang="en-US" altLang="ko-KR" dirty="0" smtClean="0"/>
+              <a:t>, </a:t>
+            </a:r>
+            <a:r>
+              <a:rPr lang="ko-KR" altLang="en-US" dirty="0" smtClean="0"/>
+              <a:t>공격력</a:t>
+            </a:r>
+            <a:r>
+              <a:rPr lang="en-US" altLang="ko-KR" dirty="0" smtClean="0"/>
+              <a:t>, </a:t>
+            </a:r>
+            <a:r>
+              <a:rPr lang="ko-KR" altLang="en-US" dirty="0" err="1" smtClean="0"/>
+              <a:t>치명률</a:t>
+            </a:r>
+            <a:r>
+              <a:rPr lang="en-US" altLang="ko-KR" dirty="0" smtClean="0"/>
+              <a:t>, </a:t>
+            </a:r>
+            <a:r>
+              <a:rPr lang="ko-KR" altLang="en-US" dirty="0" smtClean="0"/>
+              <a:t>등급</a:t>
+            </a:r>
+            <a:r>
+              <a:rPr lang="en-US" altLang="ko-KR" dirty="0" smtClean="0"/>
+              <a:t>, </a:t>
+            </a:r>
+            <a:r>
+              <a:rPr lang="ko-KR" altLang="en-US" dirty="0" smtClean="0"/>
+              <a:t>속성</a:t>
+            </a:r>
+            <a:r>
+              <a:rPr lang="en-US" altLang="ko-KR" dirty="0" smtClean="0"/>
+              <a:t>, </a:t>
+            </a:r>
+            <a:r>
+              <a:rPr lang="ko-KR" altLang="en-US" dirty="0" smtClean="0"/>
+              <a:t>속성값</a:t>
+            </a:r>
+            <a:r>
+              <a:rPr lang="en-US" altLang="ko-KR" dirty="0" smtClean="0"/>
+              <a:t>, </a:t>
+            </a:r>
+            <a:r>
+              <a:rPr lang="ko-KR" altLang="en-US" dirty="0" smtClean="0"/>
+              <a:t>슬롯</a:t>
+            </a:r>
+            <a:r>
+              <a:rPr lang="en-US" altLang="ko-KR" dirty="0" smtClean="0"/>
+              <a:t>3</a:t>
+            </a:r>
+            <a:r>
+              <a:rPr lang="ko-KR" altLang="en-US" dirty="0" smtClean="0"/>
+              <a:t>개</a:t>
+            </a:r>
+            <a:r>
+              <a:rPr lang="en-US" altLang="ko-KR" dirty="0" smtClean="0"/>
+              <a:t>, </a:t>
+            </a:r>
+          </a:p>
+          <a:p>
+            <a:pPr algn="l"/>
+            <a:r>
+              <a:rPr lang="en-US" altLang="ko-KR" dirty="0"/>
+              <a:t>	</a:t>
+            </a:r>
+            <a:r>
+              <a:rPr lang="ko-KR" altLang="en-US" dirty="0" smtClean="0"/>
+              <a:t>제작 재료</a:t>
+            </a:r>
+            <a:r>
+              <a:rPr lang="en-US" altLang="ko-KR" dirty="0" smtClean="0"/>
+              <a:t>, </a:t>
+            </a:r>
+            <a:r>
+              <a:rPr lang="ko-KR" altLang="en-US" dirty="0" err="1" smtClean="0"/>
+              <a:t>트리종류</a:t>
+            </a:r>
+            <a:r>
+              <a:rPr lang="en-US" altLang="ko-KR" dirty="0" smtClean="0"/>
+              <a:t>, </a:t>
+            </a:r>
+            <a:r>
+              <a:rPr lang="ko-KR" altLang="en-US" dirty="0" smtClean="0"/>
+              <a:t>예리도 에 대한 정보를 가진다</a:t>
+            </a:r>
+            <a:r>
+              <a:rPr lang="en-US" altLang="ko-KR" dirty="0" smtClean="0"/>
+              <a:t>.</a:t>
+            </a:r>
+            <a:endParaRPr lang="ko-KR" altLang="en-US" dirty="0"/>
+          </a:p>
+        </p:txBody>
+      </p:sp>
+      <p:sp>
+        <p:nvSpPr>
+          <p:cNvPr id="2" name="제목 1"/>
+          <p:cNvSpPr>
+            <a:spLocks noGrp="1"/>
+          </p:cNvSpPr>
+          <p:nvPr>
+            <p:ph type="title"/>
+          </p:nvPr>
+        </p:nvSpPr>
+        <p:spPr/>
+        <p:txBody>
+          <a:bodyPr/>
+          <a:lstStyle/>
+          <a:p>
+            <a:r>
+              <a:rPr lang="en-US" altLang="ko-KR" dirty="0" smtClean="0"/>
+              <a:t>1. </a:t>
+            </a:r>
+            <a:r>
+              <a:rPr lang="ko-KR" altLang="en-US" dirty="0" smtClean="0"/>
+              <a:t>요구사항 분석</a:t>
+            </a:r>
+            <a:endParaRPr lang="ko-KR" altLang="en-US" dirty="0"/>
+          </a:p>
+        </p:txBody>
+      </p:sp>
+    </p:spTree>
+    <p:extLst>
+      <p:ext uri="{BB962C8B-B14F-4D97-AF65-F5344CB8AC3E}">
+        <p14:creationId xmlns:p14="http://schemas.microsoft.com/office/powerpoint/2010/main" val="63538549"/>
+      </p:ext>
+    </p:extLst>
+  </p:cSld>
+  <p:clrMapOvr>
+    <a:masterClrMapping/>
+  </p:clrMapOvr>
+  <p:timing>
+    <p:tnLst>
+      <p:par>
+        <p:cTn id="1" dur="indefinite" restart="never" nodeType="tmRoot"/>
+      </p:par>
+    </p:tnLst>
+  </p:timing>
+</p:sld>
+</file>
+
+<file path=ppt/slides/slide20.xml><?xml version="1.0" encoding="utf-8"?>
+<p:sld xmlns:a="http://schemas.openxmlformats.org/drawingml/2006/main" xmlns:r="http://schemas.openxmlformats.org/officeDocument/2006/relationships" xmlns:p="http://schemas.openxmlformats.org/presentationml/2006/main">
+  <p:cSld>
+    <p:spTree>
+      <p:nvGrpSpPr>
+        <p:cNvPr id="1" name=""/>
+        <p:cNvGrpSpPr/>
+        <p:nvPr/>
+      </p:nvGrpSpPr>
+      <p:grpSpPr>
+        <a:xfrm>
+          <a:off x="0" y="0"/>
+          <a:ext cx="0" cy="0"/>
+          <a:chOff x="0" y="0"/>
+          <a:chExt cx="0" cy="0"/>
+        </a:xfrm>
+      </p:grpSpPr>
+      <p:sp>
+        <p:nvSpPr>
+          <p:cNvPr id="3" name="제목 2"/>
+          <p:cNvSpPr>
+            <a:spLocks noGrp="1"/>
+          </p:cNvSpPr>
+          <p:nvPr>
+            <p:ph type="title"/>
+          </p:nvPr>
+        </p:nvSpPr>
+        <p:spPr/>
+        <p:txBody>
+          <a:bodyPr/>
+          <a:lstStyle/>
+          <a:p>
+            <a:r>
+              <a:rPr lang="ko-KR" altLang="en-US" dirty="0" smtClean="0"/>
+              <a:t>제작 환경</a:t>
+            </a:r>
+            <a:endParaRPr lang="ko-KR" altLang="en-US" dirty="0"/>
+          </a:p>
+        </p:txBody>
+      </p:sp>
+      <p:sp>
+        <p:nvSpPr>
+          <p:cNvPr id="5" name="TextBox 4"/>
+          <p:cNvSpPr txBox="1"/>
+          <p:nvPr/>
+        </p:nvSpPr>
+        <p:spPr>
+          <a:xfrm>
+            <a:off x="2915816" y="2848868"/>
+            <a:ext cx="3404073" cy="2308324"/>
+          </a:xfrm>
+          <a:prstGeom prst="rect">
+            <a:avLst/>
+          </a:prstGeom>
+          <a:noFill/>
         </p:spPr>
         <p:txBody>
           <a:bodyPr wrap="none" rtlCol="0">
@@ -6444,8 +7213,8 @@
               <a:buAutoNum type="arabicPeriod"/>
             </a:pPr>
             <a:r>
-              <a:rPr lang="en-US" altLang="ko-KR" sz="2400" dirty="0" err="1" smtClean="0"/>
-              <a:t>Rapter</a:t>
+              <a:rPr lang="en-US" altLang="ko-KR" sz="2400" dirty="0" smtClean="0"/>
+              <a:t>Raptor</a:t>
             </a:r>
             <a:endParaRPr lang="en-US" altLang="ko-KR" sz="2400" dirty="0" smtClean="0"/>
           </a:p>
@@ -6474,7 +7243,7 @@
 </p:sld>
 </file>
 
-<file path=ppt/slides/slide19.xml><?xml version="1.0" encoding="utf-8"?>
+<file path=ppt/slides/slide21.xml><?xml version="1.0" encoding="utf-8"?>
 <p:sld xmlns:a="http://schemas.openxmlformats.org/drawingml/2006/main" xmlns:r="http://schemas.openxmlformats.org/officeDocument/2006/relationships" xmlns:p="http://schemas.openxmlformats.org/presentationml/2006/main">
   <p:cSld>
     <p:spTree>
@@ -6523,495 +7292,6 @@
     <p:extLst>
       <p:ext uri="{BB962C8B-B14F-4D97-AF65-F5344CB8AC3E}">
         <p14:creationId xmlns:p14="http://schemas.microsoft.com/office/powerpoint/2010/main" val="4217521131"/>
-      </p:ext>
-    </p:extLst>
-  </p:cSld>
-  <p:clrMapOvr>
-    <a:masterClrMapping/>
-  </p:clrMapOvr>
-  <p:timing>
-    <p:tnLst>
-      <p:par>
-        <p:cTn id="1" dur="indefinite" restart="never" nodeType="tmRoot"/>
-      </p:par>
-    </p:tnLst>
-  </p:timing>
-</p:sld>
-</file>
-
-<file path=ppt/slides/slide2.xml><?xml version="1.0" encoding="utf-8"?>
-<p:sld xmlns:a="http://schemas.openxmlformats.org/drawingml/2006/main" xmlns:r="http://schemas.openxmlformats.org/officeDocument/2006/relationships" xmlns:p="http://schemas.openxmlformats.org/presentationml/2006/main">
-  <p:cSld>
-    <p:spTree>
-      <p:nvGrpSpPr>
-        <p:cNvPr id="1" name=""/>
-        <p:cNvGrpSpPr/>
-        <p:nvPr/>
-      </p:nvGrpSpPr>
-      <p:grpSpPr>
-        <a:xfrm>
-          <a:off x="0" y="0"/>
-          <a:ext cx="0" cy="0"/>
-          <a:chOff x="0" y="0"/>
-          <a:chExt cx="0" cy="0"/>
-        </a:xfrm>
-      </p:grpSpPr>
-      <p:sp>
-        <p:nvSpPr>
-          <p:cNvPr id="3" name="내용 개체 틀 2"/>
-          <p:cNvSpPr>
-            <a:spLocks noGrp="1"/>
-          </p:cNvSpPr>
-          <p:nvPr>
-            <p:ph sz="quarter" idx="13"/>
-          </p:nvPr>
-        </p:nvSpPr>
-        <p:spPr>
-          <a:xfrm>
-            <a:off x="457200" y="2018120"/>
-            <a:ext cx="8229600" cy="4075176"/>
-          </a:xfrm>
-        </p:spPr>
-        <p:txBody>
-          <a:bodyPr>
-            <a:normAutofit lnSpcReduction="10000"/>
-          </a:bodyPr>
-          <a:lstStyle/>
-          <a:p>
-            <a:pPr algn="l"/>
-            <a:r>
-              <a:rPr lang="en-US" altLang="ko-KR" dirty="0" smtClean="0"/>
-              <a:t>◦ “</a:t>
-            </a:r>
-            <a:r>
-              <a:rPr lang="en-US" altLang="ko-KR" dirty="0" err="1" smtClean="0"/>
-              <a:t>Databas</a:t>
-            </a:r>
-            <a:r>
-              <a:rPr lang="ko-KR" altLang="en-US" dirty="0" smtClean="0"/>
-              <a:t>에 저장된 </a:t>
-            </a:r>
-            <a:r>
-              <a:rPr lang="ko-KR" altLang="en-US" dirty="0" err="1" smtClean="0"/>
-              <a:t>몬스터헌터</a:t>
-            </a:r>
-            <a:r>
-              <a:rPr lang="ko-KR" altLang="en-US" dirty="0" smtClean="0"/>
-              <a:t> 월드의 무기 데이터</a:t>
-            </a:r>
-            <a:r>
-              <a:rPr lang="en-US" altLang="ko-KR" dirty="0" smtClean="0"/>
-              <a:t>”</a:t>
-            </a:r>
-          </a:p>
-          <a:p>
-            <a:pPr algn="l"/>
-            <a:r>
-              <a:rPr lang="en-US" altLang="ko-KR" dirty="0"/>
-              <a:t>	</a:t>
-            </a:r>
-            <a:r>
-              <a:rPr lang="en-US" altLang="ko-KR" dirty="0" smtClean="0"/>
-              <a:t>(</a:t>
-            </a:r>
-            <a:r>
-              <a:rPr lang="ko-KR" altLang="en-US" dirty="0" smtClean="0"/>
-              <a:t>이하 </a:t>
-            </a:r>
-            <a:r>
-              <a:rPr lang="en-US" altLang="ko-KR" dirty="0" smtClean="0"/>
-              <a:t>“</a:t>
-            </a:r>
-            <a:r>
-              <a:rPr lang="ko-KR" altLang="en-US" b="1" dirty="0" err="1" smtClean="0"/>
-              <a:t>몬헌</a:t>
-            </a:r>
-            <a:r>
-              <a:rPr lang="ko-KR" altLang="en-US" b="1" dirty="0" smtClean="0"/>
-              <a:t> 데이터</a:t>
-            </a:r>
-            <a:r>
-              <a:rPr lang="en-US" altLang="ko-KR" dirty="0" smtClean="0"/>
-              <a:t>”)</a:t>
-            </a:r>
-            <a:r>
-              <a:rPr lang="ko-KR" altLang="en-US" dirty="0" smtClean="0"/>
-              <a:t>를 검색 할 수 있다</a:t>
-            </a:r>
-            <a:r>
-              <a:rPr lang="en-US" altLang="ko-KR" dirty="0" smtClean="0"/>
-              <a:t>.</a:t>
-            </a:r>
-          </a:p>
-          <a:p>
-            <a:pPr algn="l"/>
-            <a:endParaRPr lang="en-US" altLang="ko-KR" dirty="0"/>
-          </a:p>
-          <a:p>
-            <a:pPr algn="l"/>
-            <a:r>
-              <a:rPr lang="en-US" altLang="ko-KR" dirty="0" smtClean="0"/>
-              <a:t>◦ “</a:t>
-            </a:r>
-            <a:r>
-              <a:rPr lang="ko-KR" altLang="en-US" dirty="0" err="1" smtClean="0"/>
-              <a:t>몬헌</a:t>
-            </a:r>
-            <a:r>
-              <a:rPr lang="ko-KR" altLang="en-US" dirty="0" smtClean="0"/>
-              <a:t> 데이터</a:t>
-            </a:r>
-            <a:r>
-              <a:rPr lang="en-US" altLang="ko-KR" dirty="0" smtClean="0"/>
-              <a:t>”</a:t>
-            </a:r>
-            <a:r>
-              <a:rPr lang="ko-KR" altLang="en-US" dirty="0" smtClean="0"/>
-              <a:t>는 관리자에 의해서만 입력가능 하며</a:t>
-            </a:r>
-            <a:r>
-              <a:rPr lang="en-US" altLang="ko-KR" dirty="0" smtClean="0"/>
-              <a:t>, </a:t>
-            </a:r>
-          </a:p>
-          <a:p>
-            <a:pPr algn="l"/>
-            <a:r>
-              <a:rPr lang="en-US" altLang="ko-KR" dirty="0">
-                <a:solidFill>
-                  <a:srgbClr val="FF0000"/>
-                </a:solidFill>
-              </a:rPr>
-              <a:t>	</a:t>
-            </a:r>
-            <a:r>
-              <a:rPr lang="ko-KR" altLang="en-US" dirty="0" smtClean="0">
-                <a:solidFill>
-                  <a:srgbClr val="FF0000"/>
-                </a:solidFill>
-              </a:rPr>
-              <a:t>사용자</a:t>
-            </a:r>
-            <a:r>
-              <a:rPr lang="ko-KR" altLang="en-US" dirty="0" smtClean="0"/>
-              <a:t>는 </a:t>
-            </a:r>
-            <a:r>
-              <a:rPr lang="en-US" altLang="ko-KR" dirty="0" smtClean="0"/>
-              <a:t>“</a:t>
-            </a:r>
-            <a:r>
-              <a:rPr lang="ko-KR" altLang="en-US" dirty="0" err="1" smtClean="0"/>
-              <a:t>몬헌</a:t>
-            </a:r>
-            <a:r>
-              <a:rPr lang="ko-KR" altLang="en-US" dirty="0" smtClean="0"/>
-              <a:t> 데이터</a:t>
-            </a:r>
-            <a:r>
-              <a:rPr lang="en-US" altLang="ko-KR" dirty="0" smtClean="0"/>
-              <a:t>”</a:t>
-            </a:r>
-            <a:r>
-              <a:rPr lang="ko-KR" altLang="en-US" dirty="0" smtClean="0"/>
-              <a:t> </a:t>
-            </a:r>
-            <a:r>
-              <a:rPr lang="ko-KR" altLang="en-US" dirty="0" smtClean="0">
-                <a:solidFill>
-                  <a:srgbClr val="FF0000"/>
-                </a:solidFill>
-              </a:rPr>
-              <a:t>추가</a:t>
-            </a:r>
-            <a:r>
-              <a:rPr lang="en-US" altLang="ko-KR" dirty="0" smtClean="0"/>
-              <a:t>/</a:t>
-            </a:r>
-            <a:r>
-              <a:rPr lang="ko-KR" altLang="en-US" dirty="0" smtClean="0">
-                <a:solidFill>
-                  <a:srgbClr val="FF0000"/>
-                </a:solidFill>
-              </a:rPr>
-              <a:t>갱신</a:t>
-            </a:r>
-            <a:r>
-              <a:rPr lang="ko-KR" altLang="en-US" dirty="0" smtClean="0"/>
-              <a:t> 이 </a:t>
-            </a:r>
-            <a:r>
-              <a:rPr lang="ko-KR" altLang="en-US" dirty="0" smtClean="0">
-                <a:solidFill>
-                  <a:srgbClr val="FF0000"/>
-                </a:solidFill>
-              </a:rPr>
-              <a:t>불가능</a:t>
-            </a:r>
-            <a:r>
-              <a:rPr lang="ko-KR" altLang="en-US" dirty="0" smtClean="0"/>
-              <a:t> 하다</a:t>
-            </a:r>
-            <a:r>
-              <a:rPr lang="en-US" altLang="ko-KR" dirty="0" smtClean="0"/>
-              <a:t>.</a:t>
-            </a:r>
-          </a:p>
-          <a:p>
-            <a:pPr algn="l"/>
-            <a:endParaRPr lang="en-US" altLang="ko-KR" dirty="0"/>
-          </a:p>
-          <a:p>
-            <a:pPr algn="l"/>
-            <a:r>
-              <a:rPr lang="en-US" altLang="ko-KR" dirty="0" smtClean="0"/>
-              <a:t>◦ </a:t>
-            </a:r>
-            <a:r>
-              <a:rPr lang="ko-KR" altLang="en-US" dirty="0" smtClean="0">
-                <a:solidFill>
-                  <a:srgbClr val="FF0000"/>
-                </a:solidFill>
-              </a:rPr>
-              <a:t>사용자</a:t>
-            </a:r>
-            <a:r>
-              <a:rPr lang="ko-KR" altLang="en-US" dirty="0" smtClean="0"/>
-              <a:t>는 </a:t>
-            </a:r>
-            <a:r>
-              <a:rPr lang="en-US" altLang="ko-KR" dirty="0" smtClean="0"/>
-              <a:t>“</a:t>
-            </a:r>
-            <a:r>
-              <a:rPr lang="ko-KR" altLang="en-US" dirty="0" err="1" smtClean="0"/>
-              <a:t>몬헌</a:t>
-            </a:r>
-            <a:r>
-              <a:rPr lang="ko-KR" altLang="en-US" dirty="0" smtClean="0"/>
-              <a:t> 데이터</a:t>
-            </a:r>
-            <a:r>
-              <a:rPr lang="en-US" altLang="ko-KR" dirty="0" smtClean="0"/>
-              <a:t>”</a:t>
-            </a:r>
-            <a:r>
-              <a:rPr lang="ko-KR" altLang="en-US" dirty="0" smtClean="0"/>
-              <a:t>를 </a:t>
-            </a:r>
-            <a:r>
-              <a:rPr lang="ko-KR" altLang="en-US" dirty="0" smtClean="0">
-                <a:solidFill>
-                  <a:srgbClr val="FF0000"/>
-                </a:solidFill>
-              </a:rPr>
-              <a:t>검색</a:t>
-            </a:r>
-            <a:r>
-              <a:rPr lang="en-US" altLang="ko-KR" dirty="0"/>
-              <a:t> </a:t>
-            </a:r>
-            <a:r>
-              <a:rPr lang="ko-KR" altLang="en-US" dirty="0" smtClean="0"/>
-              <a:t>및 </a:t>
-            </a:r>
-            <a:r>
-              <a:rPr lang="ko-KR" altLang="en-US" dirty="0" err="1" smtClean="0">
-                <a:solidFill>
-                  <a:srgbClr val="FF0000"/>
-                </a:solidFill>
-              </a:rPr>
-              <a:t>즐겨찾기</a:t>
-            </a:r>
-            <a:r>
-              <a:rPr lang="ko-KR" altLang="en-US" dirty="0" smtClean="0"/>
-              <a:t> 추가</a:t>
-            </a:r>
-            <a:r>
-              <a:rPr lang="en-US" altLang="ko-KR" dirty="0" smtClean="0"/>
-              <a:t>/</a:t>
-            </a:r>
-            <a:r>
-              <a:rPr lang="ko-KR" altLang="en-US" dirty="0" smtClean="0"/>
-              <a:t>삭제 를 할 수 있다</a:t>
-            </a:r>
-            <a:r>
-              <a:rPr lang="en-US" altLang="ko-KR" dirty="0" smtClean="0"/>
-              <a:t>.</a:t>
-            </a:r>
-          </a:p>
-          <a:p>
-            <a:pPr algn="l"/>
-            <a:endParaRPr lang="en-US" altLang="ko-KR" dirty="0"/>
-          </a:p>
-          <a:p>
-            <a:pPr algn="l"/>
-            <a:r>
-              <a:rPr lang="en-US" altLang="ko-KR" dirty="0" smtClean="0"/>
-              <a:t>◦ “</a:t>
-            </a:r>
-            <a:r>
-              <a:rPr lang="ko-KR" altLang="en-US" dirty="0" err="1" smtClean="0"/>
-              <a:t>몬헌</a:t>
-            </a:r>
-            <a:r>
-              <a:rPr lang="ko-KR" altLang="en-US" dirty="0" smtClean="0"/>
-              <a:t> 데이터</a:t>
-            </a:r>
-            <a:r>
-              <a:rPr lang="en-US" altLang="ko-KR" dirty="0" smtClean="0"/>
-              <a:t>”</a:t>
-            </a:r>
-            <a:r>
-              <a:rPr lang="ko-KR" altLang="en-US" dirty="0" smtClean="0"/>
-              <a:t>에는</a:t>
-            </a:r>
-            <a:endParaRPr lang="en-US" altLang="ko-KR" dirty="0" smtClean="0"/>
-          </a:p>
-          <a:p>
-            <a:pPr algn="l"/>
-            <a:r>
-              <a:rPr lang="en-US" altLang="ko-KR" dirty="0"/>
-              <a:t>	</a:t>
-            </a:r>
-            <a:r>
-              <a:rPr lang="ko-KR" altLang="en-US" dirty="0" smtClean="0"/>
-              <a:t>이름</a:t>
-            </a:r>
-            <a:r>
-              <a:rPr lang="en-US" altLang="ko-KR" dirty="0" smtClean="0"/>
-              <a:t>, </a:t>
-            </a:r>
-            <a:r>
-              <a:rPr lang="ko-KR" altLang="en-US" dirty="0" smtClean="0"/>
-              <a:t>무기종류</a:t>
-            </a:r>
-            <a:r>
-              <a:rPr lang="en-US" altLang="ko-KR" dirty="0" smtClean="0"/>
-              <a:t>, </a:t>
-            </a:r>
-            <a:r>
-              <a:rPr lang="ko-KR" altLang="en-US" dirty="0" smtClean="0"/>
-              <a:t>공격력</a:t>
-            </a:r>
-            <a:r>
-              <a:rPr lang="en-US" altLang="ko-KR" dirty="0" smtClean="0"/>
-              <a:t>, </a:t>
-            </a:r>
-            <a:r>
-              <a:rPr lang="ko-KR" altLang="en-US" dirty="0" err="1" smtClean="0"/>
-              <a:t>치명률</a:t>
-            </a:r>
-            <a:r>
-              <a:rPr lang="en-US" altLang="ko-KR" dirty="0" smtClean="0"/>
-              <a:t>, </a:t>
-            </a:r>
-            <a:r>
-              <a:rPr lang="ko-KR" altLang="en-US" dirty="0" smtClean="0"/>
-              <a:t>등급</a:t>
-            </a:r>
-            <a:r>
-              <a:rPr lang="en-US" altLang="ko-KR" dirty="0" smtClean="0"/>
-              <a:t>, </a:t>
-            </a:r>
-            <a:r>
-              <a:rPr lang="ko-KR" altLang="en-US" dirty="0" smtClean="0"/>
-              <a:t>속성</a:t>
-            </a:r>
-            <a:r>
-              <a:rPr lang="en-US" altLang="ko-KR" dirty="0" smtClean="0"/>
-              <a:t>, </a:t>
-            </a:r>
-            <a:r>
-              <a:rPr lang="ko-KR" altLang="en-US" dirty="0" smtClean="0"/>
-              <a:t>속성값</a:t>
-            </a:r>
-            <a:r>
-              <a:rPr lang="en-US" altLang="ko-KR" dirty="0" smtClean="0"/>
-              <a:t>, </a:t>
-            </a:r>
-            <a:r>
-              <a:rPr lang="ko-KR" altLang="en-US" dirty="0" smtClean="0"/>
-              <a:t>슬롯</a:t>
-            </a:r>
-            <a:r>
-              <a:rPr lang="en-US" altLang="ko-KR" dirty="0" smtClean="0"/>
-              <a:t>3</a:t>
-            </a:r>
-            <a:r>
-              <a:rPr lang="ko-KR" altLang="en-US" dirty="0" smtClean="0"/>
-              <a:t>개</a:t>
-            </a:r>
-            <a:r>
-              <a:rPr lang="en-US" altLang="ko-KR" dirty="0" smtClean="0"/>
-              <a:t>, </a:t>
-            </a:r>
-          </a:p>
-          <a:p>
-            <a:pPr algn="l"/>
-            <a:r>
-              <a:rPr lang="en-US" altLang="ko-KR" dirty="0"/>
-              <a:t>	</a:t>
-            </a:r>
-            <a:r>
-              <a:rPr lang="ko-KR" altLang="en-US" dirty="0" smtClean="0"/>
-              <a:t>제작 재료</a:t>
-            </a:r>
-            <a:r>
-              <a:rPr lang="en-US" altLang="ko-KR" dirty="0" smtClean="0"/>
-              <a:t>, </a:t>
-            </a:r>
-            <a:r>
-              <a:rPr lang="ko-KR" altLang="en-US" dirty="0" err="1" smtClean="0"/>
-              <a:t>트리종류</a:t>
-            </a:r>
-            <a:r>
-              <a:rPr lang="en-US" altLang="ko-KR" dirty="0" smtClean="0"/>
-              <a:t>, </a:t>
-            </a:r>
-            <a:r>
-              <a:rPr lang="ko-KR" altLang="en-US" dirty="0" smtClean="0"/>
-              <a:t>예리도 에 대한 정보를 가진다</a:t>
-            </a:r>
-            <a:r>
-              <a:rPr lang="en-US" altLang="ko-KR" dirty="0" smtClean="0"/>
-              <a:t>.</a:t>
-            </a:r>
-            <a:endParaRPr lang="ko-KR" altLang="en-US" dirty="0"/>
-          </a:p>
-        </p:txBody>
-      </p:sp>
-      <p:sp>
-        <p:nvSpPr>
-          <p:cNvPr id="2" name="제목 1"/>
-          <p:cNvSpPr>
-            <a:spLocks noGrp="1"/>
-          </p:cNvSpPr>
-          <p:nvPr>
-            <p:ph type="title"/>
-          </p:nvPr>
-        </p:nvSpPr>
-        <p:spPr/>
-        <p:txBody>
-          <a:bodyPr/>
-          <a:lstStyle/>
-          <a:p>
-            <a:r>
-              <a:rPr lang="en-US" altLang="ko-KR" dirty="0" smtClean="0"/>
-              <a:t>1. </a:t>
-            </a:r>
-            <a:r>
-              <a:rPr lang="ko-KR" altLang="en-US" dirty="0" smtClean="0"/>
-              <a:t>요구사항 분석</a:t>
-            </a:r>
-            <a:endParaRPr lang="ko-KR" altLang="en-US" dirty="0"/>
-          </a:p>
-        </p:txBody>
-      </p:sp>
-    </p:spTree>
-    <p:extLst>
-      <p:ext uri="{BB962C8B-B14F-4D97-AF65-F5344CB8AC3E}">
-        <p14:creationId xmlns:p14="http://schemas.microsoft.com/office/powerpoint/2010/main" val="63538549"/>
       </p:ext>
     </p:extLst>
   </p:cSld>

</xml_diff>

<commit_message>
<master> : Fixed project Monster_Hunter Weapons DB ppt
</commit_message>
<xml_diff>
--- a/Java_tutorial/src/project_07_MonsterHunter_Weapon_DB/Monster_Hunter_ppt/몬스터헌터_무기DB.pptx
+++ b/Java_tutorial/src/project_07_MonsterHunter_Weapon_DB/Monster_Hunter_ppt/몬스터헌터_무기DB.pptx
@@ -5,30 +5,31 @@
     <p:sldMasterId id="2147484836" r:id="rId1"/>
   </p:sldMasterIdLst>
   <p:notesMasterIdLst>
-    <p:notesMasterId r:id="rId23"/>
+    <p:notesMasterId r:id="rId24"/>
   </p:notesMasterIdLst>
   <p:sldIdLst>
     <p:sldId id="256" r:id="rId2"/>
     <p:sldId id="257" r:id="rId3"/>
-    <p:sldId id="258" r:id="rId4"/>
-    <p:sldId id="260" r:id="rId5"/>
-    <p:sldId id="259" r:id="rId6"/>
-    <p:sldId id="261" r:id="rId7"/>
-    <p:sldId id="262" r:id="rId8"/>
-    <p:sldId id="263" r:id="rId9"/>
-    <p:sldId id="264" r:id="rId10"/>
-    <p:sldId id="265" r:id="rId11"/>
-    <p:sldId id="266" r:id="rId12"/>
-    <p:sldId id="267" r:id="rId13"/>
-    <p:sldId id="268" r:id="rId14"/>
-    <p:sldId id="269" r:id="rId15"/>
-    <p:sldId id="270" r:id="rId16"/>
-    <p:sldId id="271" r:id="rId17"/>
-    <p:sldId id="272" r:id="rId18"/>
-    <p:sldId id="275" r:id="rId19"/>
-    <p:sldId id="276" r:id="rId20"/>
-    <p:sldId id="273" r:id="rId21"/>
-    <p:sldId id="274" r:id="rId22"/>
+    <p:sldId id="277" r:id="rId4"/>
+    <p:sldId id="258" r:id="rId5"/>
+    <p:sldId id="260" r:id="rId6"/>
+    <p:sldId id="259" r:id="rId7"/>
+    <p:sldId id="261" r:id="rId8"/>
+    <p:sldId id="262" r:id="rId9"/>
+    <p:sldId id="263" r:id="rId10"/>
+    <p:sldId id="264" r:id="rId11"/>
+    <p:sldId id="265" r:id="rId12"/>
+    <p:sldId id="266" r:id="rId13"/>
+    <p:sldId id="267" r:id="rId14"/>
+    <p:sldId id="268" r:id="rId15"/>
+    <p:sldId id="269" r:id="rId16"/>
+    <p:sldId id="270" r:id="rId17"/>
+    <p:sldId id="271" r:id="rId18"/>
+    <p:sldId id="272" r:id="rId19"/>
+    <p:sldId id="275" r:id="rId20"/>
+    <p:sldId id="276" r:id="rId21"/>
+    <p:sldId id="273" r:id="rId22"/>
+    <p:sldId id="274" r:id="rId23"/>
   </p:sldIdLst>
   <p:sldSz cx="9144000" cy="6858000" type="screen4x3"/>
   <p:notesSz cx="6858000" cy="9144000"/>
@@ -4171,41 +4172,9 @@
           <a:chExt cx="0" cy="0"/>
         </a:xfrm>
       </p:grpSpPr>
-      <p:sp>
-        <p:nvSpPr>
-          <p:cNvPr id="4" name="제목 2"/>
-          <p:cNvSpPr>
-            <a:spLocks noGrp="1"/>
-          </p:cNvSpPr>
-          <p:nvPr>
-            <p:ph type="title"/>
-          </p:nvPr>
-        </p:nvSpPr>
-        <p:spPr>
-          <a:xfrm>
-            <a:off x="2514600" y="975360"/>
-            <a:ext cx="4114800" cy="701040"/>
-          </a:xfrm>
-        </p:spPr>
-        <p:txBody>
-          <a:bodyPr/>
-          <a:lstStyle/>
-          <a:p>
-            <a:r>
-              <a:rPr lang="en-US" altLang="ko-KR" dirty="0" smtClean="0"/>
-              <a:t>4. </a:t>
-            </a:r>
-            <a:r>
-              <a:rPr lang="ko-KR" altLang="en-US" dirty="0" smtClean="0"/>
-              <a:t>구현</a:t>
-            </a:r>
-            <a:endParaRPr lang="ko-KR" altLang="en-US" dirty="0"/>
-          </a:p>
-        </p:txBody>
-      </p:sp>
       <p:pic>
         <p:nvPicPr>
-          <p:cNvPr id="5" name="Picture 3"/>
+          <p:cNvPr id="4" name="Picture 2"/>
           <p:cNvPicPr>
             <a:picLocks noChangeAspect="1" noChangeArrowheads="1"/>
           </p:cNvPicPr>
@@ -4226,8 +4195,8 @@
         </p:blipFill>
         <p:spPr bwMode="auto">
           <a:xfrm>
-            <a:off x="323528" y="1916832"/>
-            <a:ext cx="3312368" cy="4609713"/>
+            <a:off x="3131840" y="2060848"/>
+            <a:ext cx="2781300" cy="1323975"/>
           </a:xfrm>
           <a:prstGeom prst="rect">
             <a:avLst/>
@@ -4259,72 +4228,31 @@
       </p:pic>
       <p:sp>
         <p:nvSpPr>
-          <p:cNvPr id="6" name="TextBox 5"/>
-          <p:cNvSpPr txBox="1"/>
-          <p:nvPr/>
+          <p:cNvPr id="5" name="제목 2"/>
+          <p:cNvSpPr>
+            <a:spLocks noGrp="1"/>
+          </p:cNvSpPr>
+          <p:nvPr>
+            <p:ph type="title"/>
+          </p:nvPr>
         </p:nvSpPr>
         <p:spPr>
           <a:xfrm>
-            <a:off x="3851920" y="2204863"/>
-            <a:ext cx="5120504" cy="646331"/>
-          </a:xfrm>
-          <a:prstGeom prst="rect">
-            <a:avLst/>
-          </a:prstGeom>
-          <a:noFill/>
-        </p:spPr>
-        <p:txBody>
-          <a:bodyPr wrap="none" rtlCol="0">
-            <a:spAutoFit/>
-          </a:bodyPr>
+            <a:off x="2514600" y="975360"/>
+            <a:ext cx="4114800" cy="701040"/>
+          </a:xfrm>
+        </p:spPr>
+        <p:txBody>
+          <a:bodyPr/>
           <a:lstStyle/>
           <a:p>
             <a:r>
               <a:rPr lang="en-US" altLang="ko-KR" dirty="0" smtClean="0"/>
-              <a:t>DATABASE</a:t>
+              <a:t>4. </a:t>
             </a:r>
             <a:r>
               <a:rPr lang="ko-KR" altLang="en-US" dirty="0" smtClean="0"/>
-              <a:t>에 </a:t>
-            </a:r>
-            <a:endParaRPr lang="en-US" altLang="ko-KR" dirty="0" smtClean="0"/>
-          </a:p>
-          <a:p>
-            <a:r>
-              <a:rPr lang="en-US" altLang="ko-KR" dirty="0"/>
-              <a:t>	</a:t>
-            </a:r>
-            <a:r>
-              <a:rPr lang="ko-KR" altLang="en-US" dirty="0" smtClean="0"/>
-              <a:t>새로운 </a:t>
-            </a:r>
-            <a:r>
-              <a:rPr lang="en-US" altLang="ko-KR" dirty="0" smtClean="0"/>
-              <a:t>“</a:t>
-            </a:r>
-            <a:r>
-              <a:rPr lang="ko-KR" altLang="en-US" dirty="0" err="1" smtClean="0"/>
-              <a:t>몬헌</a:t>
-            </a:r>
-            <a:r>
-              <a:rPr lang="ko-KR" altLang="en-US" dirty="0" smtClean="0"/>
-              <a:t> 데이터</a:t>
-            </a:r>
-            <a:r>
-              <a:rPr lang="en-US" altLang="ko-KR" dirty="0" smtClean="0"/>
-              <a:t>”</a:t>
-            </a:r>
-            <a:r>
-              <a:rPr lang="ko-KR" altLang="en-US" dirty="0" smtClean="0"/>
-              <a:t>를 </a:t>
-            </a:r>
-            <a:r>
-              <a:rPr lang="en-US" altLang="ko-KR" dirty="0" smtClean="0"/>
-              <a:t>INSERT </a:t>
-            </a:r>
-            <a:r>
-              <a:rPr lang="ko-KR" altLang="en-US" dirty="0" smtClean="0"/>
-              <a:t>합니다</a:t>
+              <a:t>구현</a:t>
             </a:r>
             <a:endParaRPr lang="ko-KR" altLang="en-US" dirty="0"/>
           </a:p>
@@ -4332,7 +4260,7 @@
       </p:sp>
       <p:pic>
         <p:nvPicPr>
-          <p:cNvPr id="9218" name="Picture 2"/>
+          <p:cNvPr id="8194" name="Picture 2"/>
           <p:cNvPicPr>
             <a:picLocks noChangeAspect="1" noChangeArrowheads="1"/>
           </p:cNvPicPr>
@@ -4353,8 +4281,8 @@
         </p:blipFill>
         <p:spPr bwMode="auto">
           <a:xfrm>
-            <a:off x="5436096" y="4902667"/>
-            <a:ext cx="2476500" cy="1066800"/>
+            <a:off x="6156176" y="3544641"/>
+            <a:ext cx="2476500" cy="1095375"/>
           </a:xfrm>
           <a:prstGeom prst="rect">
             <a:avLst/>
@@ -4386,7 +4314,7 @@
       </p:pic>
       <p:pic>
         <p:nvPicPr>
-          <p:cNvPr id="9219" name="Picture 3"/>
+          <p:cNvPr id="8195" name="Picture 3"/>
           <p:cNvPicPr>
             <a:picLocks noChangeAspect="1" noChangeArrowheads="1"/>
           </p:cNvPicPr>
@@ -4407,8 +4335,8 @@
         </p:blipFill>
         <p:spPr bwMode="auto">
           <a:xfrm>
-            <a:off x="5436096" y="3356992"/>
-            <a:ext cx="2476500" cy="1076325"/>
+            <a:off x="611560" y="3544640"/>
+            <a:ext cx="2239738" cy="3116969"/>
           </a:xfrm>
           <a:prstGeom prst="rect">
             <a:avLst/>
@@ -4438,6 +4366,448 @@
           </a:extLst>
         </p:spPr>
       </p:pic>
+      <p:cxnSp>
+        <p:nvCxnSpPr>
+          <p:cNvPr id="7" name="꺾인 연결선 6"/>
+          <p:cNvCxnSpPr>
+            <a:stCxn id="4" idx="1"/>
+            <a:endCxn id="8195" idx="0"/>
+          </p:cNvCxnSpPr>
+          <p:nvPr/>
+        </p:nvCxnSpPr>
+        <p:spPr>
+          <a:xfrm rot="10800000" flipV="1">
+            <a:off x="1731430" y="2722836"/>
+            <a:ext cx="1400411" cy="821804"/>
+          </a:xfrm>
+          <a:prstGeom prst="bentConnector2">
+            <a:avLst/>
+          </a:prstGeom>
+          <a:ln w="38100">
+            <a:solidFill>
+              <a:srgbClr val="FF0000"/>
+            </a:solidFill>
+            <a:tailEnd type="arrow"/>
+          </a:ln>
+        </p:spPr>
+        <p:style>
+          <a:lnRef idx="1">
+            <a:schemeClr val="accent1"/>
+          </a:lnRef>
+          <a:fillRef idx="0">
+            <a:schemeClr val="accent1"/>
+          </a:fillRef>
+          <a:effectRef idx="0">
+            <a:schemeClr val="accent1"/>
+          </a:effectRef>
+          <a:fontRef idx="minor">
+            <a:schemeClr val="tx1"/>
+          </a:fontRef>
+        </p:style>
+      </p:cxnSp>
+      <p:cxnSp>
+        <p:nvCxnSpPr>
+          <p:cNvPr id="12" name="꺾인 연결선 11"/>
+          <p:cNvCxnSpPr>
+            <a:stCxn id="4" idx="3"/>
+            <a:endCxn id="8194" idx="0"/>
+          </p:cNvCxnSpPr>
+          <p:nvPr/>
+        </p:nvCxnSpPr>
+        <p:spPr>
+          <a:xfrm>
+            <a:off x="5913140" y="2722836"/>
+            <a:ext cx="1481286" cy="821805"/>
+          </a:xfrm>
+          <a:prstGeom prst="bentConnector2">
+            <a:avLst/>
+          </a:prstGeom>
+          <a:ln w="38100">
+            <a:solidFill>
+              <a:srgbClr val="FF0000"/>
+            </a:solidFill>
+            <a:tailEnd type="arrow"/>
+          </a:ln>
+        </p:spPr>
+        <p:style>
+          <a:lnRef idx="1">
+            <a:schemeClr val="accent1"/>
+          </a:lnRef>
+          <a:fillRef idx="0">
+            <a:schemeClr val="accent1"/>
+          </a:fillRef>
+          <a:effectRef idx="0">
+            <a:schemeClr val="accent1"/>
+          </a:effectRef>
+          <a:fontRef idx="minor">
+            <a:schemeClr val="tx1"/>
+          </a:fontRef>
+        </p:style>
+      </p:cxnSp>
+      <p:sp>
+        <p:nvSpPr>
+          <p:cNvPr id="14" name="TextBox 13"/>
+          <p:cNvSpPr txBox="1"/>
+          <p:nvPr/>
+        </p:nvSpPr>
+        <p:spPr>
+          <a:xfrm>
+            <a:off x="1731429" y="2276872"/>
+            <a:ext cx="1165704" cy="369332"/>
+          </a:xfrm>
+          <a:prstGeom prst="rect">
+            <a:avLst/>
+          </a:prstGeom>
+          <a:noFill/>
+        </p:spPr>
+        <p:txBody>
+          <a:bodyPr wrap="none" rtlCol="0">
+            <a:spAutoFit/>
+          </a:bodyPr>
+          <a:lstStyle/>
+          <a:p>
+            <a:r>
+              <a:rPr lang="ko-KR" altLang="en-US" dirty="0" smtClean="0"/>
+              <a:t>인증 성공</a:t>
+            </a:r>
+            <a:endParaRPr lang="ko-KR" altLang="en-US" dirty="0"/>
+          </a:p>
+        </p:txBody>
+      </p:sp>
+      <p:sp>
+        <p:nvSpPr>
+          <p:cNvPr id="15" name="TextBox 14"/>
+          <p:cNvSpPr txBox="1"/>
+          <p:nvPr/>
+        </p:nvSpPr>
+        <p:spPr>
+          <a:xfrm>
+            <a:off x="6228722" y="2276872"/>
+            <a:ext cx="1165704" cy="369332"/>
+          </a:xfrm>
+          <a:prstGeom prst="rect">
+            <a:avLst/>
+          </a:prstGeom>
+          <a:noFill/>
+        </p:spPr>
+        <p:txBody>
+          <a:bodyPr wrap="none" rtlCol="0">
+            <a:spAutoFit/>
+          </a:bodyPr>
+          <a:lstStyle/>
+          <a:p>
+            <a:r>
+              <a:rPr lang="ko-KR" altLang="en-US" dirty="0" smtClean="0"/>
+              <a:t>인증 실패</a:t>
+            </a:r>
+            <a:endParaRPr lang="ko-KR" altLang="en-US" dirty="0"/>
+          </a:p>
+        </p:txBody>
+      </p:sp>
+    </p:spTree>
+    <p:extLst>
+      <p:ext uri="{BB962C8B-B14F-4D97-AF65-F5344CB8AC3E}">
+        <p14:creationId xmlns:p14="http://schemas.microsoft.com/office/powerpoint/2010/main" val="3193315228"/>
+      </p:ext>
+    </p:extLst>
+  </p:cSld>
+  <p:clrMapOvr>
+    <a:masterClrMapping/>
+  </p:clrMapOvr>
+  <p:timing>
+    <p:tnLst>
+      <p:par>
+        <p:cTn id="1" dur="indefinite" restart="never" nodeType="tmRoot"/>
+      </p:par>
+    </p:tnLst>
+  </p:timing>
+</p:sld>
+</file>
+
+<file path=ppt/slides/slide11.xml><?xml version="1.0" encoding="utf-8"?>
+<p:sld xmlns:a="http://schemas.openxmlformats.org/drawingml/2006/main" xmlns:r="http://schemas.openxmlformats.org/officeDocument/2006/relationships" xmlns:p="http://schemas.openxmlformats.org/presentationml/2006/main">
+  <p:cSld>
+    <p:spTree>
+      <p:nvGrpSpPr>
+        <p:cNvPr id="1" name=""/>
+        <p:cNvGrpSpPr/>
+        <p:nvPr/>
+      </p:nvGrpSpPr>
+      <p:grpSpPr>
+        <a:xfrm>
+          <a:off x="0" y="0"/>
+          <a:ext cx="0" cy="0"/>
+          <a:chOff x="0" y="0"/>
+          <a:chExt cx="0" cy="0"/>
+        </a:xfrm>
+      </p:grpSpPr>
+      <p:sp>
+        <p:nvSpPr>
+          <p:cNvPr id="4" name="제목 2"/>
+          <p:cNvSpPr>
+            <a:spLocks noGrp="1"/>
+          </p:cNvSpPr>
+          <p:nvPr>
+            <p:ph type="title"/>
+          </p:nvPr>
+        </p:nvSpPr>
+        <p:spPr>
+          <a:xfrm>
+            <a:off x="2514600" y="975360"/>
+            <a:ext cx="4114800" cy="701040"/>
+          </a:xfrm>
+        </p:spPr>
+        <p:txBody>
+          <a:bodyPr/>
+          <a:lstStyle/>
+          <a:p>
+            <a:r>
+              <a:rPr lang="en-US" altLang="ko-KR" dirty="0" smtClean="0"/>
+              <a:t>4. </a:t>
+            </a:r>
+            <a:r>
+              <a:rPr lang="ko-KR" altLang="en-US" dirty="0" smtClean="0"/>
+              <a:t>구현</a:t>
+            </a:r>
+            <a:endParaRPr lang="ko-KR" altLang="en-US" dirty="0"/>
+          </a:p>
+        </p:txBody>
+      </p:sp>
+      <p:pic>
+        <p:nvPicPr>
+          <p:cNvPr id="5" name="Picture 3"/>
+          <p:cNvPicPr>
+            <a:picLocks noChangeAspect="1" noChangeArrowheads="1"/>
+          </p:cNvPicPr>
+          <p:nvPr/>
+        </p:nvPicPr>
+        <p:blipFill>
+          <a:blip r:embed="rId2">
+            <a:extLst>
+              <a:ext uri="{28A0092B-C50C-407E-A947-70E740481C1C}">
+                <a14:useLocalDpi xmlns:a14="http://schemas.microsoft.com/office/drawing/2010/main" val="0"/>
+              </a:ext>
+            </a:extLst>
+          </a:blip>
+          <a:srcRect/>
+          <a:stretch>
+            <a:fillRect/>
+          </a:stretch>
+        </p:blipFill>
+        <p:spPr bwMode="auto">
+          <a:xfrm>
+            <a:off x="323528" y="1916832"/>
+            <a:ext cx="3312368" cy="4609713"/>
+          </a:xfrm>
+          <a:prstGeom prst="rect">
+            <a:avLst/>
+          </a:prstGeom>
+          <a:noFill/>
+          <a:ln>
+            <a:noFill/>
+          </a:ln>
+          <a:extLst>
+            <a:ext uri="{909E8E84-426E-40DD-AFC4-6F175D3DCCD1}">
+              <a14:hiddenFill xmlns:a14="http://schemas.microsoft.com/office/drawing/2010/main">
+                <a:solidFill>
+                  <a:schemeClr val="accent1"/>
+                </a:solidFill>
+              </a14:hiddenFill>
+            </a:ext>
+            <a:ext uri="{91240B29-F687-4F45-9708-019B960494DF}">
+              <a14:hiddenLine xmlns:a14="http://schemas.microsoft.com/office/drawing/2010/main" w="9525">
+                <a:solidFill>
+                  <a:schemeClr val="tx1"/>
+                </a:solidFill>
+                <a:miter lim="800000"/>
+                <a:headEnd/>
+                <a:tailEnd/>
+              </a14:hiddenLine>
+            </a:ext>
+          </a:extLst>
+        </p:spPr>
+      </p:pic>
+      <p:sp>
+        <p:nvSpPr>
+          <p:cNvPr id="6" name="TextBox 5"/>
+          <p:cNvSpPr txBox="1"/>
+          <p:nvPr/>
+        </p:nvSpPr>
+        <p:spPr>
+          <a:xfrm>
+            <a:off x="3851920" y="2204863"/>
+            <a:ext cx="5120504" cy="646331"/>
+          </a:xfrm>
+          <a:prstGeom prst="rect">
+            <a:avLst/>
+          </a:prstGeom>
+          <a:noFill/>
+        </p:spPr>
+        <p:txBody>
+          <a:bodyPr wrap="none" rtlCol="0">
+            <a:spAutoFit/>
+          </a:bodyPr>
+          <a:lstStyle/>
+          <a:p>
+            <a:r>
+              <a:rPr lang="en-US" altLang="ko-KR" dirty="0" smtClean="0"/>
+              <a:t>DATABASE</a:t>
+            </a:r>
+            <a:r>
+              <a:rPr lang="ko-KR" altLang="en-US" dirty="0" smtClean="0"/>
+              <a:t>에 </a:t>
+            </a:r>
+            <a:endParaRPr lang="en-US" altLang="ko-KR" dirty="0" smtClean="0"/>
+          </a:p>
+          <a:p>
+            <a:r>
+              <a:rPr lang="en-US" altLang="ko-KR" dirty="0"/>
+              <a:t>	</a:t>
+            </a:r>
+            <a:r>
+              <a:rPr lang="ko-KR" altLang="en-US" dirty="0" smtClean="0"/>
+              <a:t>새로운 </a:t>
+            </a:r>
+            <a:r>
+              <a:rPr lang="en-US" altLang="ko-KR" dirty="0" smtClean="0"/>
+              <a:t>“</a:t>
+            </a:r>
+            <a:r>
+              <a:rPr lang="ko-KR" altLang="en-US" dirty="0" err="1" smtClean="0"/>
+              <a:t>몬헌</a:t>
+            </a:r>
+            <a:r>
+              <a:rPr lang="ko-KR" altLang="en-US" dirty="0" smtClean="0"/>
+              <a:t> 데이터</a:t>
+            </a:r>
+            <a:r>
+              <a:rPr lang="en-US" altLang="ko-KR" dirty="0" smtClean="0"/>
+              <a:t>”</a:t>
+            </a:r>
+            <a:r>
+              <a:rPr lang="ko-KR" altLang="en-US" dirty="0" smtClean="0"/>
+              <a:t>를 </a:t>
+            </a:r>
+            <a:r>
+              <a:rPr lang="en-US" altLang="ko-KR" dirty="0" smtClean="0"/>
+              <a:t>INSERT </a:t>
+            </a:r>
+            <a:r>
+              <a:rPr lang="ko-KR" altLang="en-US" dirty="0" smtClean="0"/>
+              <a:t>합니다</a:t>
+            </a:r>
+            <a:endParaRPr lang="ko-KR" altLang="en-US" dirty="0"/>
+          </a:p>
+        </p:txBody>
+      </p:sp>
+      <p:pic>
+        <p:nvPicPr>
+          <p:cNvPr id="9218" name="Picture 2"/>
+          <p:cNvPicPr>
+            <a:picLocks noChangeAspect="1" noChangeArrowheads="1"/>
+          </p:cNvPicPr>
+          <p:nvPr/>
+        </p:nvPicPr>
+        <p:blipFill>
+          <a:blip r:embed="rId3">
+            <a:extLst>
+              <a:ext uri="{28A0092B-C50C-407E-A947-70E740481C1C}">
+                <a14:useLocalDpi xmlns:a14="http://schemas.microsoft.com/office/drawing/2010/main" val="0"/>
+              </a:ext>
+            </a:extLst>
+          </a:blip>
+          <a:srcRect/>
+          <a:stretch>
+            <a:fillRect/>
+          </a:stretch>
+        </p:blipFill>
+        <p:spPr bwMode="auto">
+          <a:xfrm>
+            <a:off x="5436096" y="4902667"/>
+            <a:ext cx="2476500" cy="1066800"/>
+          </a:xfrm>
+          <a:prstGeom prst="rect">
+            <a:avLst/>
+          </a:prstGeom>
+          <a:noFill/>
+          <a:ln>
+            <a:noFill/>
+          </a:ln>
+          <a:extLst>
+            <a:ext uri="{909E8E84-426E-40DD-AFC4-6F175D3DCCD1}">
+              <a14:hiddenFill xmlns:a14="http://schemas.microsoft.com/office/drawing/2010/main">
+                <a:solidFill>
+                  <a:schemeClr val="accent1"/>
+                </a:solidFill>
+              </a14:hiddenFill>
+            </a:ext>
+            <a:ext uri="{91240B29-F687-4F45-9708-019B960494DF}">
+              <a14:hiddenLine xmlns:a14="http://schemas.microsoft.com/office/drawing/2010/main" w="9525">
+                <a:solidFill>
+                  <a:schemeClr val="tx1"/>
+                </a:solidFill>
+                <a:miter lim="800000"/>
+                <a:headEnd/>
+                <a:tailEnd/>
+              </a14:hiddenLine>
+            </a:ext>
+          </a:extLst>
+        </p:spPr>
+      </p:pic>
+      <p:pic>
+        <p:nvPicPr>
+          <p:cNvPr id="9219" name="Picture 3"/>
+          <p:cNvPicPr>
+            <a:picLocks noChangeAspect="1" noChangeArrowheads="1"/>
+          </p:cNvPicPr>
+          <p:nvPr/>
+        </p:nvPicPr>
+        <p:blipFill>
+          <a:blip r:embed="rId4">
+            <a:extLst>
+              <a:ext uri="{28A0092B-C50C-407E-A947-70E740481C1C}">
+                <a14:useLocalDpi xmlns:a14="http://schemas.microsoft.com/office/drawing/2010/main" val="0"/>
+              </a:ext>
+            </a:extLst>
+          </a:blip>
+          <a:srcRect/>
+          <a:stretch>
+            <a:fillRect/>
+          </a:stretch>
+        </p:blipFill>
+        <p:spPr bwMode="auto">
+          <a:xfrm>
+            <a:off x="5436096" y="3356992"/>
+            <a:ext cx="2476500" cy="1076325"/>
+          </a:xfrm>
+          <a:prstGeom prst="rect">
+            <a:avLst/>
+          </a:prstGeom>
+          <a:noFill/>
+          <a:ln>
+            <a:noFill/>
+          </a:ln>
+          <a:extLst>
+            <a:ext uri="{909E8E84-426E-40DD-AFC4-6F175D3DCCD1}">
+              <a14:hiddenFill xmlns:a14="http://schemas.microsoft.com/office/drawing/2010/main">
+                <a:solidFill>
+                  <a:schemeClr val="accent1"/>
+                </a:solidFill>
+              </a14:hiddenFill>
+            </a:ext>
+            <a:ext uri="{91240B29-F687-4F45-9708-019B960494DF}">
+              <a14:hiddenLine xmlns:a14="http://schemas.microsoft.com/office/drawing/2010/main" w="9525">
+                <a:solidFill>
+                  <a:schemeClr val="tx1"/>
+                </a:solidFill>
+                <a:miter lim="800000"/>
+                <a:headEnd/>
+                <a:tailEnd/>
+              </a14:hiddenLine>
+            </a:ext>
+          </a:extLst>
+        </p:spPr>
+      </p:pic>
     </p:spTree>
     <p:extLst>
       <p:ext uri="{BB962C8B-B14F-4D97-AF65-F5344CB8AC3E}">
@@ -4458,7 +4828,7 @@
 </p:sld>
 </file>
 
-<file path=ppt/slides/slide11.xml><?xml version="1.0" encoding="utf-8"?>
+<file path=ppt/slides/slide12.xml><?xml version="1.0" encoding="utf-8"?>
 <p:sld xmlns:a="http://schemas.openxmlformats.org/drawingml/2006/main" xmlns:r="http://schemas.openxmlformats.org/officeDocument/2006/relationships" xmlns:p="http://schemas.openxmlformats.org/presentationml/2006/main">
   <p:cSld>
     <p:spTree>
@@ -4681,7 +5051,7 @@
 </p:sld>
 </file>
 
-<file path=ppt/slides/slide12.xml><?xml version="1.0" encoding="utf-8"?>
+<file path=ppt/slides/slide13.xml><?xml version="1.0" encoding="utf-8"?>
 <p:sld xmlns:a="http://schemas.openxmlformats.org/drawingml/2006/main" xmlns:r="http://schemas.openxmlformats.org/officeDocument/2006/relationships" xmlns:p="http://schemas.openxmlformats.org/presentationml/2006/main">
   <p:cSld>
     <p:spTree>
@@ -4878,7 +5248,7 @@
 </p:sld>
 </file>
 
-<file path=ppt/slides/slide13.xml><?xml version="1.0" encoding="utf-8"?>
+<file path=ppt/slides/slide14.xml><?xml version="1.0" encoding="utf-8"?>
 <p:sld xmlns:a="http://schemas.openxmlformats.org/drawingml/2006/main" xmlns:r="http://schemas.openxmlformats.org/officeDocument/2006/relationships" xmlns:p="http://schemas.openxmlformats.org/presentationml/2006/main">
   <p:cSld>
     <p:spTree>
@@ -5134,7 +5504,7 @@
 </p:sld>
 </file>
 
-<file path=ppt/slides/slide14.xml><?xml version="1.0" encoding="utf-8"?>
+<file path=ppt/slides/slide15.xml><?xml version="1.0" encoding="utf-8"?>
 <p:sld xmlns:a="http://schemas.openxmlformats.org/drawingml/2006/main" xmlns:r="http://schemas.openxmlformats.org/officeDocument/2006/relationships" xmlns:p="http://schemas.openxmlformats.org/presentationml/2006/main">
   <p:cSld>
     <p:spTree>
@@ -5373,7 +5743,7 @@
 </p:sld>
 </file>
 
-<file path=ppt/slides/slide15.xml><?xml version="1.0" encoding="utf-8"?>
+<file path=ppt/slides/slide16.xml><?xml version="1.0" encoding="utf-8"?>
 <p:sld xmlns:a="http://schemas.openxmlformats.org/drawingml/2006/main" xmlns:r="http://schemas.openxmlformats.org/officeDocument/2006/relationships" xmlns:p="http://schemas.openxmlformats.org/presentationml/2006/main">
   <p:cSld>
     <p:spTree>
@@ -5724,7 +6094,7 @@
 </p:sld>
 </file>
 
-<file path=ppt/slides/slide16.xml><?xml version="1.0" encoding="utf-8"?>
+<file path=ppt/slides/slide17.xml><?xml version="1.0" encoding="utf-8"?>
 <p:sld xmlns:a="http://schemas.openxmlformats.org/drawingml/2006/main" xmlns:r="http://schemas.openxmlformats.org/officeDocument/2006/relationships" xmlns:p="http://schemas.openxmlformats.org/presentationml/2006/main">
   <p:cSld>
     <p:spTree>
@@ -5993,7 +6363,7 @@
 </p:sld>
 </file>
 
-<file path=ppt/slides/slide17.xml><?xml version="1.0" encoding="utf-8"?>
+<file path=ppt/slides/slide18.xml><?xml version="1.0" encoding="utf-8"?>
 <p:sld xmlns:a="http://schemas.openxmlformats.org/drawingml/2006/main" xmlns:r="http://schemas.openxmlformats.org/officeDocument/2006/relationships" xmlns:p="http://schemas.openxmlformats.org/presentationml/2006/main">
   <p:cSld>
     <p:spTree>
@@ -6344,7 +6714,7 @@
 </p:sld>
 </file>
 
-<file path=ppt/slides/slide18.xml><?xml version="1.0" encoding="utf-8"?>
+<file path=ppt/slides/slide19.xml><?xml version="1.0" encoding="utf-8"?>
 <p:sld xmlns:a="http://schemas.openxmlformats.org/drawingml/2006/main" xmlns:r="http://schemas.openxmlformats.org/officeDocument/2006/relationships" xmlns:p="http://schemas.openxmlformats.org/presentationml/2006/main">
   <p:cSld>
     <p:spTree>
@@ -6474,145 +6844,6 @@
     <p:extLst>
       <p:ext uri="{BB962C8B-B14F-4D97-AF65-F5344CB8AC3E}">
         <p14:creationId xmlns:p14="http://schemas.microsoft.com/office/powerpoint/2010/main" val="2743869122"/>
-      </p:ext>
-    </p:extLst>
-  </p:cSld>
-  <p:clrMapOvr>
-    <a:masterClrMapping/>
-  </p:clrMapOvr>
-</p:sld>
-</file>
-
-<file path=ppt/slides/slide19.xml><?xml version="1.0" encoding="utf-8"?>
-<p:sld xmlns:a="http://schemas.openxmlformats.org/drawingml/2006/main" xmlns:r="http://schemas.openxmlformats.org/officeDocument/2006/relationships" xmlns:p="http://schemas.openxmlformats.org/presentationml/2006/main">
-  <p:cSld>
-    <p:spTree>
-      <p:nvGrpSpPr>
-        <p:cNvPr id="1" name=""/>
-        <p:cNvGrpSpPr/>
-        <p:nvPr/>
-      </p:nvGrpSpPr>
-      <p:grpSpPr>
-        <a:xfrm>
-          <a:off x="0" y="0"/>
-          <a:ext cx="0" cy="0"/>
-          <a:chOff x="0" y="0"/>
-          <a:chExt cx="0" cy="0"/>
-        </a:xfrm>
-      </p:grpSpPr>
-      <p:sp>
-        <p:nvSpPr>
-          <p:cNvPr id="3" name="제목 2"/>
-          <p:cNvSpPr>
-            <a:spLocks noGrp="1"/>
-          </p:cNvSpPr>
-          <p:nvPr>
-            <p:ph type="title"/>
-          </p:nvPr>
-        </p:nvSpPr>
-        <p:spPr/>
-        <p:txBody>
-          <a:bodyPr/>
-          <a:lstStyle/>
-          <a:p>
-            <a:r>
-              <a:rPr lang="en-US" altLang="ko-KR" dirty="0" smtClean="0"/>
-              <a:t>5. </a:t>
-            </a:r>
-            <a:r>
-              <a:rPr lang="ko-KR" altLang="en-US" dirty="0" smtClean="0"/>
-              <a:t>테스트</a:t>
-            </a:r>
-            <a:endParaRPr lang="ko-KR" altLang="en-US" dirty="0"/>
-          </a:p>
-        </p:txBody>
-      </p:sp>
-      <p:pic>
-        <p:nvPicPr>
-          <p:cNvPr id="2050" name="Picture 2" descr="D:\Kim_Young_Woo\JAVA_LECTURE\JAVA_Lecture\Java_tutorial\src\project_07_MonsterHunter_Weapon_DB\Monster_Hunter_ppt\image\테스트_2.png"/>
-          <p:cNvPicPr>
-            <a:picLocks noChangeAspect="1" noChangeArrowheads="1"/>
-          </p:cNvPicPr>
-          <p:nvPr/>
-        </p:nvPicPr>
-        <p:blipFill>
-          <a:blip r:embed="rId2">
-            <a:extLst>
-              <a:ext uri="{28A0092B-C50C-407E-A947-70E740481C1C}">
-                <a14:useLocalDpi xmlns:a14="http://schemas.microsoft.com/office/drawing/2010/main" val="0"/>
-              </a:ext>
-            </a:extLst>
-          </a:blip>
-          <a:srcRect/>
-          <a:stretch>
-            <a:fillRect/>
-          </a:stretch>
-        </p:blipFill>
-        <p:spPr bwMode="auto">
-          <a:xfrm>
-            <a:off x="683568" y="2060848"/>
-            <a:ext cx="4189074" cy="4316016"/>
-          </a:xfrm>
-          <a:prstGeom prst="rect">
-            <a:avLst/>
-          </a:prstGeom>
-          <a:noFill/>
-          <a:extLst>
-            <a:ext uri="{909E8E84-426E-40DD-AFC4-6F175D3DCCD1}">
-              <a14:hiddenFill xmlns:a14="http://schemas.microsoft.com/office/drawing/2010/main">
-                <a:solidFill>
-                  <a:srgbClr val="FFFFFF"/>
-                </a:solidFill>
-              </a14:hiddenFill>
-            </a:ext>
-          </a:extLst>
-        </p:spPr>
-      </p:pic>
-      <p:pic>
-        <p:nvPicPr>
-          <p:cNvPr id="2051" name="Picture 3" descr="D:\Kim_Young_Woo\JAVA_LECTURE\JAVA_Lecture\Java_tutorial\src\project_07_MonsterHunter_Weapon_DB\Monster_Hunter_ppt\image\테스트_2_결과.png"/>
-          <p:cNvPicPr>
-            <a:picLocks noChangeAspect="1" noChangeArrowheads="1"/>
-          </p:cNvPicPr>
-          <p:nvPr/>
-        </p:nvPicPr>
-        <p:blipFill>
-          <a:blip r:embed="rId3">
-            <a:extLst>
-              <a:ext uri="{28A0092B-C50C-407E-A947-70E740481C1C}">
-                <a14:useLocalDpi xmlns:a14="http://schemas.microsoft.com/office/drawing/2010/main" val="0"/>
-              </a:ext>
-            </a:extLst>
-          </a:blip>
-          <a:srcRect/>
-          <a:stretch>
-            <a:fillRect/>
-          </a:stretch>
-        </p:blipFill>
-        <p:spPr bwMode="auto">
-          <a:xfrm>
-            <a:off x="5501208" y="2060848"/>
-            <a:ext cx="2311152" cy="2279053"/>
-          </a:xfrm>
-          <a:prstGeom prst="rect">
-            <a:avLst/>
-          </a:prstGeom>
-          <a:noFill/>
-          <a:extLst>
-            <a:ext uri="{909E8E84-426E-40DD-AFC4-6F175D3DCCD1}">
-              <a14:hiddenFill xmlns:a14="http://schemas.microsoft.com/office/drawing/2010/main">
-                <a:solidFill>
-                  <a:srgbClr val="FFFFFF"/>
-                </a:solidFill>
-              </a14:hiddenFill>
-            </a:ext>
-          </a:extLst>
-        </p:spPr>
-      </p:pic>
-    </p:spTree>
-    <p:extLst>
-      <p:ext uri="{BB962C8B-B14F-4D97-AF65-F5344CB8AC3E}">
-        <p14:creationId xmlns:p14="http://schemas.microsoft.com/office/powerpoint/2010/main" val="810752750"/>
       </p:ext>
     </p:extLst>
   </p:cSld>
@@ -7144,28 +7375,167 @@
           <a:lstStyle/>
           <a:p>
             <a:r>
+              <a:rPr lang="en-US" altLang="ko-KR" dirty="0" smtClean="0"/>
+              <a:t>5. </a:t>
+            </a:r>
+            <a:r>
               <a:rPr lang="ko-KR" altLang="en-US" dirty="0" smtClean="0"/>
-              <a:t>제작 환경</a:t>
+              <a:t>테스트</a:t>
             </a:r>
             <a:endParaRPr lang="ko-KR" altLang="en-US" dirty="0"/>
           </a:p>
         </p:txBody>
       </p:sp>
-      <p:sp>
-        <p:nvSpPr>
-          <p:cNvPr id="5" name="TextBox 4"/>
-          <p:cNvSpPr txBox="1"/>
+      <p:pic>
+        <p:nvPicPr>
+          <p:cNvPr id="2050" name="Picture 2" descr="D:\Kim_Young_Woo\JAVA_LECTURE\JAVA_Lecture\Java_tutorial\src\project_07_MonsterHunter_Weapon_DB\Monster_Hunter_ppt\image\테스트_2.png"/>
+          <p:cNvPicPr>
+            <a:picLocks noChangeAspect="1" noChangeArrowheads="1"/>
+          </p:cNvPicPr>
           <p:nvPr/>
-        </p:nvSpPr>
-        <p:spPr>
-          <a:xfrm>
-            <a:off x="2915816" y="2848868"/>
-            <a:ext cx="3404073" cy="2308324"/>
+        </p:nvPicPr>
+        <p:blipFill>
+          <a:blip r:embed="rId2">
+            <a:extLst>
+              <a:ext uri="{28A0092B-C50C-407E-A947-70E740481C1C}">
+                <a14:useLocalDpi xmlns:a14="http://schemas.microsoft.com/office/drawing/2010/main" val="0"/>
+              </a:ext>
+            </a:extLst>
+          </a:blip>
+          <a:srcRect/>
+          <a:stretch>
+            <a:fillRect/>
+          </a:stretch>
+        </p:blipFill>
+        <p:spPr bwMode="auto">
+          <a:xfrm>
+            <a:off x="683568" y="2060848"/>
+            <a:ext cx="4189074" cy="4316016"/>
           </a:xfrm>
           <a:prstGeom prst="rect">
             <a:avLst/>
           </a:prstGeom>
           <a:noFill/>
+          <a:extLst>
+            <a:ext uri="{909E8E84-426E-40DD-AFC4-6F175D3DCCD1}">
+              <a14:hiddenFill xmlns:a14="http://schemas.microsoft.com/office/drawing/2010/main">
+                <a:solidFill>
+                  <a:srgbClr val="FFFFFF"/>
+                </a:solidFill>
+              </a14:hiddenFill>
+            </a:ext>
+          </a:extLst>
+        </p:spPr>
+      </p:pic>
+      <p:pic>
+        <p:nvPicPr>
+          <p:cNvPr id="2051" name="Picture 3" descr="D:\Kim_Young_Woo\JAVA_LECTURE\JAVA_Lecture\Java_tutorial\src\project_07_MonsterHunter_Weapon_DB\Monster_Hunter_ppt\image\테스트_2_결과.png"/>
+          <p:cNvPicPr>
+            <a:picLocks noChangeAspect="1" noChangeArrowheads="1"/>
+          </p:cNvPicPr>
+          <p:nvPr/>
+        </p:nvPicPr>
+        <p:blipFill>
+          <a:blip r:embed="rId3">
+            <a:extLst>
+              <a:ext uri="{28A0092B-C50C-407E-A947-70E740481C1C}">
+                <a14:useLocalDpi xmlns:a14="http://schemas.microsoft.com/office/drawing/2010/main" val="0"/>
+              </a:ext>
+            </a:extLst>
+          </a:blip>
+          <a:srcRect/>
+          <a:stretch>
+            <a:fillRect/>
+          </a:stretch>
+        </p:blipFill>
+        <p:spPr bwMode="auto">
+          <a:xfrm>
+            <a:off x="5501208" y="2060848"/>
+            <a:ext cx="2311152" cy="2279053"/>
+          </a:xfrm>
+          <a:prstGeom prst="rect">
+            <a:avLst/>
+          </a:prstGeom>
+          <a:noFill/>
+          <a:extLst>
+            <a:ext uri="{909E8E84-426E-40DD-AFC4-6F175D3DCCD1}">
+              <a14:hiddenFill xmlns:a14="http://schemas.microsoft.com/office/drawing/2010/main">
+                <a:solidFill>
+                  <a:srgbClr val="FFFFFF"/>
+                </a:solidFill>
+              </a14:hiddenFill>
+            </a:ext>
+          </a:extLst>
+        </p:spPr>
+      </p:pic>
+    </p:spTree>
+    <p:extLst>
+      <p:ext uri="{BB962C8B-B14F-4D97-AF65-F5344CB8AC3E}">
+        <p14:creationId xmlns:p14="http://schemas.microsoft.com/office/powerpoint/2010/main" val="810752750"/>
+      </p:ext>
+    </p:extLst>
+  </p:cSld>
+  <p:clrMapOvr>
+    <a:masterClrMapping/>
+  </p:clrMapOvr>
+</p:sld>
+</file>
+
+<file path=ppt/slides/slide21.xml><?xml version="1.0" encoding="utf-8"?>
+<p:sld xmlns:a="http://schemas.openxmlformats.org/drawingml/2006/main" xmlns:r="http://schemas.openxmlformats.org/officeDocument/2006/relationships" xmlns:p="http://schemas.openxmlformats.org/presentationml/2006/main">
+  <p:cSld>
+    <p:spTree>
+      <p:nvGrpSpPr>
+        <p:cNvPr id="1" name=""/>
+        <p:cNvGrpSpPr/>
+        <p:nvPr/>
+      </p:nvGrpSpPr>
+      <p:grpSpPr>
+        <a:xfrm>
+          <a:off x="0" y="0"/>
+          <a:ext cx="0" cy="0"/>
+          <a:chOff x="0" y="0"/>
+          <a:chExt cx="0" cy="0"/>
+        </a:xfrm>
+      </p:grpSpPr>
+      <p:sp>
+        <p:nvSpPr>
+          <p:cNvPr id="3" name="제목 2"/>
+          <p:cNvSpPr>
+            <a:spLocks noGrp="1"/>
+          </p:cNvSpPr>
+          <p:nvPr>
+            <p:ph type="title"/>
+          </p:nvPr>
+        </p:nvSpPr>
+        <p:spPr/>
+        <p:txBody>
+          <a:bodyPr/>
+          <a:lstStyle/>
+          <a:p>
+            <a:r>
+              <a:rPr lang="ko-KR" altLang="en-US" dirty="0" smtClean="0"/>
+              <a:t>제작 환경</a:t>
+            </a:r>
+            <a:endParaRPr lang="ko-KR" altLang="en-US" dirty="0"/>
+          </a:p>
+        </p:txBody>
+      </p:sp>
+      <p:sp>
+        <p:nvSpPr>
+          <p:cNvPr id="5" name="TextBox 4"/>
+          <p:cNvSpPr txBox="1"/>
+          <p:nvPr/>
+        </p:nvSpPr>
+        <p:spPr>
+          <a:xfrm>
+            <a:off x="2915816" y="2848868"/>
+            <a:ext cx="3404073" cy="3046988"/>
+          </a:xfrm>
+          <a:prstGeom prst="rect">
+            <a:avLst/>
+          </a:prstGeom>
+          <a:noFill/>
         </p:spPr>
         <p:txBody>
           <a:bodyPr wrap="none" rtlCol="0">
@@ -7213,8 +7583,27 @@
               <a:buAutoNum type="arabicPeriod"/>
             </a:pPr>
             <a:r>
+              <a:rPr lang="en-US" altLang="ko-KR" sz="2400" dirty="0" err="1" smtClean="0"/>
+              <a:t>Github</a:t>
+            </a:r>
+            <a:endParaRPr lang="en-US" altLang="ko-KR" sz="2400" dirty="0" smtClean="0"/>
+          </a:p>
+          <a:p>
+            <a:pPr marL="457200" indent="-457200">
+              <a:buAutoNum type="arabicPeriod"/>
+            </a:pPr>
+            <a:r>
               <a:rPr lang="en-US" altLang="ko-KR" sz="2400" dirty="0" smtClean="0"/>
               <a:t>Raptor</a:t>
+            </a:r>
+          </a:p>
+          <a:p>
+            <a:pPr marL="457200" indent="-457200">
+              <a:buAutoNum type="arabicPeriod"/>
+            </a:pPr>
+            <a:r>
+              <a:rPr lang="en-US" altLang="ko-KR" sz="2400" dirty="0" smtClean="0"/>
+              <a:t>draw.io</a:t>
             </a:r>
             <a:endParaRPr lang="en-US" altLang="ko-KR" sz="2400" dirty="0" smtClean="0"/>
           </a:p>
@@ -7243,7 +7632,7 @@
 </p:sld>
 </file>
 
-<file path=ppt/slides/slide21.xml><?xml version="1.0" encoding="utf-8"?>
+<file path=ppt/slides/slide22.xml><?xml version="1.0" encoding="utf-8"?>
 <p:sld xmlns:a="http://schemas.openxmlformats.org/drawingml/2006/main" xmlns:r="http://schemas.openxmlformats.org/officeDocument/2006/relationships" xmlns:p="http://schemas.openxmlformats.org/presentationml/2006/main">
   <p:cSld>
     <p:spTree>
@@ -7327,7 +7716,7 @@
       </p:grpSpPr>
       <p:sp>
         <p:nvSpPr>
-          <p:cNvPr id="3" name="제목 2"/>
+          <p:cNvPr id="4" name="제목 1"/>
           <p:cNvSpPr>
             <a:spLocks noGrp="1"/>
           </p:cNvSpPr>
@@ -7335,18 +7724,27 @@
             <p:ph type="title"/>
           </p:nvPr>
         </p:nvSpPr>
-        <p:spPr/>
+        <p:spPr>
+          <a:xfrm>
+            <a:off x="2514600" y="975360"/>
+            <a:ext cx="4114800" cy="701040"/>
+          </a:xfrm>
+        </p:spPr>
         <p:txBody>
           <a:bodyPr/>
           <a:lstStyle/>
           <a:p>
             <a:r>
               <a:rPr lang="en-US" altLang="ko-KR" dirty="0" smtClean="0"/>
-              <a:t>2. Database </a:t>
+              <a:t>1. </a:t>
             </a:r>
             <a:r>
               <a:rPr lang="ko-KR" altLang="en-US" dirty="0" smtClean="0"/>
-              <a:t>설계 및 구현</a:t>
+              <a:t>요구사항 분석 </a:t>
+            </a:r>
+            <a:r>
+              <a:rPr lang="en-US" altLang="ko-KR" dirty="0" smtClean="0"/>
+              <a:t>(Use case)</a:t>
             </a:r>
             <a:endParaRPr lang="ko-KR" altLang="en-US" dirty="0"/>
           </a:p>
@@ -7354,7 +7752,7 @@
       </p:sp>
       <p:pic>
         <p:nvPicPr>
-          <p:cNvPr id="2054" name="Picture 6" descr="C:\Users\user\Desktop\ppt 이미지\무기테이블.png"/>
+          <p:cNvPr id="2" name="Picture 2" descr="D:\Kim_Young_Woo\JAVA_LECTURE\JAVA_Lecture\Java_tutorial\src\project_07_MonsterHunter_Weapon_DB\Monster_Hunter_ppt\image\Monster_Hunter use case.png"/>
           <p:cNvPicPr>
             <a:picLocks noChangeAspect="1" noChangeArrowheads="1"/>
           </p:cNvPicPr>
@@ -7375,8 +7773,8 @@
         </p:blipFill>
         <p:spPr bwMode="auto">
           <a:xfrm>
-            <a:off x="126401" y="2060848"/>
-            <a:ext cx="8875591" cy="4327362"/>
+            <a:off x="1242380" y="1928762"/>
+            <a:ext cx="6662326" cy="4596582"/>
           </a:xfrm>
           <a:prstGeom prst="rect">
             <a:avLst/>
@@ -7396,7 +7794,7 @@
     </p:spTree>
     <p:extLst>
       <p:ext uri="{BB962C8B-B14F-4D97-AF65-F5344CB8AC3E}">
-        <p14:creationId xmlns:p14="http://schemas.microsoft.com/office/powerpoint/2010/main" val="2749216023"/>
+        <p14:creationId xmlns:p14="http://schemas.microsoft.com/office/powerpoint/2010/main" val="531904728"/>
       </p:ext>
     </p:extLst>
   </p:cSld>
@@ -7446,19 +7844,20 @@
           <a:lstStyle/>
           <a:p>
             <a:r>
-              <a:rPr lang="en-US" altLang="ko-KR" dirty="0"/>
-              <a:t>3. Java Class </a:t>
-            </a:r>
-            <a:r>
-              <a:rPr lang="ko-KR" altLang="en-US" dirty="0"/>
-              <a:t>설계</a:t>
-            </a:r>
+              <a:rPr lang="en-US" altLang="ko-KR" dirty="0" smtClean="0"/>
+              <a:t>2. Database </a:t>
+            </a:r>
+            <a:r>
+              <a:rPr lang="ko-KR" altLang="en-US" dirty="0" smtClean="0"/>
+              <a:t>설계 및 구현</a:t>
+            </a:r>
+            <a:endParaRPr lang="ko-KR" altLang="en-US" dirty="0"/>
           </a:p>
         </p:txBody>
       </p:sp>
       <p:pic>
         <p:nvPicPr>
-          <p:cNvPr id="4098" name="Picture 2" descr="D:\Kim_Young_Woo\JAVA_LECTURE\JAVA_Lecture\Java_tutorial\src\project_07_MonsterHunter_Weapon_DB\flowChart\WeaponsDTO.png"/>
+          <p:cNvPr id="2054" name="Picture 6" descr="C:\Users\user\Desktop\ppt 이미지\무기테이블.png"/>
           <p:cNvPicPr>
             <a:picLocks noChangeAspect="1" noChangeArrowheads="1"/>
           </p:cNvPicPr>
@@ -7479,8 +7878,8 @@
         </p:blipFill>
         <p:spPr bwMode="auto">
           <a:xfrm>
-            <a:off x="395536" y="1916832"/>
-            <a:ext cx="2854998" cy="4680126"/>
+            <a:off x="126401" y="2060848"/>
+            <a:ext cx="8875591" cy="4327362"/>
           </a:xfrm>
           <a:prstGeom prst="rect">
             <a:avLst/>
@@ -7497,54 +7896,10 @@
           </a:extLst>
         </p:spPr>
       </p:pic>
-      <p:sp>
-        <p:nvSpPr>
-          <p:cNvPr id="4" name="TextBox 3"/>
-          <p:cNvSpPr txBox="1"/>
-          <p:nvPr/>
-        </p:nvSpPr>
-        <p:spPr>
-          <a:xfrm>
-            <a:off x="3635896" y="2422629"/>
-            <a:ext cx="5037533" cy="646331"/>
-          </a:xfrm>
-          <a:prstGeom prst="rect">
-            <a:avLst/>
-          </a:prstGeom>
-          <a:noFill/>
-        </p:spPr>
-        <p:txBody>
-          <a:bodyPr wrap="none" rtlCol="0">
-            <a:spAutoFit/>
-          </a:bodyPr>
-          <a:lstStyle/>
-          <a:p>
-            <a:r>
-              <a:rPr lang="en-US" altLang="ko-KR" dirty="0" err="1" smtClean="0"/>
-              <a:t>WeaponsDTO</a:t>
-            </a:r>
-            <a:r>
-              <a:rPr lang="en-US" altLang="ko-KR" dirty="0" smtClean="0"/>
-              <a:t> </a:t>
-            </a:r>
-          </a:p>
-          <a:p>
-            <a:r>
-              <a:rPr lang="en-US" altLang="ko-KR" dirty="0" smtClean="0"/>
-              <a:t>: DATABASE </a:t>
-            </a:r>
-            <a:r>
-              <a:rPr lang="ko-KR" altLang="en-US" dirty="0" smtClean="0"/>
-              <a:t>와 데이터 전송을 위한 단위 클래스</a:t>
-            </a:r>
-            <a:endParaRPr lang="ko-KR" altLang="en-US" dirty="0"/>
-          </a:p>
-        </p:txBody>
-      </p:sp>
     </p:spTree>
     <p:extLst>
       <p:ext uri="{BB962C8B-B14F-4D97-AF65-F5344CB8AC3E}">
-        <p14:creationId xmlns:p14="http://schemas.microsoft.com/office/powerpoint/2010/main" val="888966954"/>
+        <p14:creationId xmlns:p14="http://schemas.microsoft.com/office/powerpoint/2010/main" val="2749216023"/>
       </p:ext>
     </p:extLst>
   </p:cSld>
@@ -7594,20 +7949,19 @@
           <a:lstStyle/>
           <a:p>
             <a:r>
-              <a:rPr lang="en-US" altLang="ko-KR" dirty="0" smtClean="0"/>
+              <a:rPr lang="en-US" altLang="ko-KR" dirty="0"/>
               <a:t>3. Java Class </a:t>
             </a:r>
             <a:r>
-              <a:rPr lang="ko-KR" altLang="en-US" dirty="0" smtClean="0"/>
+              <a:rPr lang="ko-KR" altLang="en-US" dirty="0"/>
               <a:t>설계</a:t>
             </a:r>
-            <a:endParaRPr lang="ko-KR" altLang="en-US" dirty="0"/>
           </a:p>
         </p:txBody>
       </p:sp>
       <p:pic>
         <p:nvPicPr>
-          <p:cNvPr id="3074" name="Picture 2" descr="D:\Kim_Young_Woo\JAVA_LECTURE\JAVA_Lecture\Java_tutorial\src\project_07_MonsterHunter_Weapon_DB\flowChart\Main_class_diagram.png"/>
+          <p:cNvPr id="4098" name="Picture 2" descr="D:\Kim_Young_Woo\JAVA_LECTURE\JAVA_Lecture\Java_tutorial\src\project_07_MonsterHunter_Weapon_DB\flowChart\WeaponsDTO.png"/>
           <p:cNvPicPr>
             <a:picLocks noChangeAspect="1" noChangeArrowheads="1"/>
           </p:cNvPicPr>
@@ -7628,8 +7982,8 @@
         </p:blipFill>
         <p:spPr bwMode="auto">
           <a:xfrm>
-            <a:off x="107504" y="2204864"/>
-            <a:ext cx="8921714" cy="3988794"/>
+            <a:off x="395536" y="1916832"/>
+            <a:ext cx="2854998" cy="4680126"/>
           </a:xfrm>
           <a:prstGeom prst="rect">
             <a:avLst/>
@@ -7646,10 +8000,54 @@
           </a:extLst>
         </p:spPr>
       </p:pic>
+      <p:sp>
+        <p:nvSpPr>
+          <p:cNvPr id="4" name="TextBox 3"/>
+          <p:cNvSpPr txBox="1"/>
+          <p:nvPr/>
+        </p:nvSpPr>
+        <p:spPr>
+          <a:xfrm>
+            <a:off x="3635896" y="2422629"/>
+            <a:ext cx="5037533" cy="646331"/>
+          </a:xfrm>
+          <a:prstGeom prst="rect">
+            <a:avLst/>
+          </a:prstGeom>
+          <a:noFill/>
+        </p:spPr>
+        <p:txBody>
+          <a:bodyPr wrap="none" rtlCol="0">
+            <a:spAutoFit/>
+          </a:bodyPr>
+          <a:lstStyle/>
+          <a:p>
+            <a:r>
+              <a:rPr lang="en-US" altLang="ko-KR" dirty="0" err="1" smtClean="0"/>
+              <a:t>WeaponsDTO</a:t>
+            </a:r>
+            <a:r>
+              <a:rPr lang="en-US" altLang="ko-KR" dirty="0" smtClean="0"/>
+              <a:t> </a:t>
+            </a:r>
+          </a:p>
+          <a:p>
+            <a:r>
+              <a:rPr lang="en-US" altLang="ko-KR" dirty="0" smtClean="0"/>
+              <a:t>: DATABASE </a:t>
+            </a:r>
+            <a:r>
+              <a:rPr lang="ko-KR" altLang="en-US" dirty="0" smtClean="0"/>
+              <a:t>와 데이터 전송을 위한 단위 클래스</a:t>
+            </a:r>
+            <a:endParaRPr lang="ko-KR" altLang="en-US" dirty="0"/>
+          </a:p>
+        </p:txBody>
+      </p:sp>
     </p:spTree>
     <p:extLst>
       <p:ext uri="{BB962C8B-B14F-4D97-AF65-F5344CB8AC3E}">
-        <p14:creationId xmlns:p14="http://schemas.microsoft.com/office/powerpoint/2010/main" val="3917983075"/>
+        <p14:creationId xmlns:p14="http://schemas.microsoft.com/office/powerpoint/2010/main" val="888966954"/>
       </p:ext>
     </p:extLst>
   </p:cSld>
@@ -7699,24 +8097,20 @@
           <a:lstStyle/>
           <a:p>
             <a:r>
-              <a:rPr lang="en-US" altLang="ko-KR" dirty="0"/>
+              <a:rPr lang="en-US" altLang="ko-KR" dirty="0" smtClean="0"/>
               <a:t>3. Java Class </a:t>
             </a:r>
             <a:r>
               <a:rPr lang="ko-KR" altLang="en-US" dirty="0" smtClean="0"/>
               <a:t>설계</a:t>
             </a:r>
-            <a:r>
-              <a:rPr lang="en-US" altLang="ko-KR" dirty="0" smtClean="0"/>
-              <a:t>(GUI)</a:t>
-            </a:r>
             <a:endParaRPr lang="ko-KR" altLang="en-US" dirty="0"/>
           </a:p>
         </p:txBody>
       </p:sp>
       <p:pic>
         <p:nvPicPr>
-          <p:cNvPr id="5122" name="Picture 2" descr="D:\Kim_Young_Woo\JAVA_LECTURE\JAVA_Lecture\Java_tutorial\src\project_07_MonsterHunter_Weapon_DB\flowChart\GUI_class_diagram.png"/>
+          <p:cNvPr id="3074" name="Picture 2" descr="D:\Kim_Young_Woo\JAVA_LECTURE\JAVA_Lecture\Java_tutorial\src\project_07_MonsterHunter_Weapon_DB\flowChart\Main_class_diagram.png"/>
           <p:cNvPicPr>
             <a:picLocks noChangeAspect="1" noChangeArrowheads="1"/>
           </p:cNvPicPr>
@@ -7737,8 +8131,8 @@
         </p:blipFill>
         <p:spPr bwMode="auto">
           <a:xfrm>
-            <a:off x="1547664" y="1844824"/>
-            <a:ext cx="6048672" cy="4679161"/>
+            <a:off x="107504" y="2204864"/>
+            <a:ext cx="8921714" cy="3988794"/>
           </a:xfrm>
           <a:prstGeom prst="rect">
             <a:avLst/>
@@ -7758,7 +8152,7 @@
     </p:spTree>
     <p:extLst>
       <p:ext uri="{BB962C8B-B14F-4D97-AF65-F5344CB8AC3E}">
-        <p14:creationId xmlns:p14="http://schemas.microsoft.com/office/powerpoint/2010/main" val="1094539532"/>
+        <p14:creationId xmlns:p14="http://schemas.microsoft.com/office/powerpoint/2010/main" val="3917983075"/>
       </p:ext>
     </p:extLst>
   </p:cSld>
@@ -7808,6 +8202,115 @@
           <a:lstStyle/>
           <a:p>
             <a:r>
+              <a:rPr lang="en-US" altLang="ko-KR" dirty="0"/>
+              <a:t>3. Java Class </a:t>
+            </a:r>
+            <a:r>
+              <a:rPr lang="ko-KR" altLang="en-US" dirty="0" smtClean="0"/>
+              <a:t>설계</a:t>
+            </a:r>
+            <a:r>
+              <a:rPr lang="en-US" altLang="ko-KR" dirty="0" smtClean="0"/>
+              <a:t>(GUI)</a:t>
+            </a:r>
+            <a:endParaRPr lang="ko-KR" altLang="en-US" dirty="0"/>
+          </a:p>
+        </p:txBody>
+      </p:sp>
+      <p:pic>
+        <p:nvPicPr>
+          <p:cNvPr id="5122" name="Picture 2" descr="D:\Kim_Young_Woo\JAVA_LECTURE\JAVA_Lecture\Java_tutorial\src\project_07_MonsterHunter_Weapon_DB\flowChart\GUI_class_diagram.png"/>
+          <p:cNvPicPr>
+            <a:picLocks noChangeAspect="1" noChangeArrowheads="1"/>
+          </p:cNvPicPr>
+          <p:nvPr/>
+        </p:nvPicPr>
+        <p:blipFill>
+          <a:blip r:embed="rId2">
+            <a:extLst>
+              <a:ext uri="{28A0092B-C50C-407E-A947-70E740481C1C}">
+                <a14:useLocalDpi xmlns:a14="http://schemas.microsoft.com/office/drawing/2010/main" val="0"/>
+              </a:ext>
+            </a:extLst>
+          </a:blip>
+          <a:srcRect/>
+          <a:stretch>
+            <a:fillRect/>
+          </a:stretch>
+        </p:blipFill>
+        <p:spPr bwMode="auto">
+          <a:xfrm>
+            <a:off x="1547664" y="1844824"/>
+            <a:ext cx="6048672" cy="4679161"/>
+          </a:xfrm>
+          <a:prstGeom prst="rect">
+            <a:avLst/>
+          </a:prstGeom>
+          <a:noFill/>
+          <a:extLst>
+            <a:ext uri="{909E8E84-426E-40DD-AFC4-6F175D3DCCD1}">
+              <a14:hiddenFill xmlns:a14="http://schemas.microsoft.com/office/drawing/2010/main">
+                <a:solidFill>
+                  <a:srgbClr val="FFFFFF"/>
+                </a:solidFill>
+              </a14:hiddenFill>
+            </a:ext>
+          </a:extLst>
+        </p:spPr>
+      </p:pic>
+    </p:spTree>
+    <p:extLst>
+      <p:ext uri="{BB962C8B-B14F-4D97-AF65-F5344CB8AC3E}">
+        <p14:creationId xmlns:p14="http://schemas.microsoft.com/office/powerpoint/2010/main" val="1094539532"/>
+      </p:ext>
+    </p:extLst>
+  </p:cSld>
+  <p:clrMapOvr>
+    <a:masterClrMapping/>
+  </p:clrMapOvr>
+  <p:timing>
+    <p:tnLst>
+      <p:par>
+        <p:cTn id="1" dur="indefinite" restart="never" nodeType="tmRoot"/>
+      </p:par>
+    </p:tnLst>
+  </p:timing>
+</p:sld>
+</file>
+
+<file path=ppt/slides/slide8.xml><?xml version="1.0" encoding="utf-8"?>
+<p:sld xmlns:a="http://schemas.openxmlformats.org/drawingml/2006/main" xmlns:r="http://schemas.openxmlformats.org/officeDocument/2006/relationships" xmlns:p="http://schemas.openxmlformats.org/presentationml/2006/main">
+  <p:cSld>
+    <p:spTree>
+      <p:nvGrpSpPr>
+        <p:cNvPr id="1" name=""/>
+        <p:cNvGrpSpPr/>
+        <p:nvPr/>
+      </p:nvGrpSpPr>
+      <p:grpSpPr>
+        <a:xfrm>
+          <a:off x="0" y="0"/>
+          <a:ext cx="0" cy="0"/>
+          <a:chOff x="0" y="0"/>
+          <a:chExt cx="0" cy="0"/>
+        </a:xfrm>
+      </p:grpSpPr>
+      <p:sp>
+        <p:nvSpPr>
+          <p:cNvPr id="3" name="제목 2"/>
+          <p:cNvSpPr>
+            <a:spLocks noGrp="1"/>
+          </p:cNvSpPr>
+          <p:nvPr>
+            <p:ph type="title"/>
+          </p:nvPr>
+        </p:nvSpPr>
+        <p:spPr/>
+        <p:txBody>
+          <a:bodyPr/>
+          <a:lstStyle/>
+          <a:p>
+            <a:r>
               <a:rPr lang="en-US" altLang="ko-KR" dirty="0" smtClean="0"/>
               <a:t>4. </a:t>
             </a:r>
@@ -8060,7 +8563,7 @@
 </p:sld>
 </file>
 
-<file path=ppt/slides/slide8.xml><?xml version="1.0" encoding="utf-8"?>
+<file path=ppt/slides/slide9.xml><?xml version="1.0" encoding="utf-8"?>
 <p:sld xmlns:a="http://schemas.openxmlformats.org/drawingml/2006/main" xmlns:r="http://schemas.openxmlformats.org/officeDocument/2006/relationships" xmlns:p="http://schemas.openxmlformats.org/presentationml/2006/main">
   <p:cSld>
     <p:spTree>
@@ -8309,375 +8812,6 @@
     <p:extLst>
       <p:ext uri="{BB962C8B-B14F-4D97-AF65-F5344CB8AC3E}">
         <p14:creationId xmlns:p14="http://schemas.microsoft.com/office/powerpoint/2010/main" val="682837284"/>
-      </p:ext>
-    </p:extLst>
-  </p:cSld>
-  <p:clrMapOvr>
-    <a:masterClrMapping/>
-  </p:clrMapOvr>
-  <p:timing>
-    <p:tnLst>
-      <p:par>
-        <p:cTn id="1" dur="indefinite" restart="never" nodeType="tmRoot"/>
-      </p:par>
-    </p:tnLst>
-  </p:timing>
-</p:sld>
-</file>
-
-<file path=ppt/slides/slide9.xml><?xml version="1.0" encoding="utf-8"?>
-<p:sld xmlns:a="http://schemas.openxmlformats.org/drawingml/2006/main" xmlns:r="http://schemas.openxmlformats.org/officeDocument/2006/relationships" xmlns:p="http://schemas.openxmlformats.org/presentationml/2006/main">
-  <p:cSld>
-    <p:spTree>
-      <p:nvGrpSpPr>
-        <p:cNvPr id="1" name=""/>
-        <p:cNvGrpSpPr/>
-        <p:nvPr/>
-      </p:nvGrpSpPr>
-      <p:grpSpPr>
-        <a:xfrm>
-          <a:off x="0" y="0"/>
-          <a:ext cx="0" cy="0"/>
-          <a:chOff x="0" y="0"/>
-          <a:chExt cx="0" cy="0"/>
-        </a:xfrm>
-      </p:grpSpPr>
-      <p:pic>
-        <p:nvPicPr>
-          <p:cNvPr id="4" name="Picture 2"/>
-          <p:cNvPicPr>
-            <a:picLocks noChangeAspect="1" noChangeArrowheads="1"/>
-          </p:cNvPicPr>
-          <p:nvPr/>
-        </p:nvPicPr>
-        <p:blipFill>
-          <a:blip r:embed="rId2">
-            <a:extLst>
-              <a:ext uri="{28A0092B-C50C-407E-A947-70E740481C1C}">
-                <a14:useLocalDpi xmlns:a14="http://schemas.microsoft.com/office/drawing/2010/main" val="0"/>
-              </a:ext>
-            </a:extLst>
-          </a:blip>
-          <a:srcRect/>
-          <a:stretch>
-            <a:fillRect/>
-          </a:stretch>
-        </p:blipFill>
-        <p:spPr bwMode="auto">
-          <a:xfrm>
-            <a:off x="3131840" y="2060848"/>
-            <a:ext cx="2781300" cy="1323975"/>
-          </a:xfrm>
-          <a:prstGeom prst="rect">
-            <a:avLst/>
-          </a:prstGeom>
-          <a:noFill/>
-          <a:ln>
-            <a:noFill/>
-          </a:ln>
-          <a:extLst>
-            <a:ext uri="{909E8E84-426E-40DD-AFC4-6F175D3DCCD1}">
-              <a14:hiddenFill xmlns:a14="http://schemas.microsoft.com/office/drawing/2010/main">
-                <a:solidFill>
-                  <a:schemeClr val="accent1"/>
-                </a:solidFill>
-              </a14:hiddenFill>
-            </a:ext>
-            <a:ext uri="{91240B29-F687-4F45-9708-019B960494DF}">
-              <a14:hiddenLine xmlns:a14="http://schemas.microsoft.com/office/drawing/2010/main" w="9525">
-                <a:solidFill>
-                  <a:schemeClr val="tx1"/>
-                </a:solidFill>
-                <a:miter lim="800000"/>
-                <a:headEnd/>
-                <a:tailEnd/>
-              </a14:hiddenLine>
-            </a:ext>
-          </a:extLst>
-        </p:spPr>
-      </p:pic>
-      <p:sp>
-        <p:nvSpPr>
-          <p:cNvPr id="5" name="제목 2"/>
-          <p:cNvSpPr>
-            <a:spLocks noGrp="1"/>
-          </p:cNvSpPr>
-          <p:nvPr>
-            <p:ph type="title"/>
-          </p:nvPr>
-        </p:nvSpPr>
-        <p:spPr>
-          <a:xfrm>
-            <a:off x="2514600" y="975360"/>
-            <a:ext cx="4114800" cy="701040"/>
-          </a:xfrm>
-        </p:spPr>
-        <p:txBody>
-          <a:bodyPr/>
-          <a:lstStyle/>
-          <a:p>
-            <a:r>
-              <a:rPr lang="en-US" altLang="ko-KR" dirty="0" smtClean="0"/>
-              <a:t>4. </a:t>
-            </a:r>
-            <a:r>
-              <a:rPr lang="ko-KR" altLang="en-US" dirty="0" smtClean="0"/>
-              <a:t>구현</a:t>
-            </a:r>
-            <a:endParaRPr lang="ko-KR" altLang="en-US" dirty="0"/>
-          </a:p>
-        </p:txBody>
-      </p:sp>
-      <p:pic>
-        <p:nvPicPr>
-          <p:cNvPr id="8194" name="Picture 2"/>
-          <p:cNvPicPr>
-            <a:picLocks noChangeAspect="1" noChangeArrowheads="1"/>
-          </p:cNvPicPr>
-          <p:nvPr/>
-        </p:nvPicPr>
-        <p:blipFill>
-          <a:blip r:embed="rId3">
-            <a:extLst>
-              <a:ext uri="{28A0092B-C50C-407E-A947-70E740481C1C}">
-                <a14:useLocalDpi xmlns:a14="http://schemas.microsoft.com/office/drawing/2010/main" val="0"/>
-              </a:ext>
-            </a:extLst>
-          </a:blip>
-          <a:srcRect/>
-          <a:stretch>
-            <a:fillRect/>
-          </a:stretch>
-        </p:blipFill>
-        <p:spPr bwMode="auto">
-          <a:xfrm>
-            <a:off x="6156176" y="3544641"/>
-            <a:ext cx="2476500" cy="1095375"/>
-          </a:xfrm>
-          <a:prstGeom prst="rect">
-            <a:avLst/>
-          </a:prstGeom>
-          <a:noFill/>
-          <a:ln>
-            <a:noFill/>
-          </a:ln>
-          <a:extLst>
-            <a:ext uri="{909E8E84-426E-40DD-AFC4-6F175D3DCCD1}">
-              <a14:hiddenFill xmlns:a14="http://schemas.microsoft.com/office/drawing/2010/main">
-                <a:solidFill>
-                  <a:schemeClr val="accent1"/>
-                </a:solidFill>
-              </a14:hiddenFill>
-            </a:ext>
-            <a:ext uri="{91240B29-F687-4F45-9708-019B960494DF}">
-              <a14:hiddenLine xmlns:a14="http://schemas.microsoft.com/office/drawing/2010/main" w="9525">
-                <a:solidFill>
-                  <a:schemeClr val="tx1"/>
-                </a:solidFill>
-                <a:miter lim="800000"/>
-                <a:headEnd/>
-                <a:tailEnd/>
-              </a14:hiddenLine>
-            </a:ext>
-          </a:extLst>
-        </p:spPr>
-      </p:pic>
-      <p:pic>
-        <p:nvPicPr>
-          <p:cNvPr id="8195" name="Picture 3"/>
-          <p:cNvPicPr>
-            <a:picLocks noChangeAspect="1" noChangeArrowheads="1"/>
-          </p:cNvPicPr>
-          <p:nvPr/>
-        </p:nvPicPr>
-        <p:blipFill>
-          <a:blip r:embed="rId4">
-            <a:extLst>
-              <a:ext uri="{28A0092B-C50C-407E-A947-70E740481C1C}">
-                <a14:useLocalDpi xmlns:a14="http://schemas.microsoft.com/office/drawing/2010/main" val="0"/>
-              </a:ext>
-            </a:extLst>
-          </a:blip>
-          <a:srcRect/>
-          <a:stretch>
-            <a:fillRect/>
-          </a:stretch>
-        </p:blipFill>
-        <p:spPr bwMode="auto">
-          <a:xfrm>
-            <a:off x="611560" y="3544640"/>
-            <a:ext cx="2239738" cy="3116969"/>
-          </a:xfrm>
-          <a:prstGeom prst="rect">
-            <a:avLst/>
-          </a:prstGeom>
-          <a:noFill/>
-          <a:ln>
-            <a:noFill/>
-          </a:ln>
-          <a:extLst>
-            <a:ext uri="{909E8E84-426E-40DD-AFC4-6F175D3DCCD1}">
-              <a14:hiddenFill xmlns:a14="http://schemas.microsoft.com/office/drawing/2010/main">
-                <a:solidFill>
-                  <a:schemeClr val="accent1"/>
-                </a:solidFill>
-              </a14:hiddenFill>
-            </a:ext>
-            <a:ext uri="{91240B29-F687-4F45-9708-019B960494DF}">
-              <a14:hiddenLine xmlns:a14="http://schemas.microsoft.com/office/drawing/2010/main" w="9525">
-                <a:solidFill>
-                  <a:schemeClr val="tx1"/>
-                </a:solidFill>
-                <a:miter lim="800000"/>
-                <a:headEnd/>
-                <a:tailEnd/>
-              </a14:hiddenLine>
-            </a:ext>
-          </a:extLst>
-        </p:spPr>
-      </p:pic>
-      <p:cxnSp>
-        <p:nvCxnSpPr>
-          <p:cNvPr id="7" name="꺾인 연결선 6"/>
-          <p:cNvCxnSpPr>
-            <a:stCxn id="4" idx="1"/>
-            <a:endCxn id="8195" idx="0"/>
-          </p:cNvCxnSpPr>
-          <p:nvPr/>
-        </p:nvCxnSpPr>
-        <p:spPr>
-          <a:xfrm rot="10800000" flipV="1">
-            <a:off x="1731430" y="2722836"/>
-            <a:ext cx="1400411" cy="821804"/>
-          </a:xfrm>
-          <a:prstGeom prst="bentConnector2">
-            <a:avLst/>
-          </a:prstGeom>
-          <a:ln w="38100">
-            <a:solidFill>
-              <a:srgbClr val="FF0000"/>
-            </a:solidFill>
-            <a:tailEnd type="arrow"/>
-          </a:ln>
-        </p:spPr>
-        <p:style>
-          <a:lnRef idx="1">
-            <a:schemeClr val="accent1"/>
-          </a:lnRef>
-          <a:fillRef idx="0">
-            <a:schemeClr val="accent1"/>
-          </a:fillRef>
-          <a:effectRef idx="0">
-            <a:schemeClr val="accent1"/>
-          </a:effectRef>
-          <a:fontRef idx="minor">
-            <a:schemeClr val="tx1"/>
-          </a:fontRef>
-        </p:style>
-      </p:cxnSp>
-      <p:cxnSp>
-        <p:nvCxnSpPr>
-          <p:cNvPr id="12" name="꺾인 연결선 11"/>
-          <p:cNvCxnSpPr>
-            <a:stCxn id="4" idx="3"/>
-            <a:endCxn id="8194" idx="0"/>
-          </p:cNvCxnSpPr>
-          <p:nvPr/>
-        </p:nvCxnSpPr>
-        <p:spPr>
-          <a:xfrm>
-            <a:off x="5913140" y="2722836"/>
-            <a:ext cx="1481286" cy="821805"/>
-          </a:xfrm>
-          <a:prstGeom prst="bentConnector2">
-            <a:avLst/>
-          </a:prstGeom>
-          <a:ln w="38100">
-            <a:solidFill>
-              <a:srgbClr val="FF0000"/>
-            </a:solidFill>
-            <a:tailEnd type="arrow"/>
-          </a:ln>
-        </p:spPr>
-        <p:style>
-          <a:lnRef idx="1">
-            <a:schemeClr val="accent1"/>
-          </a:lnRef>
-          <a:fillRef idx="0">
-            <a:schemeClr val="accent1"/>
-          </a:fillRef>
-          <a:effectRef idx="0">
-            <a:schemeClr val="accent1"/>
-          </a:effectRef>
-          <a:fontRef idx="minor">
-            <a:schemeClr val="tx1"/>
-          </a:fontRef>
-        </p:style>
-      </p:cxnSp>
-      <p:sp>
-        <p:nvSpPr>
-          <p:cNvPr id="14" name="TextBox 13"/>
-          <p:cNvSpPr txBox="1"/>
-          <p:nvPr/>
-        </p:nvSpPr>
-        <p:spPr>
-          <a:xfrm>
-            <a:off x="1731429" y="2276872"/>
-            <a:ext cx="1165704" cy="369332"/>
-          </a:xfrm>
-          <a:prstGeom prst="rect">
-            <a:avLst/>
-          </a:prstGeom>
-          <a:noFill/>
-        </p:spPr>
-        <p:txBody>
-          <a:bodyPr wrap="none" rtlCol="0">
-            <a:spAutoFit/>
-          </a:bodyPr>
-          <a:lstStyle/>
-          <a:p>
-            <a:r>
-              <a:rPr lang="ko-KR" altLang="en-US" dirty="0" smtClean="0"/>
-              <a:t>인증 성공</a:t>
-            </a:r>
-            <a:endParaRPr lang="ko-KR" altLang="en-US" dirty="0"/>
-          </a:p>
-        </p:txBody>
-      </p:sp>
-      <p:sp>
-        <p:nvSpPr>
-          <p:cNvPr id="15" name="TextBox 14"/>
-          <p:cNvSpPr txBox="1"/>
-          <p:nvPr/>
-        </p:nvSpPr>
-        <p:spPr>
-          <a:xfrm>
-            <a:off x="6228722" y="2276872"/>
-            <a:ext cx="1165704" cy="369332"/>
-          </a:xfrm>
-          <a:prstGeom prst="rect">
-            <a:avLst/>
-          </a:prstGeom>
-          <a:noFill/>
-        </p:spPr>
-        <p:txBody>
-          <a:bodyPr wrap="none" rtlCol="0">
-            <a:spAutoFit/>
-          </a:bodyPr>
-          <a:lstStyle/>
-          <a:p>
-            <a:r>
-              <a:rPr lang="ko-KR" altLang="en-US" dirty="0" smtClean="0"/>
-              <a:t>인증 실패</a:t>
-            </a:r>
-            <a:endParaRPr lang="ko-KR" altLang="en-US" dirty="0"/>
-          </a:p>
-        </p:txBody>
-      </p:sp>
-    </p:spTree>
-    <p:extLst>
-      <p:ext uri="{BB962C8B-B14F-4D97-AF65-F5344CB8AC3E}">
-        <p14:creationId xmlns:p14="http://schemas.microsoft.com/office/powerpoint/2010/main" val="3193315228"/>
       </p:ext>
     </p:extLst>
   </p:cSld>

</xml_diff>

<commit_message>
<master> : Fixed project Monster_Hunter ppt
</commit_message>
<xml_diff>
--- a/Java_tutorial/src/project_07_MonsterHunter_Weapon_DB/Monster_Hunter_ppt/몬스터헌터_무기DB.pptx
+++ b/Java_tutorial/src/project_07_MonsterHunter_Weapon_DB/Monster_Hunter_ppt/몬스터헌터_무기DB.pptx
@@ -216,7 +216,7 @@
             <a:fld id="{AB009619-1D74-44FC-9440-39735F80B79B}" type="datetimeFigureOut">
               <a:rPr lang="ko-KR" altLang="en-US" smtClean="0"/>
               <a:pPr/>
-              <a:t>2019-08-19</a:t>
+              <a:t>2019-08-21</a:t>
             </a:fld>
             <a:endParaRPr lang="ko-KR" altLang="en-US"/>
           </a:p>
@@ -385,7 +385,7 @@
     </p:spTree>
     <p:extLst>
       <p:ext uri="{BB962C8B-B14F-4D97-AF65-F5344CB8AC3E}">
-        <p14:creationId xmlns:p14="http://schemas.microsoft.com/office/powerpoint/2010/main" xmlns="" val="3606952443"/>
+        <p14:creationId xmlns:p14="http://schemas.microsoft.com/office/powerpoint/2010/main" val="3606952443"/>
       </p:ext>
     </p:extLst>
   </p:cSld>
@@ -810,7 +810,7 @@
             <a:fld id="{9C2A9301-6F80-4F1A-87E0-54AAC0EB57F9}" type="datetimeFigureOut">
               <a:rPr lang="ko-KR" altLang="en-US" smtClean="0"/>
               <a:pPr/>
-              <a:t>2019-08-19</a:t>
+              <a:t>2019-08-21</a:t>
             </a:fld>
             <a:endParaRPr lang="ko-KR" altLang="en-US"/>
           </a:p>
@@ -977,7 +977,7 @@
             <a:fld id="{9C2A9301-6F80-4F1A-87E0-54AAC0EB57F9}" type="datetimeFigureOut">
               <a:rPr lang="ko-KR" altLang="en-US" smtClean="0"/>
               <a:pPr/>
-              <a:t>2019-08-19</a:t>
+              <a:t>2019-08-21</a:t>
             </a:fld>
             <a:endParaRPr lang="ko-KR" altLang="en-US"/>
           </a:p>
@@ -1209,7 +1209,7 @@
             <a:fld id="{9C2A9301-6F80-4F1A-87E0-54AAC0EB57F9}" type="datetimeFigureOut">
               <a:rPr lang="ko-KR" altLang="en-US" smtClean="0"/>
               <a:pPr/>
-              <a:t>2019-08-19</a:t>
+              <a:t>2019-08-21</a:t>
             </a:fld>
             <a:endParaRPr lang="ko-KR" altLang="en-US"/>
           </a:p>
@@ -1409,7 +1409,7 @@
             <a:fld id="{9C2A9301-6F80-4F1A-87E0-54AAC0EB57F9}" type="datetimeFigureOut">
               <a:rPr lang="ko-KR" altLang="en-US" smtClean="0"/>
               <a:pPr/>
-              <a:t>2019-08-19</a:t>
+              <a:t>2019-08-21</a:t>
             </a:fld>
             <a:endParaRPr lang="ko-KR" altLang="en-US"/>
           </a:p>
@@ -1819,7 +1819,7 @@
             <a:fld id="{9C2A9301-6F80-4F1A-87E0-54AAC0EB57F9}" type="datetimeFigureOut">
               <a:rPr lang="ko-KR" altLang="en-US" smtClean="0"/>
               <a:pPr/>
-              <a:t>2019-08-19</a:t>
+              <a:t>2019-08-21</a:t>
             </a:fld>
             <a:endParaRPr lang="ko-KR" altLang="en-US"/>
           </a:p>
@@ -2025,7 +2025,7 @@
             <a:fld id="{9C2A9301-6F80-4F1A-87E0-54AAC0EB57F9}" type="datetimeFigureOut">
               <a:rPr lang="ko-KR" altLang="en-US" smtClean="0"/>
               <a:pPr/>
-              <a:t>2019-08-19</a:t>
+              <a:t>2019-08-21</a:t>
             </a:fld>
             <a:endParaRPr lang="ko-KR" altLang="en-US"/>
           </a:p>
@@ -2433,7 +2433,7 @@
             <a:fld id="{9C2A9301-6F80-4F1A-87E0-54AAC0EB57F9}" type="datetimeFigureOut">
               <a:rPr lang="ko-KR" altLang="en-US" smtClean="0"/>
               <a:pPr/>
-              <a:t>2019-08-19</a:t>
+              <a:t>2019-08-21</a:t>
             </a:fld>
             <a:endParaRPr lang="ko-KR" altLang="en-US"/>
           </a:p>
@@ -2571,7 +2571,7 @@
             <a:fld id="{9C2A9301-6F80-4F1A-87E0-54AAC0EB57F9}" type="datetimeFigureOut">
               <a:rPr lang="ko-KR" altLang="en-US" smtClean="0"/>
               <a:pPr/>
-              <a:t>2019-08-19</a:t>
+              <a:t>2019-08-21</a:t>
             </a:fld>
             <a:endParaRPr lang="ko-KR" altLang="en-US"/>
           </a:p>
@@ -2663,7 +2663,7 @@
             <a:fld id="{9C2A9301-6F80-4F1A-87E0-54AAC0EB57F9}" type="datetimeFigureOut">
               <a:rPr lang="ko-KR" altLang="en-US" smtClean="0"/>
               <a:pPr/>
-              <a:t>2019-08-19</a:t>
+              <a:t>2019-08-21</a:t>
             </a:fld>
             <a:endParaRPr lang="ko-KR" altLang="en-US"/>
           </a:p>
@@ -2919,7 +2919,7 @@
             <a:fld id="{9C2A9301-6F80-4F1A-87E0-54AAC0EB57F9}" type="datetimeFigureOut">
               <a:rPr lang="ko-KR" altLang="en-US" smtClean="0"/>
               <a:pPr/>
-              <a:t>2019-08-19</a:t>
+              <a:t>2019-08-21</a:t>
             </a:fld>
             <a:endParaRPr lang="ko-KR" altLang="en-US"/>
           </a:p>
@@ -3219,7 +3219,7 @@
             <a:fld id="{9C2A9301-6F80-4F1A-87E0-54AAC0EB57F9}" type="datetimeFigureOut">
               <a:rPr lang="ko-KR" altLang="en-US" smtClean="0"/>
               <a:pPr/>
-              <a:t>2019-08-19</a:t>
+              <a:t>2019-08-21</a:t>
             </a:fld>
             <a:endParaRPr lang="ko-KR" altLang="en-US"/>
           </a:p>
@@ -3452,7 +3452,7 @@
             <a:fld id="{9C2A9301-6F80-4F1A-87E0-54AAC0EB57F9}" type="datetimeFigureOut">
               <a:rPr lang="ko-KR" altLang="en-US" smtClean="0"/>
               <a:pPr/>
-              <a:t>2019-08-19</a:t>
+              <a:t>2019-08-21</a:t>
             </a:fld>
             <a:endParaRPr lang="ko-KR" altLang="en-US"/>
           </a:p>
@@ -4169,7 +4169,7 @@
           <a:blip r:embed="rId2" cstate="print">
             <a:extLst>
               <a:ext uri="{28A0092B-C50C-407E-A947-70E740481C1C}">
-                <a14:useLocalDpi xmlns:a14="http://schemas.microsoft.com/office/drawing/2010/main" xmlns="" val="0"/>
+                <a14:useLocalDpi xmlns:a14="http://schemas.microsoft.com/office/drawing/2010/main" val="0"/>
               </a:ext>
             </a:extLst>
           </a:blip>
@@ -4189,7 +4189,7 @@
           <a:noFill/>
           <a:extLst>
             <a:ext uri="{909E8E84-426E-40DD-AFC4-6F175D3DCCD1}">
-              <a14:hiddenFill xmlns:a14="http://schemas.microsoft.com/office/drawing/2010/main" xmlns="">
+              <a14:hiddenFill xmlns:a14="http://schemas.microsoft.com/office/drawing/2010/main">
                 <a:solidFill>
                   <a:srgbClr val="FFFFFF"/>
                 </a:solidFill>
@@ -4253,7 +4253,7 @@
     </p:spTree>
     <p:extLst>
       <p:ext uri="{BB962C8B-B14F-4D97-AF65-F5344CB8AC3E}">
-        <p14:creationId xmlns:p14="http://schemas.microsoft.com/office/powerpoint/2010/main" xmlns="" val="3377918651"/>
+        <p14:creationId xmlns:p14="http://schemas.microsoft.com/office/powerpoint/2010/main" val="3377918651"/>
       </p:ext>
     </p:extLst>
   </p:cSld>
@@ -4299,7 +4299,7 @@
           <a:blip r:embed="rId2" cstate="print">
             <a:extLst>
               <a:ext uri="{28A0092B-C50C-407E-A947-70E740481C1C}">
-                <a14:useLocalDpi xmlns:a14="http://schemas.microsoft.com/office/drawing/2010/main" xmlns="" val="0"/>
+                <a14:useLocalDpi xmlns:a14="http://schemas.microsoft.com/office/drawing/2010/main" val="0"/>
               </a:ext>
             </a:extLst>
           </a:blip>
@@ -4322,14 +4322,14 @@
           </a:ln>
           <a:extLst>
             <a:ext uri="{909E8E84-426E-40DD-AFC4-6F175D3DCCD1}">
-              <a14:hiddenFill xmlns:a14="http://schemas.microsoft.com/office/drawing/2010/main" xmlns="">
+              <a14:hiddenFill xmlns:a14="http://schemas.microsoft.com/office/drawing/2010/main">
                 <a:solidFill>
                   <a:schemeClr val="accent1"/>
                 </a:solidFill>
               </a14:hiddenFill>
             </a:ext>
             <a:ext uri="{91240B29-F687-4F45-9708-019B960494DF}">
-              <a14:hiddenLine xmlns:a14="http://schemas.microsoft.com/office/drawing/2010/main" xmlns="" w="9525">
+              <a14:hiddenLine xmlns:a14="http://schemas.microsoft.com/office/drawing/2010/main" w="9525">
                 <a:solidFill>
                   <a:schemeClr val="tx1"/>
                 </a:solidFill>
@@ -4394,7 +4394,7 @@
           <a:blip r:embed="rId3" cstate="print">
             <a:extLst>
               <a:ext uri="{28A0092B-C50C-407E-A947-70E740481C1C}">
-                <a14:useLocalDpi xmlns:a14="http://schemas.microsoft.com/office/drawing/2010/main" xmlns="" val="0"/>
+                <a14:useLocalDpi xmlns:a14="http://schemas.microsoft.com/office/drawing/2010/main" val="0"/>
               </a:ext>
             </a:extLst>
           </a:blip>
@@ -4417,14 +4417,14 @@
           </a:ln>
           <a:extLst>
             <a:ext uri="{909E8E84-426E-40DD-AFC4-6F175D3DCCD1}">
-              <a14:hiddenFill xmlns:a14="http://schemas.microsoft.com/office/drawing/2010/main" xmlns="">
+              <a14:hiddenFill xmlns:a14="http://schemas.microsoft.com/office/drawing/2010/main">
                 <a:solidFill>
                   <a:schemeClr val="accent1"/>
                 </a:solidFill>
               </a14:hiddenFill>
             </a:ext>
             <a:ext uri="{91240B29-F687-4F45-9708-019B960494DF}">
-              <a14:hiddenLine xmlns:a14="http://schemas.microsoft.com/office/drawing/2010/main" xmlns="" w="9525">
+              <a14:hiddenLine xmlns:a14="http://schemas.microsoft.com/office/drawing/2010/main" w="9525">
                 <a:solidFill>
                   <a:schemeClr val="tx1"/>
                 </a:solidFill>
@@ -4448,7 +4448,7 @@
           <a:blip r:embed="rId4" cstate="print">
             <a:extLst>
               <a:ext uri="{28A0092B-C50C-407E-A947-70E740481C1C}">
-                <a14:useLocalDpi xmlns:a14="http://schemas.microsoft.com/office/drawing/2010/main" xmlns="" val="0"/>
+                <a14:useLocalDpi xmlns:a14="http://schemas.microsoft.com/office/drawing/2010/main" val="0"/>
               </a:ext>
             </a:extLst>
           </a:blip>
@@ -4471,14 +4471,14 @@
           </a:ln>
           <a:extLst>
             <a:ext uri="{909E8E84-426E-40DD-AFC4-6F175D3DCCD1}">
-              <a14:hiddenFill xmlns:a14="http://schemas.microsoft.com/office/drawing/2010/main" xmlns="">
+              <a14:hiddenFill xmlns:a14="http://schemas.microsoft.com/office/drawing/2010/main">
                 <a:solidFill>
                   <a:schemeClr val="accent1"/>
                 </a:solidFill>
               </a14:hiddenFill>
             </a:ext>
             <a:ext uri="{91240B29-F687-4F45-9708-019B960494DF}">
-              <a14:hiddenLine xmlns:a14="http://schemas.microsoft.com/office/drawing/2010/main" xmlns="" w="9525">
+              <a14:hiddenLine xmlns:a14="http://schemas.microsoft.com/office/drawing/2010/main" w="9525">
                 <a:solidFill>
                   <a:schemeClr val="tx1"/>
                 </a:solidFill>
@@ -4643,7 +4643,7 @@
     </p:spTree>
     <p:extLst>
       <p:ext uri="{BB962C8B-B14F-4D97-AF65-F5344CB8AC3E}">
-        <p14:creationId xmlns:p14="http://schemas.microsoft.com/office/powerpoint/2010/main" xmlns="" val="3193315228"/>
+        <p14:creationId xmlns:p14="http://schemas.microsoft.com/office/powerpoint/2010/main" val="3193315228"/>
       </p:ext>
     </p:extLst>
   </p:cSld>
@@ -4730,7 +4730,7 @@
           <a:blip r:embed="rId2" cstate="print">
             <a:extLst>
               <a:ext uri="{28A0092B-C50C-407E-A947-70E740481C1C}">
-                <a14:useLocalDpi xmlns:a14="http://schemas.microsoft.com/office/drawing/2010/main" xmlns="" val="0"/>
+                <a14:useLocalDpi xmlns:a14="http://schemas.microsoft.com/office/drawing/2010/main" val="0"/>
               </a:ext>
             </a:extLst>
           </a:blip>
@@ -4753,14 +4753,14 @@
           </a:ln>
           <a:extLst>
             <a:ext uri="{909E8E84-426E-40DD-AFC4-6F175D3DCCD1}">
-              <a14:hiddenFill xmlns:a14="http://schemas.microsoft.com/office/drawing/2010/main" xmlns="">
+              <a14:hiddenFill xmlns:a14="http://schemas.microsoft.com/office/drawing/2010/main">
                 <a:solidFill>
                   <a:schemeClr val="accent1"/>
                 </a:solidFill>
               </a14:hiddenFill>
             </a:ext>
             <a:ext uri="{91240B29-F687-4F45-9708-019B960494DF}">
-              <a14:hiddenLine xmlns:a14="http://schemas.microsoft.com/office/drawing/2010/main" xmlns="" w="9525">
+              <a14:hiddenLine xmlns:a14="http://schemas.microsoft.com/office/drawing/2010/main" w="9525">
                 <a:solidFill>
                   <a:schemeClr val="tx1"/>
                 </a:solidFill>
@@ -4896,7 +4896,7 @@
           <a:blip r:embed="rId3" cstate="print">
             <a:extLst>
               <a:ext uri="{28A0092B-C50C-407E-A947-70E740481C1C}">
-                <a14:useLocalDpi xmlns:a14="http://schemas.microsoft.com/office/drawing/2010/main" xmlns="" val="0"/>
+                <a14:useLocalDpi xmlns:a14="http://schemas.microsoft.com/office/drawing/2010/main" val="0"/>
               </a:ext>
             </a:extLst>
           </a:blip>
@@ -4919,14 +4919,14 @@
           </a:ln>
           <a:extLst>
             <a:ext uri="{909E8E84-426E-40DD-AFC4-6F175D3DCCD1}">
-              <a14:hiddenFill xmlns:a14="http://schemas.microsoft.com/office/drawing/2010/main" xmlns="">
+              <a14:hiddenFill xmlns:a14="http://schemas.microsoft.com/office/drawing/2010/main">
                 <a:solidFill>
                   <a:schemeClr val="accent1"/>
                 </a:solidFill>
               </a14:hiddenFill>
             </a:ext>
             <a:ext uri="{91240B29-F687-4F45-9708-019B960494DF}">
-              <a14:hiddenLine xmlns:a14="http://schemas.microsoft.com/office/drawing/2010/main" xmlns="" w="9525">
+              <a14:hiddenLine xmlns:a14="http://schemas.microsoft.com/office/drawing/2010/main" w="9525">
                 <a:solidFill>
                   <a:schemeClr val="tx1"/>
                 </a:solidFill>
@@ -4950,7 +4950,7 @@
           <a:blip r:embed="rId4" cstate="print">
             <a:extLst>
               <a:ext uri="{28A0092B-C50C-407E-A947-70E740481C1C}">
-                <a14:useLocalDpi xmlns:a14="http://schemas.microsoft.com/office/drawing/2010/main" xmlns="" val="0"/>
+                <a14:useLocalDpi xmlns:a14="http://schemas.microsoft.com/office/drawing/2010/main" val="0"/>
               </a:ext>
             </a:extLst>
           </a:blip>
@@ -4973,14 +4973,14 @@
           </a:ln>
           <a:extLst>
             <a:ext uri="{909E8E84-426E-40DD-AFC4-6F175D3DCCD1}">
-              <a14:hiddenFill xmlns:a14="http://schemas.microsoft.com/office/drawing/2010/main" xmlns="">
+              <a14:hiddenFill xmlns:a14="http://schemas.microsoft.com/office/drawing/2010/main">
                 <a:solidFill>
                   <a:schemeClr val="accent1"/>
                 </a:solidFill>
               </a14:hiddenFill>
             </a:ext>
             <a:ext uri="{91240B29-F687-4F45-9708-019B960494DF}">
-              <a14:hiddenLine xmlns:a14="http://schemas.microsoft.com/office/drawing/2010/main" xmlns="" w="9525">
+              <a14:hiddenLine xmlns:a14="http://schemas.microsoft.com/office/drawing/2010/main" w="9525">
                 <a:solidFill>
                   <a:schemeClr val="tx1"/>
                 </a:solidFill>
@@ -4995,7 +4995,7 @@
     </p:spTree>
     <p:extLst>
       <p:ext uri="{BB962C8B-B14F-4D97-AF65-F5344CB8AC3E}">
-        <p14:creationId xmlns:p14="http://schemas.microsoft.com/office/powerpoint/2010/main" xmlns="" val="848280478"/>
+        <p14:creationId xmlns:p14="http://schemas.microsoft.com/office/powerpoint/2010/main" val="848280478"/>
       </p:ext>
     </p:extLst>
   </p:cSld>
@@ -5485,7 +5485,7 @@
           <a:blip r:embed="rId2" cstate="print">
             <a:extLst>
               <a:ext uri="{28A0092B-C50C-407E-A947-70E740481C1C}">
-                <a14:useLocalDpi xmlns:a14="http://schemas.microsoft.com/office/drawing/2010/main" xmlns="" val="0"/>
+                <a14:useLocalDpi xmlns:a14="http://schemas.microsoft.com/office/drawing/2010/main" val="0"/>
               </a:ext>
             </a:extLst>
           </a:blip>
@@ -5508,14 +5508,14 @@
           </a:ln>
           <a:extLst>
             <a:ext uri="{909E8E84-426E-40DD-AFC4-6F175D3DCCD1}">
-              <a14:hiddenFill xmlns:a14="http://schemas.microsoft.com/office/drawing/2010/main" xmlns="">
+              <a14:hiddenFill xmlns:a14="http://schemas.microsoft.com/office/drawing/2010/main">
                 <a:solidFill>
                   <a:schemeClr val="accent1"/>
                 </a:solidFill>
               </a14:hiddenFill>
             </a:ext>
             <a:ext uri="{91240B29-F687-4F45-9708-019B960494DF}">
-              <a14:hiddenLine xmlns:a14="http://schemas.microsoft.com/office/drawing/2010/main" xmlns="" w="9525">
+              <a14:hiddenLine xmlns:a14="http://schemas.microsoft.com/office/drawing/2010/main" w="9525">
                 <a:solidFill>
                   <a:schemeClr val="tx1"/>
                 </a:solidFill>
@@ -5580,7 +5580,7 @@
           <a:blip r:embed="rId3" cstate="print">
             <a:extLst>
               <a:ext uri="{28A0092B-C50C-407E-A947-70E740481C1C}">
-                <a14:useLocalDpi xmlns:a14="http://schemas.microsoft.com/office/drawing/2010/main" xmlns="" val="0"/>
+                <a14:useLocalDpi xmlns:a14="http://schemas.microsoft.com/office/drawing/2010/main" val="0"/>
               </a:ext>
             </a:extLst>
           </a:blip>
@@ -5603,14 +5603,14 @@
           </a:ln>
           <a:extLst>
             <a:ext uri="{909E8E84-426E-40DD-AFC4-6F175D3DCCD1}">
-              <a14:hiddenFill xmlns:a14="http://schemas.microsoft.com/office/drawing/2010/main" xmlns="">
+              <a14:hiddenFill xmlns:a14="http://schemas.microsoft.com/office/drawing/2010/main">
                 <a:solidFill>
                   <a:schemeClr val="accent1"/>
                 </a:solidFill>
               </a14:hiddenFill>
             </a:ext>
             <a:ext uri="{91240B29-F687-4F45-9708-019B960494DF}">
-              <a14:hiddenLine xmlns:a14="http://schemas.microsoft.com/office/drawing/2010/main" xmlns="" w="9525">
+              <a14:hiddenLine xmlns:a14="http://schemas.microsoft.com/office/drawing/2010/main" w="9525">
                 <a:solidFill>
                   <a:schemeClr val="tx1"/>
                 </a:solidFill>
@@ -5671,7 +5671,7 @@
     </p:spTree>
     <p:extLst>
       <p:ext uri="{BB962C8B-B14F-4D97-AF65-F5344CB8AC3E}">
-        <p14:creationId xmlns:p14="http://schemas.microsoft.com/office/powerpoint/2010/main" xmlns="" val="1419178209"/>
+        <p14:creationId xmlns:p14="http://schemas.microsoft.com/office/powerpoint/2010/main" val="1419178209"/>
       </p:ext>
     </p:extLst>
   </p:cSld>
@@ -5758,7 +5758,7 @@
           <a:blip r:embed="rId2" cstate="print">
             <a:extLst>
               <a:ext uri="{28A0092B-C50C-407E-A947-70E740481C1C}">
-                <a14:useLocalDpi xmlns:a14="http://schemas.microsoft.com/office/drawing/2010/main" xmlns="" val="0"/>
+                <a14:useLocalDpi xmlns:a14="http://schemas.microsoft.com/office/drawing/2010/main" val="0"/>
               </a:ext>
             </a:extLst>
           </a:blip>
@@ -5778,7 +5778,7 @@
           <a:noFill/>
           <a:extLst>
             <a:ext uri="{909E8E84-426E-40DD-AFC4-6F175D3DCCD1}">
-              <a14:hiddenFill xmlns:a14="http://schemas.microsoft.com/office/drawing/2010/main" xmlns="">
+              <a14:hiddenFill xmlns:a14="http://schemas.microsoft.com/office/drawing/2010/main">
                 <a:solidFill>
                   <a:srgbClr val="FFFFFF"/>
                 </a:solidFill>
@@ -5845,7 +5845,7 @@
           <a:blip r:embed="rId3" cstate="print">
             <a:extLst>
               <a:ext uri="{28A0092B-C50C-407E-A947-70E740481C1C}">
-                <a14:useLocalDpi xmlns:a14="http://schemas.microsoft.com/office/drawing/2010/main" xmlns="" val="0"/>
+                <a14:useLocalDpi xmlns:a14="http://schemas.microsoft.com/office/drawing/2010/main" val="0"/>
               </a:ext>
             </a:extLst>
           </a:blip>
@@ -5865,7 +5865,7 @@
           <a:noFill/>
           <a:extLst>
             <a:ext uri="{909E8E84-426E-40DD-AFC4-6F175D3DCCD1}">
-              <a14:hiddenFill xmlns:a14="http://schemas.microsoft.com/office/drawing/2010/main" xmlns="">
+              <a14:hiddenFill xmlns:a14="http://schemas.microsoft.com/office/drawing/2010/main">
                 <a:solidFill>
                   <a:srgbClr val="FFFFFF"/>
                 </a:solidFill>
@@ -5877,7 +5877,7 @@
     </p:spTree>
     <p:extLst>
       <p:ext uri="{BB962C8B-B14F-4D97-AF65-F5344CB8AC3E}">
-        <p14:creationId xmlns:p14="http://schemas.microsoft.com/office/powerpoint/2010/main" xmlns="" val="807748064"/>
+        <p14:creationId xmlns:p14="http://schemas.microsoft.com/office/powerpoint/2010/main" val="807748064"/>
       </p:ext>
     </p:extLst>
   </p:cSld>
@@ -5964,7 +5964,7 @@
           <a:blip r:embed="rId2" cstate="print">
             <a:extLst>
               <a:ext uri="{28A0092B-C50C-407E-A947-70E740481C1C}">
-                <a14:useLocalDpi xmlns:a14="http://schemas.microsoft.com/office/drawing/2010/main" xmlns="" val="0"/>
+                <a14:useLocalDpi xmlns:a14="http://schemas.microsoft.com/office/drawing/2010/main" val="0"/>
               </a:ext>
             </a:extLst>
           </a:blip>
@@ -5984,7 +5984,7 @@
           <a:noFill/>
           <a:extLst>
             <a:ext uri="{909E8E84-426E-40DD-AFC4-6F175D3DCCD1}">
-              <a14:hiddenFill xmlns:a14="http://schemas.microsoft.com/office/drawing/2010/main" xmlns="">
+              <a14:hiddenFill xmlns:a14="http://schemas.microsoft.com/office/drawing/2010/main">
                 <a:solidFill>
                   <a:srgbClr val="FFFFFF"/>
                 </a:solidFill>
@@ -6156,7 +6156,7 @@
     </p:spTree>
     <p:extLst>
       <p:ext uri="{BB962C8B-B14F-4D97-AF65-F5344CB8AC3E}">
-        <p14:creationId xmlns:p14="http://schemas.microsoft.com/office/powerpoint/2010/main" xmlns="" val="872999100"/>
+        <p14:creationId xmlns:p14="http://schemas.microsoft.com/office/powerpoint/2010/main" val="872999100"/>
       </p:ext>
     </p:extLst>
   </p:cSld>
@@ -6202,7 +6202,7 @@
           <a:blip r:embed="rId2" cstate="print">
             <a:extLst>
               <a:ext uri="{28A0092B-C50C-407E-A947-70E740481C1C}">
-                <a14:useLocalDpi xmlns:a14="http://schemas.microsoft.com/office/drawing/2010/main" xmlns="" val="0"/>
+                <a14:useLocalDpi xmlns:a14="http://schemas.microsoft.com/office/drawing/2010/main" val="0"/>
               </a:ext>
             </a:extLst>
           </a:blip>
@@ -6222,7 +6222,7 @@
           <a:noFill/>
           <a:extLst>
             <a:ext uri="{909E8E84-426E-40DD-AFC4-6F175D3DCCD1}">
-              <a14:hiddenFill xmlns:a14="http://schemas.microsoft.com/office/drawing/2010/main" xmlns="">
+              <a14:hiddenFill xmlns:a14="http://schemas.microsoft.com/office/drawing/2010/main">
                 <a:solidFill>
                   <a:srgbClr val="FFFFFF"/>
                 </a:solidFill>
@@ -6284,7 +6284,7 @@
           <a:blip r:embed="rId3" cstate="print">
             <a:extLst>
               <a:ext uri="{28A0092B-C50C-407E-A947-70E740481C1C}">
-                <a14:useLocalDpi xmlns:a14="http://schemas.microsoft.com/office/drawing/2010/main" xmlns="" val="0"/>
+                <a14:useLocalDpi xmlns:a14="http://schemas.microsoft.com/office/drawing/2010/main" val="0"/>
               </a:ext>
             </a:extLst>
           </a:blip>
@@ -6304,7 +6304,7 @@
           <a:noFill/>
           <a:extLst>
             <a:ext uri="{909E8E84-426E-40DD-AFC4-6F175D3DCCD1}">
-              <a14:hiddenFill xmlns:a14="http://schemas.microsoft.com/office/drawing/2010/main" xmlns="">
+              <a14:hiddenFill xmlns:a14="http://schemas.microsoft.com/office/drawing/2010/main">
                 <a:solidFill>
                   <a:srgbClr val="FFFFFF"/>
                 </a:solidFill>
@@ -6419,7 +6419,7 @@
     </p:spTree>
     <p:extLst>
       <p:ext uri="{BB962C8B-B14F-4D97-AF65-F5344CB8AC3E}">
-        <p14:creationId xmlns:p14="http://schemas.microsoft.com/office/powerpoint/2010/main" xmlns="" val="1205486821"/>
+        <p14:creationId xmlns:p14="http://schemas.microsoft.com/office/powerpoint/2010/main" val="1205486821"/>
       </p:ext>
     </p:extLst>
   </p:cSld>
@@ -6506,7 +6506,7 @@
           <a:blip r:embed="rId2" cstate="print">
             <a:extLst>
               <a:ext uri="{28A0092B-C50C-407E-A947-70E740481C1C}">
-                <a14:useLocalDpi xmlns:a14="http://schemas.microsoft.com/office/drawing/2010/main" xmlns="" val="0"/>
+                <a14:useLocalDpi xmlns:a14="http://schemas.microsoft.com/office/drawing/2010/main" val="0"/>
               </a:ext>
             </a:extLst>
           </a:blip>
@@ -6526,7 +6526,7 @@
           <a:noFill/>
           <a:extLst>
             <a:ext uri="{909E8E84-426E-40DD-AFC4-6F175D3DCCD1}">
-              <a14:hiddenFill xmlns:a14="http://schemas.microsoft.com/office/drawing/2010/main" xmlns="">
+              <a14:hiddenFill xmlns:a14="http://schemas.microsoft.com/office/drawing/2010/main">
                 <a:solidFill>
                   <a:srgbClr val="FFFFFF"/>
                 </a:solidFill>
@@ -6593,7 +6593,7 @@
           <a:blip r:embed="rId3" cstate="print">
             <a:extLst>
               <a:ext uri="{28A0092B-C50C-407E-A947-70E740481C1C}">
-                <a14:useLocalDpi xmlns:a14="http://schemas.microsoft.com/office/drawing/2010/main" xmlns="" val="0"/>
+                <a14:useLocalDpi xmlns:a14="http://schemas.microsoft.com/office/drawing/2010/main" val="0"/>
               </a:ext>
             </a:extLst>
           </a:blip>
@@ -6616,14 +6616,14 @@
           </a:ln>
           <a:extLst>
             <a:ext uri="{909E8E84-426E-40DD-AFC4-6F175D3DCCD1}">
-              <a14:hiddenFill xmlns:a14="http://schemas.microsoft.com/office/drawing/2010/main" xmlns="">
+              <a14:hiddenFill xmlns:a14="http://schemas.microsoft.com/office/drawing/2010/main">
                 <a:solidFill>
                   <a:schemeClr val="accent1"/>
                 </a:solidFill>
               </a14:hiddenFill>
             </a:ext>
             <a:ext uri="{91240B29-F687-4F45-9708-019B960494DF}">
-              <a14:hiddenLine xmlns:a14="http://schemas.microsoft.com/office/drawing/2010/main" xmlns="" w="9525">
+              <a14:hiddenLine xmlns:a14="http://schemas.microsoft.com/office/drawing/2010/main" w="9525">
                 <a:solidFill>
                   <a:schemeClr val="tx1"/>
                 </a:solidFill>
@@ -6647,7 +6647,7 @@
           <a:blip r:embed="rId4" cstate="print">
             <a:extLst>
               <a:ext uri="{28A0092B-C50C-407E-A947-70E740481C1C}">
-                <a14:useLocalDpi xmlns:a14="http://schemas.microsoft.com/office/drawing/2010/main" xmlns="" val="0"/>
+                <a14:useLocalDpi xmlns:a14="http://schemas.microsoft.com/office/drawing/2010/main" val="0"/>
               </a:ext>
             </a:extLst>
           </a:blip>
@@ -6667,7 +6667,7 @@
           <a:noFill/>
           <a:extLst>
             <a:ext uri="{909E8E84-426E-40DD-AFC4-6F175D3DCCD1}">
-              <a14:hiddenFill xmlns:a14="http://schemas.microsoft.com/office/drawing/2010/main" xmlns="">
+              <a14:hiddenFill xmlns:a14="http://schemas.microsoft.com/office/drawing/2010/main">
                 <a:solidFill>
                   <a:srgbClr val="FFFFFF"/>
                 </a:solidFill>
@@ -6745,7 +6745,7 @@
           <a:blip r:embed="rId5" cstate="print">
             <a:extLst>
               <a:ext uri="{28A0092B-C50C-407E-A947-70E740481C1C}">
-                <a14:useLocalDpi xmlns:a14="http://schemas.microsoft.com/office/drawing/2010/main" xmlns="" val="0"/>
+                <a14:useLocalDpi xmlns:a14="http://schemas.microsoft.com/office/drawing/2010/main" val="0"/>
               </a:ext>
             </a:extLst>
           </a:blip>
@@ -6768,14 +6768,14 @@
           </a:ln>
           <a:extLst>
             <a:ext uri="{909E8E84-426E-40DD-AFC4-6F175D3DCCD1}">
-              <a14:hiddenFill xmlns:a14="http://schemas.microsoft.com/office/drawing/2010/main" xmlns="">
+              <a14:hiddenFill xmlns:a14="http://schemas.microsoft.com/office/drawing/2010/main">
                 <a:solidFill>
                   <a:schemeClr val="accent1"/>
                 </a:solidFill>
               </a14:hiddenFill>
             </a:ext>
             <a:ext uri="{91240B29-F687-4F45-9708-019B960494DF}">
-              <a14:hiddenLine xmlns:a14="http://schemas.microsoft.com/office/drawing/2010/main" xmlns="" w="9525">
+              <a14:hiddenLine xmlns:a14="http://schemas.microsoft.com/office/drawing/2010/main" w="9525">
                 <a:solidFill>
                   <a:schemeClr val="tx1"/>
                 </a:solidFill>
@@ -6790,7 +6790,7 @@
     </p:spTree>
     <p:extLst>
       <p:ext uri="{BB962C8B-B14F-4D97-AF65-F5344CB8AC3E}">
-        <p14:creationId xmlns:p14="http://schemas.microsoft.com/office/powerpoint/2010/main" xmlns="" val="313296762"/>
+        <p14:creationId xmlns:p14="http://schemas.microsoft.com/office/powerpoint/2010/main" val="313296762"/>
       </p:ext>
     </p:extLst>
   </p:cSld>
@@ -6836,7 +6836,7 @@
           <a:blip r:embed="rId2" cstate="print">
             <a:extLst>
               <a:ext uri="{28A0092B-C50C-407E-A947-70E740481C1C}">
-                <a14:useLocalDpi xmlns:a14="http://schemas.microsoft.com/office/drawing/2010/main" xmlns="" val="0"/>
+                <a14:useLocalDpi xmlns:a14="http://schemas.microsoft.com/office/drawing/2010/main" val="0"/>
               </a:ext>
             </a:extLst>
           </a:blip>
@@ -6859,14 +6859,14 @@
           </a:ln>
           <a:extLst>
             <a:ext uri="{909E8E84-426E-40DD-AFC4-6F175D3DCCD1}">
-              <a14:hiddenFill xmlns:a14="http://schemas.microsoft.com/office/drawing/2010/main" xmlns="">
+              <a14:hiddenFill xmlns:a14="http://schemas.microsoft.com/office/drawing/2010/main">
                 <a:solidFill>
                   <a:schemeClr val="accent1"/>
                 </a:solidFill>
               </a14:hiddenFill>
             </a:ext>
             <a:ext uri="{91240B29-F687-4F45-9708-019B960494DF}">
-              <a14:hiddenLine xmlns:a14="http://schemas.microsoft.com/office/drawing/2010/main" xmlns="" w="9525">
+              <a14:hiddenLine xmlns:a14="http://schemas.microsoft.com/office/drawing/2010/main" w="9525">
                 <a:solidFill>
                   <a:schemeClr val="tx1"/>
                 </a:solidFill>
@@ -6977,7 +6977,7 @@
           <a:blip r:embed="rId3" cstate="print">
             <a:extLst>
               <a:ext uri="{28A0092B-C50C-407E-A947-70E740481C1C}">
-                <a14:useLocalDpi xmlns:a14="http://schemas.microsoft.com/office/drawing/2010/main" xmlns="" val="0"/>
+                <a14:useLocalDpi xmlns:a14="http://schemas.microsoft.com/office/drawing/2010/main" val="0"/>
               </a:ext>
             </a:extLst>
           </a:blip>
@@ -7000,14 +7000,14 @@
           </a:ln>
           <a:extLst>
             <a:ext uri="{909E8E84-426E-40DD-AFC4-6F175D3DCCD1}">
-              <a14:hiddenFill xmlns:a14="http://schemas.microsoft.com/office/drawing/2010/main" xmlns="">
+              <a14:hiddenFill xmlns:a14="http://schemas.microsoft.com/office/drawing/2010/main">
                 <a:solidFill>
                   <a:schemeClr val="accent1"/>
                 </a:solidFill>
               </a14:hiddenFill>
             </a:ext>
             <a:ext uri="{91240B29-F687-4F45-9708-019B960494DF}">
-              <a14:hiddenLine xmlns:a14="http://schemas.microsoft.com/office/drawing/2010/main" xmlns="" w="9525">
+              <a14:hiddenLine xmlns:a14="http://schemas.microsoft.com/office/drawing/2010/main" w="9525">
                 <a:solidFill>
                   <a:schemeClr val="tx1"/>
                 </a:solidFill>
@@ -7068,7 +7068,7 @@
     </p:spTree>
     <p:extLst>
       <p:ext uri="{BB962C8B-B14F-4D97-AF65-F5344CB8AC3E}">
-        <p14:creationId xmlns:p14="http://schemas.microsoft.com/office/powerpoint/2010/main" xmlns="" val="1595241199"/>
+        <p14:creationId xmlns:p14="http://schemas.microsoft.com/office/powerpoint/2010/main" val="1595241199"/>
       </p:ext>
     </p:extLst>
   </p:cSld>
@@ -7822,7 +7822,7 @@
     </p:spTree>
     <p:extLst>
       <p:ext uri="{BB962C8B-B14F-4D97-AF65-F5344CB8AC3E}">
-        <p14:creationId xmlns:p14="http://schemas.microsoft.com/office/powerpoint/2010/main" xmlns="" val="63538549"/>
+        <p14:creationId xmlns:p14="http://schemas.microsoft.com/office/powerpoint/2010/main" val="63538549"/>
       </p:ext>
     </p:extLst>
   </p:cSld>
@@ -7868,7 +7868,7 @@
           <a:blip r:embed="rId2" cstate="print">
             <a:extLst>
               <a:ext uri="{28A0092B-C50C-407E-A947-70E740481C1C}">
-                <a14:useLocalDpi xmlns:a14="http://schemas.microsoft.com/office/drawing/2010/main" xmlns="" val="0"/>
+                <a14:useLocalDpi xmlns:a14="http://schemas.microsoft.com/office/drawing/2010/main" val="0"/>
               </a:ext>
             </a:extLst>
           </a:blip>
@@ -7891,14 +7891,14 @@
           </a:ln>
           <a:extLst>
             <a:ext uri="{909E8E84-426E-40DD-AFC4-6F175D3DCCD1}">
-              <a14:hiddenFill xmlns:a14="http://schemas.microsoft.com/office/drawing/2010/main" xmlns="">
+              <a14:hiddenFill xmlns:a14="http://schemas.microsoft.com/office/drawing/2010/main">
                 <a:solidFill>
                   <a:schemeClr val="accent1"/>
                 </a:solidFill>
               </a14:hiddenFill>
             </a:ext>
             <a:ext uri="{91240B29-F687-4F45-9708-019B960494DF}">
-              <a14:hiddenLine xmlns:a14="http://schemas.microsoft.com/office/drawing/2010/main" xmlns="" w="9525">
+              <a14:hiddenLine xmlns:a14="http://schemas.microsoft.com/office/drawing/2010/main" w="9525">
                 <a:solidFill>
                   <a:schemeClr val="tx1"/>
                 </a:solidFill>
@@ -8009,7 +8009,7 @@
           <a:blip r:embed="rId3" cstate="print">
             <a:extLst>
               <a:ext uri="{28A0092B-C50C-407E-A947-70E740481C1C}">
-                <a14:useLocalDpi xmlns:a14="http://schemas.microsoft.com/office/drawing/2010/main" xmlns="" val="0"/>
+                <a14:useLocalDpi xmlns:a14="http://schemas.microsoft.com/office/drawing/2010/main" val="0"/>
               </a:ext>
             </a:extLst>
           </a:blip>
@@ -8029,7 +8029,7 @@
           <a:noFill/>
           <a:extLst>
             <a:ext uri="{909E8E84-426E-40DD-AFC4-6F175D3DCCD1}">
-              <a14:hiddenFill xmlns:a14="http://schemas.microsoft.com/office/drawing/2010/main" xmlns="">
+              <a14:hiddenFill xmlns:a14="http://schemas.microsoft.com/office/drawing/2010/main">
                 <a:solidFill>
                   <a:srgbClr val="FFFFFF"/>
                 </a:solidFill>
@@ -8096,7 +8096,7 @@
           <a:blip r:embed="rId4" cstate="print">
             <a:extLst>
               <a:ext uri="{28A0092B-C50C-407E-A947-70E740481C1C}">
-                <a14:useLocalDpi xmlns:a14="http://schemas.microsoft.com/office/drawing/2010/main" xmlns="" val="0"/>
+                <a14:useLocalDpi xmlns:a14="http://schemas.microsoft.com/office/drawing/2010/main" val="0"/>
               </a:ext>
             </a:extLst>
           </a:blip>
@@ -8116,7 +8116,7 @@
           <a:noFill/>
           <a:extLst>
             <a:ext uri="{909E8E84-426E-40DD-AFC4-6F175D3DCCD1}">
-              <a14:hiddenFill xmlns:a14="http://schemas.microsoft.com/office/drawing/2010/main" xmlns="">
+              <a14:hiddenFill xmlns:a14="http://schemas.microsoft.com/office/drawing/2010/main">
                 <a:solidFill>
                   <a:srgbClr val="FFFFFF"/>
                 </a:solidFill>
@@ -8137,7 +8137,7 @@
           <a:blip r:embed="rId5" cstate="print">
             <a:extLst>
               <a:ext uri="{28A0092B-C50C-407E-A947-70E740481C1C}">
-                <a14:useLocalDpi xmlns:a14="http://schemas.microsoft.com/office/drawing/2010/main" xmlns="" val="0"/>
+                <a14:useLocalDpi xmlns:a14="http://schemas.microsoft.com/office/drawing/2010/main" val="0"/>
               </a:ext>
             </a:extLst>
           </a:blip>
@@ -8160,14 +8160,14 @@
           </a:ln>
           <a:extLst>
             <a:ext uri="{909E8E84-426E-40DD-AFC4-6F175D3DCCD1}">
-              <a14:hiddenFill xmlns:a14="http://schemas.microsoft.com/office/drawing/2010/main" xmlns="">
+              <a14:hiddenFill xmlns:a14="http://schemas.microsoft.com/office/drawing/2010/main">
                 <a:solidFill>
                   <a:schemeClr val="accent1"/>
                 </a:solidFill>
               </a14:hiddenFill>
             </a:ext>
             <a:ext uri="{91240B29-F687-4F45-9708-019B960494DF}">
-              <a14:hiddenLine xmlns:a14="http://schemas.microsoft.com/office/drawing/2010/main" xmlns="" w="9525">
+              <a14:hiddenLine xmlns:a14="http://schemas.microsoft.com/office/drawing/2010/main" w="9525">
                 <a:solidFill>
                   <a:schemeClr val="tx1"/>
                 </a:solidFill>
@@ -8182,7 +8182,7 @@
     </p:spTree>
     <p:extLst>
       <p:ext uri="{BB962C8B-B14F-4D97-AF65-F5344CB8AC3E}">
-        <p14:creationId xmlns:p14="http://schemas.microsoft.com/office/powerpoint/2010/main" xmlns="" val="858831085"/>
+        <p14:creationId xmlns:p14="http://schemas.microsoft.com/office/powerpoint/2010/main" val="858831085"/>
       </p:ext>
     </p:extLst>
   </p:cSld>
@@ -8264,7 +8264,7 @@
           <a:blip r:embed="rId2" cstate="print">
             <a:extLst>
               <a:ext uri="{28A0092B-C50C-407E-A947-70E740481C1C}">
-                <a14:useLocalDpi xmlns:a14="http://schemas.microsoft.com/office/drawing/2010/main" xmlns="" val="0"/>
+                <a14:useLocalDpi xmlns:a14="http://schemas.microsoft.com/office/drawing/2010/main" val="0"/>
               </a:ext>
             </a:extLst>
           </a:blip>
@@ -8284,7 +8284,7 @@
           <a:noFill/>
           <a:extLst>
             <a:ext uri="{909E8E84-426E-40DD-AFC4-6F175D3DCCD1}">
-              <a14:hiddenFill xmlns:a14="http://schemas.microsoft.com/office/drawing/2010/main" xmlns="">
+              <a14:hiddenFill xmlns:a14="http://schemas.microsoft.com/office/drawing/2010/main">
                 <a:solidFill>
                   <a:srgbClr val="FFFFFF"/>
                 </a:solidFill>
@@ -8305,7 +8305,7 @@
           <a:blip r:embed="rId3" cstate="print">
             <a:extLst>
               <a:ext uri="{28A0092B-C50C-407E-A947-70E740481C1C}">
-                <a14:useLocalDpi xmlns:a14="http://schemas.microsoft.com/office/drawing/2010/main" xmlns="" val="0"/>
+                <a14:useLocalDpi xmlns:a14="http://schemas.microsoft.com/office/drawing/2010/main" val="0"/>
               </a:ext>
             </a:extLst>
           </a:blip>
@@ -8325,7 +8325,7 @@
           <a:noFill/>
           <a:extLst>
             <a:ext uri="{909E8E84-426E-40DD-AFC4-6F175D3DCCD1}">
-              <a14:hiddenFill xmlns:a14="http://schemas.microsoft.com/office/drawing/2010/main" xmlns="">
+              <a14:hiddenFill xmlns:a14="http://schemas.microsoft.com/office/drawing/2010/main">
                 <a:solidFill>
                   <a:srgbClr val="FFFFFF"/>
                 </a:solidFill>
@@ -8337,7 +8337,7 @@
     </p:spTree>
     <p:extLst>
       <p:ext uri="{BB962C8B-B14F-4D97-AF65-F5344CB8AC3E}">
-        <p14:creationId xmlns:p14="http://schemas.microsoft.com/office/powerpoint/2010/main" xmlns="" val="2743869122"/>
+        <p14:creationId xmlns:p14="http://schemas.microsoft.com/office/powerpoint/2010/main" val="2743869122"/>
       </p:ext>
     </p:extLst>
   </p:cSld>
@@ -8419,7 +8419,7 @@
           <a:blip r:embed="rId2" cstate="print">
             <a:extLst>
               <a:ext uri="{28A0092B-C50C-407E-A947-70E740481C1C}">
-                <a14:useLocalDpi xmlns:a14="http://schemas.microsoft.com/office/drawing/2010/main" xmlns="" val="0"/>
+                <a14:useLocalDpi xmlns:a14="http://schemas.microsoft.com/office/drawing/2010/main" val="0"/>
               </a:ext>
             </a:extLst>
           </a:blip>
@@ -8439,7 +8439,7 @@
           <a:noFill/>
           <a:extLst>
             <a:ext uri="{909E8E84-426E-40DD-AFC4-6F175D3DCCD1}">
-              <a14:hiddenFill xmlns:a14="http://schemas.microsoft.com/office/drawing/2010/main" xmlns="">
+              <a14:hiddenFill xmlns:a14="http://schemas.microsoft.com/office/drawing/2010/main">
                 <a:solidFill>
                   <a:srgbClr val="FFFFFF"/>
                 </a:solidFill>
@@ -8460,7 +8460,7 @@
           <a:blip r:embed="rId3" cstate="print">
             <a:extLst>
               <a:ext uri="{28A0092B-C50C-407E-A947-70E740481C1C}">
-                <a14:useLocalDpi xmlns:a14="http://schemas.microsoft.com/office/drawing/2010/main" xmlns="" val="0"/>
+                <a14:useLocalDpi xmlns:a14="http://schemas.microsoft.com/office/drawing/2010/main" val="0"/>
               </a:ext>
             </a:extLst>
           </a:blip>
@@ -8480,7 +8480,7 @@
           <a:noFill/>
           <a:extLst>
             <a:ext uri="{909E8E84-426E-40DD-AFC4-6F175D3DCCD1}">
-              <a14:hiddenFill xmlns:a14="http://schemas.microsoft.com/office/drawing/2010/main" xmlns="">
+              <a14:hiddenFill xmlns:a14="http://schemas.microsoft.com/office/drawing/2010/main">
                 <a:solidFill>
                   <a:srgbClr val="FFFFFF"/>
                 </a:solidFill>
@@ -8492,7 +8492,7 @@
     </p:spTree>
     <p:extLst>
       <p:ext uri="{BB962C8B-B14F-4D97-AF65-F5344CB8AC3E}">
-        <p14:creationId xmlns:p14="http://schemas.microsoft.com/office/powerpoint/2010/main" xmlns="" val="810752750"/>
+        <p14:creationId xmlns:p14="http://schemas.microsoft.com/office/powerpoint/2010/main" val="810752750"/>
       </p:ext>
     </p:extLst>
   </p:cSld>
@@ -8563,8 +8563,8 @@
         </p:nvSpPr>
         <p:spPr>
           <a:xfrm>
-            <a:off x="2915816" y="2848868"/>
-            <a:ext cx="3793026" cy="3046988"/>
+            <a:off x="2555776" y="2848868"/>
+            <a:ext cx="4392488" cy="3046988"/>
           </a:xfrm>
           <a:prstGeom prst="rect">
             <a:avLst/>
@@ -8586,8 +8586,19 @@
                 <a:latin typeface="돋움" pitchFamily="50" charset="-127"/>
                 <a:ea typeface="돋움" pitchFamily="50" charset="-127"/>
               </a:rPr>
-              <a:t>Oracle Database</a:t>
-            </a:r>
+              <a:t>Oracle </a:t>
+            </a:r>
+            <a:r>
+              <a:rPr lang="en-US" altLang="ko-KR" sz="2400" dirty="0" smtClean="0">
+                <a:latin typeface="돋움" pitchFamily="50" charset="-127"/>
+                <a:ea typeface="돋움" pitchFamily="50" charset="-127"/>
+              </a:rPr>
+              <a:t>Database 11g R2</a:t>
+            </a:r>
+            <a:endParaRPr lang="en-US" altLang="ko-KR" sz="2400" dirty="0" smtClean="0">
+              <a:latin typeface="돋움" pitchFamily="50" charset="-127"/>
+              <a:ea typeface="돋움" pitchFamily="50" charset="-127"/>
+            </a:endParaRPr>
           </a:p>
           <a:p>
             <a:pPr marL="457200" indent="-457200">
@@ -8599,21 +8610,7 @@
                 <a:latin typeface="돋움" pitchFamily="50" charset="-127"/>
                 <a:ea typeface="돋움" pitchFamily="50" charset="-127"/>
               </a:rPr>
-              <a:t>Oracle </a:t>
-            </a:r>
-            <a:r>
-              <a:rPr lang="en-US" altLang="ko-KR" sz="2400" dirty="0" smtClean="0">
-                <a:latin typeface="돋움" pitchFamily="50" charset="-127"/>
-                <a:ea typeface="돋움" pitchFamily="50" charset="-127"/>
-              </a:rPr>
-              <a:t>SQL </a:t>
-            </a:r>
-            <a:r>
-              <a:rPr lang="en-US" altLang="ko-KR" sz="2400" dirty="0" smtClean="0">
-                <a:latin typeface="돋움" pitchFamily="50" charset="-127"/>
-                <a:ea typeface="돋움" pitchFamily="50" charset="-127"/>
-              </a:rPr>
-              <a:t>Developer</a:t>
+              <a:t>Oracle SQL Developer</a:t>
             </a:r>
           </a:p>
           <a:p>
@@ -8641,6 +8638,19 @@
               </a:rPr>
               <a:t>Eclipse</a:t>
             </a:r>
+          </a:p>
+          <a:p>
+            <a:pPr marL="457200" indent="-457200">
+              <a:buFont typeface="Arial" charset="0"/>
+              <a:buChar char="•"/>
+            </a:pPr>
+            <a:r>
+              <a:rPr lang="en-US" altLang="ko-KR" sz="2400" dirty="0" err="1" smtClean="0">
+                <a:latin typeface="돋움" pitchFamily="50" charset="-127"/>
+                <a:ea typeface="돋움" pitchFamily="50" charset="-127"/>
+              </a:rPr>
+              <a:t>Github</a:t>
+            </a:r>
             <a:endParaRPr lang="en-US" altLang="ko-KR" sz="2400" dirty="0" smtClean="0">
               <a:latin typeface="돋움" pitchFamily="50" charset="-127"/>
               <a:ea typeface="돋움" pitchFamily="50" charset="-127"/>
@@ -8652,16 +8662,12 @@
               <a:buChar char="•"/>
             </a:pPr>
             <a:r>
-              <a:rPr lang="en-US" altLang="ko-KR" sz="2400" dirty="0" err="1" smtClean="0">
-                <a:latin typeface="돋움" pitchFamily="50" charset="-127"/>
-                <a:ea typeface="돋움" pitchFamily="50" charset="-127"/>
-              </a:rPr>
-              <a:t>Github</a:t>
-            </a:r>
-            <a:endParaRPr lang="en-US" altLang="ko-KR" sz="2400" dirty="0" smtClean="0">
-              <a:latin typeface="돋움" pitchFamily="50" charset="-127"/>
-              <a:ea typeface="돋움" pitchFamily="50" charset="-127"/>
-            </a:endParaRPr>
+              <a:rPr lang="en-US" altLang="ko-KR" sz="2400" dirty="0" smtClean="0">
+                <a:latin typeface="돋움" pitchFamily="50" charset="-127"/>
+                <a:ea typeface="돋움" pitchFamily="50" charset="-127"/>
+              </a:rPr>
+              <a:t>Raptor</a:t>
+            </a:r>
           </a:p>
           <a:p>
             <a:pPr marL="457200" indent="-457200">
@@ -8673,29 +8679,8 @@
                 <a:latin typeface="돋움" pitchFamily="50" charset="-127"/>
                 <a:ea typeface="돋움" pitchFamily="50" charset="-127"/>
               </a:rPr>
-              <a:t>Raptor</a:t>
-            </a:r>
-            <a:endParaRPr lang="en-US" altLang="ko-KR" sz="2400" dirty="0" smtClean="0">
-              <a:latin typeface="돋움" pitchFamily="50" charset="-127"/>
-              <a:ea typeface="돋움" pitchFamily="50" charset="-127"/>
-            </a:endParaRPr>
-          </a:p>
-          <a:p>
-            <a:pPr marL="457200" indent="-457200">
-              <a:buFont typeface="Arial" charset="0"/>
-              <a:buChar char="•"/>
-            </a:pPr>
-            <a:r>
-              <a:rPr lang="en-US" altLang="ko-KR" sz="2400" dirty="0" smtClean="0">
-                <a:latin typeface="돋움" pitchFamily="50" charset="-127"/>
-                <a:ea typeface="돋움" pitchFamily="50" charset="-127"/>
-              </a:rPr>
               <a:t>draw.io</a:t>
             </a:r>
-            <a:endParaRPr lang="en-US" altLang="ko-KR" sz="2400" dirty="0" smtClean="0">
-              <a:latin typeface="돋움" pitchFamily="50" charset="-127"/>
-              <a:ea typeface="돋움" pitchFamily="50" charset="-127"/>
-            </a:endParaRPr>
           </a:p>
           <a:p>
             <a:endParaRPr lang="ko-KR" altLang="en-US" sz="2400" dirty="0">
@@ -8708,7 +8693,7 @@
     </p:spTree>
     <p:extLst>
       <p:ext uri="{BB962C8B-B14F-4D97-AF65-F5344CB8AC3E}">
-        <p14:creationId xmlns:p14="http://schemas.microsoft.com/office/powerpoint/2010/main" xmlns="" val="3424188766"/>
+        <p14:creationId xmlns:p14="http://schemas.microsoft.com/office/powerpoint/2010/main" val="3424188766"/>
       </p:ext>
     </p:extLst>
   </p:cSld>
@@ -8830,7 +8815,7 @@
     </p:spTree>
     <p:extLst>
       <p:ext uri="{BB962C8B-B14F-4D97-AF65-F5344CB8AC3E}">
-        <p14:creationId xmlns:p14="http://schemas.microsoft.com/office/powerpoint/2010/main" xmlns="" val="4217521131"/>
+        <p14:creationId xmlns:p14="http://schemas.microsoft.com/office/powerpoint/2010/main" val="4217521131"/>
       </p:ext>
     </p:extLst>
   </p:cSld>
@@ -8932,7 +8917,7 @@
           <a:blip r:embed="rId2" cstate="print">
             <a:extLst>
               <a:ext uri="{28A0092B-C50C-407E-A947-70E740481C1C}">
-                <a14:useLocalDpi xmlns:a14="http://schemas.microsoft.com/office/drawing/2010/main" xmlns="" val="0"/>
+                <a14:useLocalDpi xmlns:a14="http://schemas.microsoft.com/office/drawing/2010/main" val="0"/>
               </a:ext>
             </a:extLst>
           </a:blip>
@@ -8952,7 +8937,7 @@
           <a:noFill/>
           <a:extLst>
             <a:ext uri="{909E8E84-426E-40DD-AFC4-6F175D3DCCD1}">
-              <a14:hiddenFill xmlns:a14="http://schemas.microsoft.com/office/drawing/2010/main" xmlns="">
+              <a14:hiddenFill xmlns:a14="http://schemas.microsoft.com/office/drawing/2010/main">
                 <a:solidFill>
                   <a:srgbClr val="FFFFFF"/>
                 </a:solidFill>
@@ -8964,7 +8949,7 @@
     </p:spTree>
     <p:extLst>
       <p:ext uri="{BB962C8B-B14F-4D97-AF65-F5344CB8AC3E}">
-        <p14:creationId xmlns:p14="http://schemas.microsoft.com/office/powerpoint/2010/main" xmlns="" val="531904728"/>
+        <p14:creationId xmlns:p14="http://schemas.microsoft.com/office/powerpoint/2010/main" val="531904728"/>
       </p:ext>
     </p:extLst>
   </p:cSld>
@@ -9054,7 +9039,7 @@
           <a:blip r:embed="rId2" cstate="print">
             <a:extLst>
               <a:ext uri="{28A0092B-C50C-407E-A947-70E740481C1C}">
-                <a14:useLocalDpi xmlns:a14="http://schemas.microsoft.com/office/drawing/2010/main" xmlns="" val="0"/>
+                <a14:useLocalDpi xmlns:a14="http://schemas.microsoft.com/office/drawing/2010/main" val="0"/>
               </a:ext>
             </a:extLst>
           </a:blip>
@@ -9074,7 +9059,7 @@
           <a:noFill/>
           <a:extLst>
             <a:ext uri="{909E8E84-426E-40DD-AFC4-6F175D3DCCD1}">
-              <a14:hiddenFill xmlns:a14="http://schemas.microsoft.com/office/drawing/2010/main" xmlns="">
+              <a14:hiddenFill xmlns:a14="http://schemas.microsoft.com/office/drawing/2010/main">
                 <a:solidFill>
                   <a:srgbClr val="FFFFFF"/>
                 </a:solidFill>
@@ -9086,7 +9071,7 @@
     </p:spTree>
     <p:extLst>
       <p:ext uri="{BB962C8B-B14F-4D97-AF65-F5344CB8AC3E}">
-        <p14:creationId xmlns:p14="http://schemas.microsoft.com/office/powerpoint/2010/main" xmlns="" val="2749216023"/>
+        <p14:creationId xmlns:p14="http://schemas.microsoft.com/office/powerpoint/2010/main" val="2749216023"/>
       </p:ext>
     </p:extLst>
   </p:cSld>
@@ -9172,7 +9157,7 @@
           <a:blip r:embed="rId2" cstate="print">
             <a:extLst>
               <a:ext uri="{28A0092B-C50C-407E-A947-70E740481C1C}">
-                <a14:useLocalDpi xmlns:a14="http://schemas.microsoft.com/office/drawing/2010/main" xmlns="" val="0"/>
+                <a14:useLocalDpi xmlns:a14="http://schemas.microsoft.com/office/drawing/2010/main" val="0"/>
               </a:ext>
             </a:extLst>
           </a:blip>
@@ -9192,7 +9177,7 @@
           <a:noFill/>
           <a:extLst>
             <a:ext uri="{909E8E84-426E-40DD-AFC4-6F175D3DCCD1}">
-              <a14:hiddenFill xmlns:a14="http://schemas.microsoft.com/office/drawing/2010/main" xmlns="">
+              <a14:hiddenFill xmlns:a14="http://schemas.microsoft.com/office/drawing/2010/main">
                 <a:solidFill>
                   <a:srgbClr val="FFFFFF"/>
                 </a:solidFill>
@@ -9256,7 +9241,7 @@
     </p:spTree>
     <p:extLst>
       <p:ext uri="{BB962C8B-B14F-4D97-AF65-F5344CB8AC3E}">
-        <p14:creationId xmlns:p14="http://schemas.microsoft.com/office/powerpoint/2010/main" xmlns="" val="888966954"/>
+        <p14:creationId xmlns:p14="http://schemas.microsoft.com/office/powerpoint/2010/main" val="888966954"/>
       </p:ext>
     </p:extLst>
   </p:cSld>
@@ -9338,7 +9323,7 @@
           <a:blip r:embed="rId2" cstate="print">
             <a:extLst>
               <a:ext uri="{28A0092B-C50C-407E-A947-70E740481C1C}">
-                <a14:useLocalDpi xmlns:a14="http://schemas.microsoft.com/office/drawing/2010/main" xmlns="" val="0"/>
+                <a14:useLocalDpi xmlns:a14="http://schemas.microsoft.com/office/drawing/2010/main" val="0"/>
               </a:ext>
             </a:extLst>
           </a:blip>
@@ -9358,7 +9343,7 @@
           <a:noFill/>
           <a:extLst>
             <a:ext uri="{909E8E84-426E-40DD-AFC4-6F175D3DCCD1}">
-              <a14:hiddenFill xmlns:a14="http://schemas.microsoft.com/office/drawing/2010/main" xmlns="">
+              <a14:hiddenFill xmlns:a14="http://schemas.microsoft.com/office/drawing/2010/main">
                 <a:solidFill>
                   <a:srgbClr val="FFFFFF"/>
                 </a:solidFill>
@@ -9370,7 +9355,7 @@
     </p:spTree>
     <p:extLst>
       <p:ext uri="{BB962C8B-B14F-4D97-AF65-F5344CB8AC3E}">
-        <p14:creationId xmlns:p14="http://schemas.microsoft.com/office/powerpoint/2010/main" xmlns="" val="3917983075"/>
+        <p14:creationId xmlns:p14="http://schemas.microsoft.com/office/powerpoint/2010/main" val="3917983075"/>
       </p:ext>
     </p:extLst>
   </p:cSld>
@@ -9459,7 +9444,7 @@
           <a:blip r:embed="rId2" cstate="print">
             <a:extLst>
               <a:ext uri="{28A0092B-C50C-407E-A947-70E740481C1C}">
-                <a14:useLocalDpi xmlns:a14="http://schemas.microsoft.com/office/drawing/2010/main" xmlns="" val="0"/>
+                <a14:useLocalDpi xmlns:a14="http://schemas.microsoft.com/office/drawing/2010/main" val="0"/>
               </a:ext>
             </a:extLst>
           </a:blip>
@@ -9479,7 +9464,7 @@
           <a:noFill/>
           <a:extLst>
             <a:ext uri="{909E8E84-426E-40DD-AFC4-6F175D3DCCD1}">
-              <a14:hiddenFill xmlns:a14="http://schemas.microsoft.com/office/drawing/2010/main" xmlns="">
+              <a14:hiddenFill xmlns:a14="http://schemas.microsoft.com/office/drawing/2010/main">
                 <a:solidFill>
                   <a:srgbClr val="FFFFFF"/>
                 </a:solidFill>
@@ -9491,7 +9476,7 @@
     </p:spTree>
     <p:extLst>
       <p:ext uri="{BB962C8B-B14F-4D97-AF65-F5344CB8AC3E}">
-        <p14:creationId xmlns:p14="http://schemas.microsoft.com/office/powerpoint/2010/main" xmlns="" val="1094539532"/>
+        <p14:creationId xmlns:p14="http://schemas.microsoft.com/office/powerpoint/2010/main" val="1094539532"/>
       </p:ext>
     </p:extLst>
   </p:cSld>
@@ -9573,7 +9558,7 @@
           <a:blip r:embed="rId2" cstate="print">
             <a:extLst>
               <a:ext uri="{28A0092B-C50C-407E-A947-70E740481C1C}">
-                <a14:useLocalDpi xmlns:a14="http://schemas.microsoft.com/office/drawing/2010/main" xmlns="" val="0"/>
+                <a14:useLocalDpi xmlns:a14="http://schemas.microsoft.com/office/drawing/2010/main" val="0"/>
               </a:ext>
             </a:extLst>
           </a:blip>
@@ -9596,14 +9581,14 @@
           </a:ln>
           <a:extLst>
             <a:ext uri="{909E8E84-426E-40DD-AFC4-6F175D3DCCD1}">
-              <a14:hiddenFill xmlns:a14="http://schemas.microsoft.com/office/drawing/2010/main" xmlns="">
+              <a14:hiddenFill xmlns:a14="http://schemas.microsoft.com/office/drawing/2010/main">
                 <a:solidFill>
                   <a:schemeClr val="accent1"/>
                 </a:solidFill>
               </a14:hiddenFill>
             </a:ext>
             <a:ext uri="{91240B29-F687-4F45-9708-019B960494DF}">
-              <a14:hiddenLine xmlns:a14="http://schemas.microsoft.com/office/drawing/2010/main" xmlns="" w="9525">
+              <a14:hiddenLine xmlns:a14="http://schemas.microsoft.com/office/drawing/2010/main" w="9525">
                 <a:solidFill>
                   <a:schemeClr val="tx1"/>
                 </a:solidFill>
@@ -9627,7 +9612,7 @@
           <a:blip r:embed="rId3" cstate="print">
             <a:extLst>
               <a:ext uri="{28A0092B-C50C-407E-A947-70E740481C1C}">
-                <a14:useLocalDpi xmlns:a14="http://schemas.microsoft.com/office/drawing/2010/main" xmlns="" val="0"/>
+                <a14:useLocalDpi xmlns:a14="http://schemas.microsoft.com/office/drawing/2010/main" val="0"/>
               </a:ext>
             </a:extLst>
           </a:blip>
@@ -9650,14 +9635,14 @@
           </a:ln>
           <a:extLst>
             <a:ext uri="{909E8E84-426E-40DD-AFC4-6F175D3DCCD1}">
-              <a14:hiddenFill xmlns:a14="http://schemas.microsoft.com/office/drawing/2010/main" xmlns="">
+              <a14:hiddenFill xmlns:a14="http://schemas.microsoft.com/office/drawing/2010/main">
                 <a:solidFill>
                   <a:schemeClr val="accent1"/>
                 </a:solidFill>
               </a14:hiddenFill>
             </a:ext>
             <a:ext uri="{91240B29-F687-4F45-9708-019B960494DF}">
-              <a14:hiddenLine xmlns:a14="http://schemas.microsoft.com/office/drawing/2010/main" xmlns="" w="9525">
+              <a14:hiddenLine xmlns:a14="http://schemas.microsoft.com/office/drawing/2010/main" w="9525">
                 <a:solidFill>
                   <a:schemeClr val="tx1"/>
                 </a:solidFill>
@@ -9809,7 +9794,7 @@
     </p:spTree>
     <p:extLst>
       <p:ext uri="{BB962C8B-B14F-4D97-AF65-F5344CB8AC3E}">
-        <p14:creationId xmlns:p14="http://schemas.microsoft.com/office/powerpoint/2010/main" xmlns="" val="3737927260"/>
+        <p14:creationId xmlns:p14="http://schemas.microsoft.com/office/powerpoint/2010/main" val="3737927260"/>
       </p:ext>
     </p:extLst>
   </p:cSld>
@@ -9855,7 +9840,7 @@
           <a:blip r:embed="rId2" cstate="print">
             <a:extLst>
               <a:ext uri="{28A0092B-C50C-407E-A947-70E740481C1C}">
-                <a14:useLocalDpi xmlns:a14="http://schemas.microsoft.com/office/drawing/2010/main" xmlns="" val="0"/>
+                <a14:useLocalDpi xmlns:a14="http://schemas.microsoft.com/office/drawing/2010/main" val="0"/>
               </a:ext>
             </a:extLst>
           </a:blip>
@@ -9878,14 +9863,14 @@
           </a:ln>
           <a:extLst>
             <a:ext uri="{909E8E84-426E-40DD-AFC4-6F175D3DCCD1}">
-              <a14:hiddenFill xmlns:a14="http://schemas.microsoft.com/office/drawing/2010/main" xmlns="">
+              <a14:hiddenFill xmlns:a14="http://schemas.microsoft.com/office/drawing/2010/main">
                 <a:solidFill>
                   <a:schemeClr val="accent1"/>
                 </a:solidFill>
               </a14:hiddenFill>
             </a:ext>
             <a:ext uri="{91240B29-F687-4F45-9708-019B960494DF}">
-              <a14:hiddenLine xmlns:a14="http://schemas.microsoft.com/office/drawing/2010/main" xmlns="" w="9525">
+              <a14:hiddenLine xmlns:a14="http://schemas.microsoft.com/office/drawing/2010/main" w="9525">
                 <a:solidFill>
                   <a:schemeClr val="tx1"/>
                 </a:solidFill>
@@ -9909,7 +9894,7 @@
           <a:blip r:embed="rId3" cstate="print">
             <a:extLst>
               <a:ext uri="{28A0092B-C50C-407E-A947-70E740481C1C}">
-                <a14:useLocalDpi xmlns:a14="http://schemas.microsoft.com/office/drawing/2010/main" xmlns="" val="0"/>
+                <a14:useLocalDpi xmlns:a14="http://schemas.microsoft.com/office/drawing/2010/main" val="0"/>
               </a:ext>
             </a:extLst>
           </a:blip>
@@ -9932,14 +9917,14 @@
           </a:ln>
           <a:extLst>
             <a:ext uri="{909E8E84-426E-40DD-AFC4-6F175D3DCCD1}">
-              <a14:hiddenFill xmlns:a14="http://schemas.microsoft.com/office/drawing/2010/main" xmlns="">
+              <a14:hiddenFill xmlns:a14="http://schemas.microsoft.com/office/drawing/2010/main">
                 <a:solidFill>
                   <a:schemeClr val="accent1"/>
                 </a:solidFill>
               </a14:hiddenFill>
             </a:ext>
             <a:ext uri="{91240B29-F687-4F45-9708-019B960494DF}">
-              <a14:hiddenLine xmlns:a14="http://schemas.microsoft.com/office/drawing/2010/main" xmlns="" w="9525">
+              <a14:hiddenLine xmlns:a14="http://schemas.microsoft.com/office/drawing/2010/main" w="9525">
                 <a:solidFill>
                   <a:schemeClr val="tx1"/>
                 </a:solidFill>
@@ -10098,7 +10083,7 @@
     </p:spTree>
     <p:extLst>
       <p:ext uri="{BB962C8B-B14F-4D97-AF65-F5344CB8AC3E}">
-        <p14:creationId xmlns:p14="http://schemas.microsoft.com/office/powerpoint/2010/main" xmlns="" val="682837284"/>
+        <p14:creationId xmlns:p14="http://schemas.microsoft.com/office/powerpoint/2010/main" val="682837284"/>
       </p:ext>
     </p:extLst>
   </p:cSld>

</xml_diff>